<commit_message>
more work on my slides, altered objective gs
added videos
</commit_message>
<xml_diff>
--- a/A Team Documents/Anne's Final Presentation Slides.pptx
+++ b/A Team Documents/Anne's Final Presentation Slides.pptx
@@ -5,15 +5,19 @@
     <p:sldMasterId id="2147483732" r:id="rId1"/>
   </p:sldMasterIdLst>
   <p:notesMasterIdLst>
-    <p:notesMasterId r:id="rId5"/>
+    <p:notesMasterId r:id="rId9"/>
   </p:notesMasterIdLst>
   <p:handoutMasterIdLst>
-    <p:handoutMasterId r:id="rId6"/>
+    <p:handoutMasterId r:id="rId10"/>
   </p:handoutMasterIdLst>
   <p:sldIdLst>
     <p:sldId id="313" r:id="rId2"/>
-    <p:sldId id="314" r:id="rId3"/>
-    <p:sldId id="316" r:id="rId4"/>
+    <p:sldId id="319" r:id="rId3"/>
+    <p:sldId id="314" r:id="rId4"/>
+    <p:sldId id="318" r:id="rId5"/>
+    <p:sldId id="320" r:id="rId6"/>
+    <p:sldId id="317" r:id="rId7"/>
+    <p:sldId id="316" r:id="rId8"/>
   </p:sldIdLst>
   <p:sldSz cx="9144000" cy="6858000" type="screen4x3"/>
   <p:notesSz cx="6858000" cy="9144000"/>
@@ -198,7 +202,7 @@
             <a:fld id="{59E2BC62-7E84-44FB-9A81-3B8AD9AE521B}" type="datetimeFigureOut">
               <a:rPr lang="en-US" smtClean="0"/>
               <a:pPr/>
-              <a:t>5/3/2015</a:t>
+              <a:t>5/4/2015</a:t>
             </a:fld>
             <a:endParaRPr lang="en-US"/>
           </a:p>
@@ -274,7 +278,7 @@
     </p:spTree>
     <p:extLst>
       <p:ext uri="{BB962C8B-B14F-4D97-AF65-F5344CB8AC3E}">
-        <p14:creationId xmlns:p14="http://schemas.microsoft.com/office/powerpoint/2010/main" xmlns="" val="2856711207"/>
+        <p14:creationId xmlns="" xmlns:p14="http://schemas.microsoft.com/office/powerpoint/2010/main" val="2856711207"/>
       </p:ext>
     </p:extLst>
   </p:cSld>
@@ -365,7 +369,7 @@
             <a:fld id="{AC4D07E4-89AF-44D2-9F2F-5F6D2623599A}" type="datetimeFigureOut">
               <a:rPr lang="en-US" smtClean="0"/>
               <a:pPr/>
-              <a:t>5/3/2015</a:t>
+              <a:t>5/4/2015</a:t>
             </a:fld>
             <a:endParaRPr lang="en-US"/>
           </a:p>
@@ -536,7 +540,7 @@
     </p:spTree>
     <p:extLst>
       <p:ext uri="{BB962C8B-B14F-4D97-AF65-F5344CB8AC3E}">
-        <p14:creationId xmlns:p14="http://schemas.microsoft.com/office/powerpoint/2010/main" xmlns="" val="3571335044"/>
+        <p14:creationId xmlns="" xmlns:p14="http://schemas.microsoft.com/office/powerpoint/2010/main" val="3571335044"/>
       </p:ext>
     </p:extLst>
   </p:cSld>
@@ -816,7 +820,7 @@
             <a:fld id="{EC85597E-0796-4D04-ADC8-27184BE37C27}" type="slidenum">
               <a:rPr lang="en-US" smtClean="0"/>
               <a:pPr/>
-              <a:t>2</a:t>
+              <a:t>3</a:t>
             </a:fld>
             <a:endParaRPr lang="en-US"/>
           </a:p>
@@ -1012,7 +1016,7 @@
             <a:fld id="{461E6A8B-52D2-4FB9-BB2D-A053F589DABE}" type="datetimeFigureOut">
               <a:rPr lang="en-US" smtClean="0"/>
               <a:pPr/>
-              <a:t>5/3/2015</a:t>
+              <a:t>5/4/2015</a:t>
             </a:fld>
             <a:endParaRPr lang="en-US" dirty="0"/>
           </a:p>
@@ -1179,7 +1183,7 @@
             <a:fld id="{461E6A8B-52D2-4FB9-BB2D-A053F589DABE}" type="datetimeFigureOut">
               <a:rPr lang="en-US" smtClean="0"/>
               <a:pPr/>
-              <a:t>5/3/2015</a:t>
+              <a:t>5/4/2015</a:t>
             </a:fld>
             <a:endParaRPr lang="en-US"/>
           </a:p>
@@ -1356,7 +1360,7 @@
             <a:fld id="{461E6A8B-52D2-4FB9-BB2D-A053F589DABE}" type="datetimeFigureOut">
               <a:rPr lang="en-US" smtClean="0"/>
               <a:pPr/>
-              <a:t>5/3/2015</a:t>
+              <a:t>5/4/2015</a:t>
             </a:fld>
             <a:endParaRPr lang="en-US"/>
           </a:p>
@@ -1523,7 +1527,7 @@
             <a:fld id="{461E6A8B-52D2-4FB9-BB2D-A053F589DABE}" type="datetimeFigureOut">
               <a:rPr lang="en-US" smtClean="0"/>
               <a:pPr/>
-              <a:t>5/3/2015</a:t>
+              <a:t>5/4/2015</a:t>
             </a:fld>
             <a:endParaRPr lang="en-US"/>
           </a:p>
@@ -1766,7 +1770,7 @@
             <a:fld id="{461E6A8B-52D2-4FB9-BB2D-A053F589DABE}" type="datetimeFigureOut">
               <a:rPr lang="en-US" smtClean="0"/>
               <a:pPr/>
-              <a:t>5/3/2015</a:t>
+              <a:t>5/4/2015</a:t>
             </a:fld>
             <a:endParaRPr lang="en-US"/>
           </a:p>
@@ -2051,7 +2055,7 @@
             <a:fld id="{461E6A8B-52D2-4FB9-BB2D-A053F589DABE}" type="datetimeFigureOut">
               <a:rPr lang="en-US" smtClean="0"/>
               <a:pPr/>
-              <a:t>5/3/2015</a:t>
+              <a:t>5/4/2015</a:t>
             </a:fld>
             <a:endParaRPr lang="en-US"/>
           </a:p>
@@ -2470,7 +2474,7 @@
             <a:fld id="{461E6A8B-52D2-4FB9-BB2D-A053F589DABE}" type="datetimeFigureOut">
               <a:rPr lang="en-US" smtClean="0"/>
               <a:pPr/>
-              <a:t>5/3/2015</a:t>
+              <a:t>5/4/2015</a:t>
             </a:fld>
             <a:endParaRPr lang="en-US"/>
           </a:p>
@@ -2585,7 +2589,7 @@
             <a:fld id="{461E6A8B-52D2-4FB9-BB2D-A053F589DABE}" type="datetimeFigureOut">
               <a:rPr lang="en-US" smtClean="0"/>
               <a:pPr/>
-              <a:t>5/3/2015</a:t>
+              <a:t>5/4/2015</a:t>
             </a:fld>
             <a:endParaRPr lang="en-US"/>
           </a:p>
@@ -2677,7 +2681,7 @@
             <a:fld id="{461E6A8B-52D2-4FB9-BB2D-A053F589DABE}" type="datetimeFigureOut">
               <a:rPr lang="en-US" smtClean="0"/>
               <a:pPr/>
-              <a:t>5/3/2015</a:t>
+              <a:t>5/4/2015</a:t>
             </a:fld>
             <a:endParaRPr lang="en-US"/>
           </a:p>
@@ -2951,7 +2955,7 @@
             <a:fld id="{461E6A8B-52D2-4FB9-BB2D-A053F589DABE}" type="datetimeFigureOut">
               <a:rPr lang="en-US" smtClean="0"/>
               <a:pPr/>
-              <a:t>5/3/2015</a:t>
+              <a:t>5/4/2015</a:t>
             </a:fld>
             <a:endParaRPr lang="en-US"/>
           </a:p>
@@ -3201,7 +3205,7 @@
             <a:fld id="{461E6A8B-52D2-4FB9-BB2D-A053F589DABE}" type="datetimeFigureOut">
               <a:rPr lang="en-US" smtClean="0"/>
               <a:pPr/>
-              <a:t>5/3/2015</a:t>
+              <a:t>5/4/2015</a:t>
             </a:fld>
             <a:endParaRPr lang="en-US"/>
           </a:p>
@@ -3429,7 +3433,7 @@
             <a:fld id="{461E6A8B-52D2-4FB9-BB2D-A053F589DABE}" type="datetimeFigureOut">
               <a:rPr lang="en-US" smtClean="0"/>
               <a:pPr/>
-              <a:t>5/3/2015</a:t>
+              <a:t>5/4/2015</a:t>
             </a:fld>
             <a:endParaRPr lang="en-US"/>
           </a:p>
@@ -5021,164 +5025,68 @@
           <a:p>
             <a:r>
               <a:rPr lang="en-US" dirty="0" smtClean="0"/>
-              <a:t>Test Report</a:t>
+              <a:t>Proof in the Results</a:t>
             </a:r>
             <a:endParaRPr lang="en-US" dirty="0"/>
           </a:p>
         </p:txBody>
       </p:sp>
-      <p:sp>
-        <p:nvSpPr>
-          <p:cNvPr id="5" name="Text Placeholder 4"/>
-          <p:cNvSpPr>
-            <a:spLocks noGrp="1"/>
-          </p:cNvSpPr>
-          <p:nvPr>
-            <p:ph type="body" idx="1"/>
-          </p:nvPr>
-        </p:nvSpPr>
-        <p:spPr/>
-        <p:txBody>
-          <a:bodyPr>
-            <a:normAutofit fontScale="92500"/>
-          </a:bodyPr>
-          <a:lstStyle/>
-          <a:p>
-            <a:r>
-              <a:rPr lang="en-US" dirty="0" smtClean="0"/>
-              <a:t>Deviations from Requirements</a:t>
-            </a:r>
-            <a:endParaRPr lang="en-US" dirty="0"/>
-          </a:p>
-        </p:txBody>
-      </p:sp>
-      <p:sp>
-        <p:nvSpPr>
-          <p:cNvPr id="6" name="Content Placeholder 5"/>
-          <p:cNvSpPr>
-            <a:spLocks noGrp="1"/>
-          </p:cNvSpPr>
-          <p:nvPr>
-            <p:ph sz="half" idx="2"/>
-          </p:nvPr>
-        </p:nvSpPr>
-        <p:spPr/>
-        <p:txBody>
-          <a:bodyPr>
-            <a:normAutofit fontScale="92500"/>
-          </a:bodyPr>
-          <a:lstStyle/>
-          <a:p>
-            <a:r>
-              <a:rPr lang="en-US" dirty="0" smtClean="0"/>
-              <a:t>Efficiency may not be improved </a:t>
-            </a:r>
-          </a:p>
-          <a:p>
-            <a:pPr lvl="1"/>
-            <a:r>
-              <a:rPr lang="en-US" dirty="0" smtClean="0"/>
-              <a:t>Processing time up to 2.5x longer </a:t>
-            </a:r>
-            <a:r>
-              <a:rPr lang="en-US" dirty="0" err="1" smtClean="0"/>
-              <a:t>vs</a:t>
-            </a:r>
-            <a:r>
-              <a:rPr lang="en-US" dirty="0" smtClean="0"/>
-              <a:t> Version 1.0</a:t>
-            </a:r>
-          </a:p>
-          <a:p>
-            <a:pPr lvl="1"/>
-            <a:r>
-              <a:rPr lang="en-US" dirty="0" smtClean="0"/>
-              <a:t>From ~1 min to ~2 min</a:t>
-            </a:r>
-          </a:p>
-          <a:p>
-            <a:pPr lvl="1"/>
-            <a:r>
-              <a:rPr lang="en-US" dirty="0" smtClean="0"/>
-              <a:t>But more robust, accurate</a:t>
-            </a:r>
-          </a:p>
-          <a:p>
-            <a:r>
-              <a:rPr lang="en-US" dirty="0" smtClean="0"/>
-              <a:t>Determined location of needle/ratchet for each image</a:t>
-            </a:r>
-          </a:p>
-          <a:p>
-            <a:pPr lvl="1"/>
-            <a:r>
-              <a:rPr lang="en-US" dirty="0" smtClean="0"/>
-              <a:t>No need for consideration of camera position – can safely assume is constant</a:t>
-            </a:r>
-          </a:p>
-          <a:p>
-            <a:endParaRPr lang="en-US" dirty="0"/>
-          </a:p>
-        </p:txBody>
-      </p:sp>
-      <p:sp>
-        <p:nvSpPr>
-          <p:cNvPr id="7" name="Text Placeholder 6"/>
-          <p:cNvSpPr>
-            <a:spLocks noGrp="1"/>
-          </p:cNvSpPr>
-          <p:nvPr>
-            <p:ph type="body" sz="quarter" idx="3"/>
-          </p:nvPr>
-        </p:nvSpPr>
-        <p:spPr/>
-        <p:txBody>
-          <a:bodyPr/>
-          <a:lstStyle/>
-          <a:p>
-            <a:r>
-              <a:rPr lang="en-US" dirty="0" smtClean="0"/>
-              <a:t>Known problems</a:t>
-            </a:r>
-            <a:endParaRPr lang="en-US" dirty="0"/>
-          </a:p>
-        </p:txBody>
-      </p:sp>
-      <p:sp>
-        <p:nvSpPr>
-          <p:cNvPr id="8" name="Content Placeholder 7"/>
-          <p:cNvSpPr>
-            <a:spLocks noGrp="1"/>
-          </p:cNvSpPr>
-          <p:nvPr>
-            <p:ph sz="quarter" idx="4"/>
-          </p:nvPr>
-        </p:nvSpPr>
-        <p:spPr/>
-        <p:txBody>
-          <a:bodyPr/>
-          <a:lstStyle/>
-          <a:p>
-            <a:r>
-              <a:rPr lang="en-US" dirty="0" smtClean="0"/>
-              <a:t>Run – Stop – Run again sequence may interrupt thread processes – cause crash</a:t>
-            </a:r>
-          </a:p>
-          <a:p>
-            <a:r>
-              <a:rPr lang="en-US" dirty="0" smtClean="0"/>
-              <a:t>Similar issue with Exiting Tool during IO</a:t>
-            </a:r>
-          </a:p>
-          <a:p>
-            <a:r>
-              <a:rPr lang="en-US" dirty="0" smtClean="0"/>
-              <a:t>Base/Needle height may not be measured accurately, will affect results</a:t>
-            </a:r>
-            <a:endParaRPr lang="en-US" dirty="0"/>
-          </a:p>
-        </p:txBody>
-      </p:sp>
+      <p:pic>
+        <p:nvPicPr>
+          <p:cNvPr id="5" name="TestDataVideo.mp4">
+            <a:hlinkClick r:id="" action="ppaction://media"/>
+          </p:cNvPr>
+          <p:cNvPicPr>
+            <a:picLocks noRot="1" noChangeAspect="1"/>
+          </p:cNvPicPr>
+          <p:nvPr>
+            <a:videoFile r:link="rId1"/>
+          </p:nvPr>
+        </p:nvPicPr>
+        <p:blipFill>
+          <a:blip r:embed="rId4" cstate="print"/>
+          <a:stretch>
+            <a:fillRect/>
+          </a:stretch>
+        </p:blipFill>
+        <p:spPr>
+          <a:xfrm>
+            <a:off x="0" y="1905000"/>
+            <a:ext cx="4495800" cy="3371850"/>
+          </a:xfrm>
+          <a:prstGeom prst="rect">
+            <a:avLst/>
+          </a:prstGeom>
+        </p:spPr>
+      </p:pic>
+      <p:pic>
+        <p:nvPicPr>
+          <p:cNvPr id="6" name="TestDataProcessedVideo.mp4">
+            <a:hlinkClick r:id="" action="ppaction://media"/>
+          </p:cNvPr>
+          <p:cNvPicPr>
+            <a:picLocks noRot="1" noChangeAspect="1"/>
+          </p:cNvPicPr>
+          <p:nvPr>
+            <a:videoFile r:link="rId2"/>
+          </p:nvPr>
+        </p:nvPicPr>
+        <p:blipFill>
+          <a:blip r:embed="rId4" cstate="print"/>
+          <a:stretch>
+            <a:fillRect/>
+          </a:stretch>
+        </p:blipFill>
+        <p:spPr>
+          <a:xfrm>
+            <a:off x="4648200" y="1905000"/>
+            <a:ext cx="4495800" cy="3371850"/>
+          </a:xfrm>
+          <a:prstGeom prst="rect">
+            <a:avLst/>
+          </a:prstGeom>
+        </p:spPr>
+      </p:pic>
     </p:spTree>
   </p:cSld>
   <p:clrMapOvr>
@@ -5187,7 +5095,258 @@
   <p:timing>
     <p:tnLst>
       <p:par>
-        <p:cTn id="1" dur="indefinite" restart="never" nodeType="tmRoot"/>
+        <p:cTn id="1" dur="indefinite" restart="never" nodeType="tmRoot">
+          <p:childTnLst>
+            <p:seq concurrent="1" nextAc="seek">
+              <p:cTn id="2" dur="indefinite" nodeType="mainSeq">
+                <p:childTnLst>
+                  <p:par>
+                    <p:cTn id="3" fill="hold">
+                      <p:stCondLst>
+                        <p:cond delay="indefinite"/>
+                        <p:cond evt="onBegin" delay="0">
+                          <p:tn val="2"/>
+                        </p:cond>
+                      </p:stCondLst>
+                      <p:childTnLst>
+                        <p:par>
+                          <p:cTn id="4" fill="hold">
+                            <p:stCondLst>
+                              <p:cond delay="0"/>
+                            </p:stCondLst>
+                            <p:childTnLst>
+                              <p:par>
+                                <p:cTn id="5" presetID="1" presetClass="mediacall" presetSubtype="0" fill="hold" nodeType="afterEffect">
+                                  <p:stCondLst>
+                                    <p:cond delay="0"/>
+                                  </p:stCondLst>
+                                  <p:childTnLst>
+                                    <p:cmd type="call" cmd="playFrom(0.0)">
+                                      <p:cBhvr>
+                                        <p:cTn id="6" dur="1" fill="hold"/>
+                                        <p:tgtEl>
+                                          <p:spTgt spid="5"/>
+                                        </p:tgtEl>
+                                      </p:cBhvr>
+                                    </p:cmd>
+                                  </p:childTnLst>
+                                </p:cTn>
+                              </p:par>
+                            </p:childTnLst>
+                          </p:cTn>
+                        </p:par>
+                        <p:par>
+                          <p:cTn id="7" fill="hold">
+                            <p:stCondLst>
+                              <p:cond delay="0"/>
+                            </p:stCondLst>
+                            <p:childTnLst>
+                              <p:par>
+                                <p:cTn id="8" presetID="1" presetClass="mediacall" presetSubtype="0" fill="hold" nodeType="afterEffect">
+                                  <p:stCondLst>
+                                    <p:cond delay="0"/>
+                                  </p:stCondLst>
+                                  <p:childTnLst>
+                                    <p:cmd type="call" cmd="playFrom(0.0)">
+                                      <p:cBhvr>
+                                        <p:cTn id="9" dur="1" fill="hold"/>
+                                        <p:tgtEl>
+                                          <p:spTgt spid="6"/>
+                                        </p:tgtEl>
+                                      </p:cBhvr>
+                                    </p:cmd>
+                                  </p:childTnLst>
+                                </p:cTn>
+                              </p:par>
+                            </p:childTnLst>
+                          </p:cTn>
+                        </p:par>
+                      </p:childTnLst>
+                    </p:cTn>
+                  </p:par>
+                </p:childTnLst>
+              </p:cTn>
+              <p:prevCondLst>
+                <p:cond evt="onPrev" delay="0">
+                  <p:tgtEl>
+                    <p:sldTgt/>
+                  </p:tgtEl>
+                </p:cond>
+              </p:prevCondLst>
+              <p:nextCondLst>
+                <p:cond evt="onNext" delay="0">
+                  <p:tgtEl>
+                    <p:sldTgt/>
+                  </p:tgtEl>
+                </p:cond>
+              </p:nextCondLst>
+            </p:seq>
+            <p:video>
+              <p:cMediaNode>
+                <p:cTn id="10" fill="hold" display="0">
+                  <p:stCondLst>
+                    <p:cond delay="indefinite"/>
+                  </p:stCondLst>
+                  <p:endCondLst>
+                    <p:cond evt="onNext" delay="0">
+                      <p:tgtEl>
+                        <p:sldTgt/>
+                      </p:tgtEl>
+                    </p:cond>
+                    <p:cond evt="onPrev" delay="0">
+                      <p:tgtEl>
+                        <p:sldTgt/>
+                      </p:tgtEl>
+                    </p:cond>
+                  </p:endCondLst>
+                </p:cTn>
+                <p:tgtEl>
+                  <p:spTgt spid="5"/>
+                </p:tgtEl>
+              </p:cMediaNode>
+            </p:video>
+            <p:seq concurrent="1" nextAc="seek">
+              <p:cTn id="11" restart="whenNotActive" fill="hold" evtFilter="cancelBubble" nodeType="interactiveSeq">
+                <p:stCondLst>
+                  <p:cond evt="onClick" delay="0">
+                    <p:tgtEl>
+                      <p:spTgt spid="5"/>
+                    </p:tgtEl>
+                  </p:cond>
+                </p:stCondLst>
+                <p:endSync evt="end" delay="0">
+                  <p:rtn val="all"/>
+                </p:endSync>
+                <p:childTnLst>
+                  <p:par>
+                    <p:cTn id="12" fill="hold">
+                      <p:stCondLst>
+                        <p:cond delay="0"/>
+                      </p:stCondLst>
+                      <p:childTnLst>
+                        <p:par>
+                          <p:cTn id="13" fill="hold">
+                            <p:stCondLst>
+                              <p:cond delay="0"/>
+                            </p:stCondLst>
+                            <p:childTnLst>
+                              <p:par>
+                                <p:cTn id="14" presetID="2" presetClass="mediacall" presetSubtype="0" fill="hold" nodeType="clickEffect">
+                                  <p:stCondLst>
+                                    <p:cond delay="0"/>
+                                  </p:stCondLst>
+                                  <p:childTnLst>
+                                    <p:cmd type="call" cmd="togglePause">
+                                      <p:cBhvr>
+                                        <p:cTn id="15" dur="1" fill="hold"/>
+                                        <p:tgtEl>
+                                          <p:spTgt spid="5"/>
+                                        </p:tgtEl>
+                                      </p:cBhvr>
+                                    </p:cmd>
+                                  </p:childTnLst>
+                                </p:cTn>
+                              </p:par>
+                            </p:childTnLst>
+                          </p:cTn>
+                        </p:par>
+                      </p:childTnLst>
+                    </p:cTn>
+                  </p:par>
+                </p:childTnLst>
+              </p:cTn>
+              <p:nextCondLst>
+                <p:cond evt="onClick" delay="0">
+                  <p:tgtEl>
+                    <p:spTgt spid="5"/>
+                  </p:tgtEl>
+                </p:cond>
+              </p:nextCondLst>
+            </p:seq>
+            <p:video>
+              <p:cMediaNode>
+                <p:cTn id="16" fill="hold" display="0">
+                  <p:stCondLst>
+                    <p:cond delay="indefinite"/>
+                  </p:stCondLst>
+                  <p:endCondLst>
+                    <p:cond evt="onNext" delay="0">
+                      <p:tgtEl>
+                        <p:sldTgt/>
+                      </p:tgtEl>
+                    </p:cond>
+                    <p:cond evt="onPrev" delay="0">
+                      <p:tgtEl>
+                        <p:sldTgt/>
+                      </p:tgtEl>
+                    </p:cond>
+                  </p:endCondLst>
+                </p:cTn>
+                <p:tgtEl>
+                  <p:spTgt spid="6"/>
+                </p:tgtEl>
+              </p:cMediaNode>
+            </p:video>
+            <p:seq concurrent="1" nextAc="seek">
+              <p:cTn id="17" restart="whenNotActive" fill="hold" evtFilter="cancelBubble" nodeType="interactiveSeq">
+                <p:stCondLst>
+                  <p:cond evt="onClick" delay="0">
+                    <p:tgtEl>
+                      <p:spTgt spid="6"/>
+                    </p:tgtEl>
+                  </p:cond>
+                </p:stCondLst>
+                <p:endSync evt="end" delay="0">
+                  <p:rtn val="all"/>
+                </p:endSync>
+                <p:childTnLst>
+                  <p:par>
+                    <p:cTn id="18" fill="hold">
+                      <p:stCondLst>
+                        <p:cond delay="0"/>
+                      </p:stCondLst>
+                      <p:childTnLst>
+                        <p:par>
+                          <p:cTn id="19" fill="hold">
+                            <p:stCondLst>
+                              <p:cond delay="0"/>
+                            </p:stCondLst>
+                            <p:childTnLst>
+                              <p:par>
+                                <p:cTn id="20" presetID="2" presetClass="mediacall" presetSubtype="0" fill="hold" nodeType="clickEffect">
+                                  <p:stCondLst>
+                                    <p:cond delay="0"/>
+                                  </p:stCondLst>
+                                  <p:childTnLst>
+                                    <p:cmd type="call" cmd="togglePause">
+                                      <p:cBhvr>
+                                        <p:cTn id="21" dur="1" fill="hold"/>
+                                        <p:tgtEl>
+                                          <p:spTgt spid="6"/>
+                                        </p:tgtEl>
+                                      </p:cBhvr>
+                                    </p:cmd>
+                                  </p:childTnLst>
+                                </p:cTn>
+                              </p:par>
+                            </p:childTnLst>
+                          </p:cTn>
+                        </p:par>
+                      </p:childTnLst>
+                    </p:cTn>
+                  </p:par>
+                </p:childTnLst>
+              </p:cTn>
+              <p:nextCondLst>
+                <p:cond evt="onClick" delay="0">
+                  <p:tgtEl>
+                    <p:spTgt spid="6"/>
+                  </p:tgtEl>
+                </p:cond>
+              </p:nextCondLst>
+            </p:seq>
+          </p:childTnLst>
+        </p:cTn>
       </p:par>
     </p:tnLst>
   </p:timing>
@@ -5223,12 +5382,847 @@
         </p:nvSpPr>
         <p:spPr/>
         <p:txBody>
+          <a:bodyPr>
+            <a:normAutofit fontScale="90000"/>
+          </a:bodyPr>
+          <a:lstStyle/>
+          <a:p>
+            <a:r>
+              <a:rPr lang="en-US" dirty="0" smtClean="0"/>
+              <a:t>Test Report – Unsatisfied Requirements</a:t>
+            </a:r>
+            <a:endParaRPr lang="en-US" dirty="0"/>
+          </a:p>
+        </p:txBody>
+      </p:sp>
+      <p:sp>
+        <p:nvSpPr>
+          <p:cNvPr id="6" name="Content Placeholder 5"/>
+          <p:cNvSpPr>
+            <a:spLocks noGrp="1"/>
+          </p:cNvSpPr>
+          <p:nvPr>
+            <p:ph sz="half" idx="1"/>
+          </p:nvPr>
+        </p:nvSpPr>
+        <p:spPr>
+          <a:xfrm>
+            <a:off x="457200" y="1905001"/>
+            <a:ext cx="4724400" cy="4114800"/>
+          </a:xfrm>
+        </p:spPr>
+        <p:txBody>
+          <a:bodyPr>
+            <a:normAutofit/>
+          </a:bodyPr>
+          <a:lstStyle/>
+          <a:p>
+            <a:r>
+              <a:rPr lang="en-US" dirty="0" smtClean="0"/>
+              <a:t>Efficiency may not be improved </a:t>
+            </a:r>
+          </a:p>
+          <a:p>
+            <a:pPr lvl="1"/>
+            <a:r>
+              <a:rPr lang="en-US" dirty="0" smtClean="0"/>
+              <a:t>Processing time up to 2.5x longer </a:t>
+            </a:r>
+            <a:r>
+              <a:rPr lang="en-US" dirty="0" err="1" smtClean="0"/>
+              <a:t>vs</a:t>
+            </a:r>
+            <a:r>
+              <a:rPr lang="en-US" dirty="0" smtClean="0"/>
+              <a:t> Version 1.0</a:t>
+            </a:r>
+          </a:p>
+          <a:p>
+            <a:pPr lvl="1"/>
+            <a:r>
+              <a:rPr lang="en-US" dirty="0" smtClean="0"/>
+              <a:t>From ~1 min to ~2 min</a:t>
+            </a:r>
+          </a:p>
+          <a:p>
+            <a:pPr lvl="1"/>
+            <a:r>
+              <a:rPr lang="en-US" dirty="0" smtClean="0"/>
+              <a:t>But more robust, accurate</a:t>
+            </a:r>
+          </a:p>
+          <a:p>
+            <a:r>
+              <a:rPr lang="en-US" dirty="0" smtClean="0"/>
+              <a:t>Excel table lacks the “frame number”</a:t>
+            </a:r>
+            <a:endParaRPr lang="en-US" dirty="0"/>
+          </a:p>
+        </p:txBody>
+      </p:sp>
+      <p:pic>
+        <p:nvPicPr>
+          <p:cNvPr id="1032" name="Picture 8"/>
+          <p:cNvPicPr>
+            <a:picLocks noChangeAspect="1" noChangeArrowheads="1"/>
+          </p:cNvPicPr>
+          <p:nvPr/>
+        </p:nvPicPr>
+        <p:blipFill>
+          <a:blip r:embed="rId3" cstate="print"/>
+          <a:srcRect/>
+          <a:stretch>
+            <a:fillRect/>
+          </a:stretch>
+        </p:blipFill>
+        <p:spPr bwMode="auto">
+          <a:xfrm>
+            <a:off x="5638800" y="2133600"/>
+            <a:ext cx="1200150" cy="2847415"/>
+          </a:xfrm>
+          <a:prstGeom prst="rect">
+            <a:avLst/>
+          </a:prstGeom>
+          <a:noFill/>
+          <a:ln w="9525">
+            <a:noFill/>
+            <a:miter lim="800000"/>
+            <a:headEnd/>
+            <a:tailEnd/>
+          </a:ln>
+        </p:spPr>
+      </p:pic>
+      <p:pic>
+        <p:nvPicPr>
+          <p:cNvPr id="1033" name="Picture 9"/>
+          <p:cNvPicPr>
+            <a:picLocks noChangeAspect="1" noChangeArrowheads="1"/>
+          </p:cNvPicPr>
+          <p:nvPr/>
+        </p:nvPicPr>
+        <p:blipFill>
+          <a:blip r:embed="rId4" cstate="print"/>
+          <a:srcRect/>
+          <a:stretch>
+            <a:fillRect/>
+          </a:stretch>
+        </p:blipFill>
+        <p:spPr bwMode="auto">
+          <a:xfrm>
+            <a:off x="7565984" y="2057401"/>
+            <a:ext cx="749341" cy="2895600"/>
+          </a:xfrm>
+          <a:prstGeom prst="rect">
+            <a:avLst/>
+          </a:prstGeom>
+          <a:noFill/>
+          <a:ln w="9525">
+            <a:noFill/>
+            <a:miter lim="800000"/>
+            <a:headEnd/>
+            <a:tailEnd/>
+          </a:ln>
+        </p:spPr>
+      </p:pic>
+    </p:spTree>
+  </p:cSld>
+  <p:clrMapOvr>
+    <a:masterClrMapping/>
+  </p:clrMapOvr>
+  <p:timing>
+    <p:tnLst>
+      <p:par>
+        <p:cTn id="1" dur="indefinite" restart="never" nodeType="tmRoot"/>
+      </p:par>
+    </p:tnLst>
+  </p:timing>
+</p:sld>
+</file>
+
+<file path=ppt/slides/slide4.xml><?xml version="1.0" encoding="utf-8"?>
+<p:sld xmlns:a="http://schemas.openxmlformats.org/drawingml/2006/main" xmlns:r="http://schemas.openxmlformats.org/officeDocument/2006/relationships" xmlns:p="http://schemas.openxmlformats.org/presentationml/2006/main">
+  <p:cSld>
+    <p:spTree>
+      <p:nvGrpSpPr>
+        <p:cNvPr id="1" name=""/>
+        <p:cNvGrpSpPr/>
+        <p:nvPr/>
+      </p:nvGrpSpPr>
+      <p:grpSpPr>
+        <a:xfrm>
+          <a:off x="0" y="0"/>
+          <a:ext cx="0" cy="0"/>
+          <a:chOff x="0" y="0"/>
+          <a:chExt cx="0" cy="0"/>
+        </a:xfrm>
+      </p:grpSpPr>
+      <p:sp>
+        <p:nvSpPr>
+          <p:cNvPr id="2" name="Title 1"/>
+          <p:cNvSpPr>
+            <a:spLocks noGrp="1"/>
+          </p:cNvSpPr>
+          <p:nvPr>
+            <p:ph type="title"/>
+          </p:nvPr>
+        </p:nvSpPr>
+        <p:spPr/>
+        <p:txBody>
+          <a:bodyPr>
+            <a:normAutofit fontScale="90000"/>
+          </a:bodyPr>
+          <a:lstStyle/>
+          <a:p>
+            <a:r>
+              <a:rPr lang="en-US" dirty="0" smtClean="0"/>
+              <a:t>Test Report – Satisfied Requirements</a:t>
+            </a:r>
+            <a:endParaRPr lang="en-US" dirty="0"/>
+          </a:p>
+        </p:txBody>
+      </p:sp>
+      <p:sp>
+        <p:nvSpPr>
+          <p:cNvPr id="3" name="Content Placeholder 2"/>
+          <p:cNvSpPr>
+            <a:spLocks noGrp="1"/>
+          </p:cNvSpPr>
+          <p:nvPr>
+            <p:ph idx="1"/>
+          </p:nvPr>
+        </p:nvSpPr>
+        <p:spPr>
+          <a:xfrm>
+            <a:off x="1295400" y="1447800"/>
+            <a:ext cx="7391400" cy="4724400"/>
+          </a:xfrm>
+        </p:spPr>
+        <p:txBody>
+          <a:bodyPr>
+            <a:normAutofit/>
+          </a:bodyPr>
+          <a:lstStyle/>
+          <a:p>
+            <a:pPr>
+              <a:buNone/>
+            </a:pPr>
+            <a:r>
+              <a:rPr lang="en-US" sz="2800" dirty="0" smtClean="0"/>
+              <a:t>Tracks the location of drop by following </a:t>
+            </a:r>
+            <a:r>
+              <a:rPr lang="en-US" sz="2800" dirty="0" err="1" smtClean="0"/>
+              <a:t>centroid</a:t>
+            </a:r>
+            <a:endParaRPr lang="en-US" sz="2800" dirty="0" smtClean="0"/>
+          </a:p>
+          <a:p>
+            <a:pPr>
+              <a:buNone/>
+            </a:pPr>
+            <a:r>
+              <a:rPr lang="en-US" sz="2800" dirty="0" smtClean="0"/>
+              <a:t>Determines location of needle/base automatically – able to fine tune</a:t>
+            </a:r>
+          </a:p>
+          <a:p>
+            <a:pPr>
+              <a:buNone/>
+            </a:pPr>
+            <a:r>
+              <a:rPr lang="en-US" sz="2800" dirty="0" smtClean="0"/>
+              <a:t>Does not require base image</a:t>
+            </a:r>
+          </a:p>
+          <a:p>
+            <a:pPr>
+              <a:buNone/>
+            </a:pPr>
+            <a:r>
+              <a:rPr lang="en-US" sz="2800" dirty="0" smtClean="0"/>
+              <a:t>Obtains volume and all required kinematics</a:t>
+            </a:r>
+          </a:p>
+          <a:p>
+            <a:pPr>
+              <a:buNone/>
+            </a:pPr>
+            <a:r>
+              <a:rPr lang="en-US" sz="2800" dirty="0" smtClean="0"/>
+              <a:t>Outputs to Excel</a:t>
+            </a:r>
+          </a:p>
+          <a:p>
+            <a:pPr>
+              <a:buNone/>
+            </a:pPr>
+            <a:r>
+              <a:rPr lang="en-US" sz="2800" dirty="0" smtClean="0"/>
+              <a:t>Generates plots as a function of time</a:t>
+            </a:r>
+          </a:p>
+          <a:p>
+            <a:pPr>
+              <a:buNone/>
+            </a:pPr>
+            <a:r>
+              <a:rPr lang="en-US" sz="2800" dirty="0" smtClean="0"/>
+              <a:t>Is Repeatable –successful for 3+  experimental sequences</a:t>
+            </a:r>
+          </a:p>
+        </p:txBody>
+      </p:sp>
+      <p:pic>
+        <p:nvPicPr>
+          <p:cNvPr id="3076" name="Picture 4" descr="http://pixabay.com/static/uploads/photo/2014/04/02/10/12/checkbox-303113_640.png"/>
+          <p:cNvPicPr>
+            <a:picLocks noChangeAspect="1" noChangeArrowheads="1"/>
+          </p:cNvPicPr>
+          <p:nvPr/>
+        </p:nvPicPr>
+        <p:blipFill>
+          <a:blip r:embed="rId2" cstate="print"/>
+          <a:srcRect/>
+          <a:stretch>
+            <a:fillRect/>
+          </a:stretch>
+        </p:blipFill>
+        <p:spPr bwMode="auto">
+          <a:xfrm>
+            <a:off x="685800" y="1525442"/>
+            <a:ext cx="457200" cy="461528"/>
+          </a:xfrm>
+          <a:prstGeom prst="rect">
+            <a:avLst/>
+          </a:prstGeom>
+          <a:noFill/>
+        </p:spPr>
+      </p:pic>
+      <p:pic>
+        <p:nvPicPr>
+          <p:cNvPr id="8" name="Picture 4" descr="http://pixabay.com/static/uploads/photo/2014/04/02/10/12/checkbox-303113_640.png"/>
+          <p:cNvPicPr>
+            <a:picLocks noChangeAspect="1" noChangeArrowheads="1"/>
+          </p:cNvPicPr>
+          <p:nvPr/>
+        </p:nvPicPr>
+        <p:blipFill>
+          <a:blip r:embed="rId2" cstate="print"/>
+          <a:srcRect/>
+          <a:stretch>
+            <a:fillRect/>
+          </a:stretch>
+        </p:blipFill>
+        <p:spPr bwMode="auto">
+          <a:xfrm>
+            <a:off x="685800" y="2057400"/>
+            <a:ext cx="457200" cy="461528"/>
+          </a:xfrm>
+          <a:prstGeom prst="rect">
+            <a:avLst/>
+          </a:prstGeom>
+          <a:noFill/>
+        </p:spPr>
+      </p:pic>
+      <p:pic>
+        <p:nvPicPr>
+          <p:cNvPr id="9" name="Picture 4" descr="http://pixabay.com/static/uploads/photo/2014/04/02/10/12/checkbox-303113_640.png"/>
+          <p:cNvPicPr>
+            <a:picLocks noChangeAspect="1" noChangeArrowheads="1"/>
+          </p:cNvPicPr>
+          <p:nvPr/>
+        </p:nvPicPr>
+        <p:blipFill>
+          <a:blip r:embed="rId2" cstate="print"/>
+          <a:srcRect/>
+          <a:stretch>
+            <a:fillRect/>
+          </a:stretch>
+        </p:blipFill>
+        <p:spPr bwMode="auto">
+          <a:xfrm>
+            <a:off x="685800" y="2973242"/>
+            <a:ext cx="457200" cy="461528"/>
+          </a:xfrm>
+          <a:prstGeom prst="rect">
+            <a:avLst/>
+          </a:prstGeom>
+          <a:noFill/>
+        </p:spPr>
+      </p:pic>
+      <p:pic>
+        <p:nvPicPr>
+          <p:cNvPr id="10" name="Picture 4" descr="http://pixabay.com/static/uploads/photo/2014/04/02/10/12/checkbox-303113_640.png"/>
+          <p:cNvPicPr>
+            <a:picLocks noChangeAspect="1" noChangeArrowheads="1"/>
+          </p:cNvPicPr>
+          <p:nvPr/>
+        </p:nvPicPr>
+        <p:blipFill>
+          <a:blip r:embed="rId2" cstate="print"/>
+          <a:srcRect/>
+          <a:stretch>
+            <a:fillRect/>
+          </a:stretch>
+        </p:blipFill>
+        <p:spPr bwMode="auto">
+          <a:xfrm>
+            <a:off x="685800" y="3429000"/>
+            <a:ext cx="457200" cy="461528"/>
+          </a:xfrm>
+          <a:prstGeom prst="rect">
+            <a:avLst/>
+          </a:prstGeom>
+          <a:noFill/>
+        </p:spPr>
+      </p:pic>
+      <p:pic>
+        <p:nvPicPr>
+          <p:cNvPr id="11" name="Picture 4" descr="http://pixabay.com/static/uploads/photo/2014/04/02/10/12/checkbox-303113_640.png"/>
+          <p:cNvPicPr>
+            <a:picLocks noChangeAspect="1" noChangeArrowheads="1"/>
+          </p:cNvPicPr>
+          <p:nvPr/>
+        </p:nvPicPr>
+        <p:blipFill>
+          <a:blip r:embed="rId2" cstate="print"/>
+          <a:srcRect/>
+          <a:stretch>
+            <a:fillRect/>
+          </a:stretch>
+        </p:blipFill>
+        <p:spPr bwMode="auto">
+          <a:xfrm>
+            <a:off x="685800" y="3962400"/>
+            <a:ext cx="457200" cy="461528"/>
+          </a:xfrm>
+          <a:prstGeom prst="rect">
+            <a:avLst/>
+          </a:prstGeom>
+          <a:noFill/>
+        </p:spPr>
+      </p:pic>
+      <p:pic>
+        <p:nvPicPr>
+          <p:cNvPr id="12" name="Picture 4" descr="http://pixabay.com/static/uploads/photo/2014/04/02/10/12/checkbox-303113_640.png"/>
+          <p:cNvPicPr>
+            <a:picLocks noChangeAspect="1" noChangeArrowheads="1"/>
+          </p:cNvPicPr>
+          <p:nvPr/>
+        </p:nvPicPr>
+        <p:blipFill>
+          <a:blip r:embed="rId2" cstate="print"/>
+          <a:srcRect/>
+          <a:stretch>
+            <a:fillRect/>
+          </a:stretch>
+        </p:blipFill>
+        <p:spPr bwMode="auto">
+          <a:xfrm>
+            <a:off x="685800" y="4494358"/>
+            <a:ext cx="457200" cy="461528"/>
+          </a:xfrm>
+          <a:prstGeom prst="rect">
+            <a:avLst/>
+          </a:prstGeom>
+          <a:noFill/>
+        </p:spPr>
+      </p:pic>
+      <p:pic>
+        <p:nvPicPr>
+          <p:cNvPr id="13" name="Picture 4" descr="http://pixabay.com/static/uploads/photo/2014/04/02/10/12/checkbox-303113_640.png"/>
+          <p:cNvPicPr>
+            <a:picLocks noChangeAspect="1" noChangeArrowheads="1"/>
+          </p:cNvPicPr>
+          <p:nvPr/>
+        </p:nvPicPr>
+        <p:blipFill>
+          <a:blip r:embed="rId2" cstate="print"/>
+          <a:srcRect/>
+          <a:stretch>
+            <a:fillRect/>
+          </a:stretch>
+        </p:blipFill>
+        <p:spPr bwMode="auto">
+          <a:xfrm>
+            <a:off x="685800" y="5029200"/>
+            <a:ext cx="457200" cy="461528"/>
+          </a:xfrm>
+          <a:prstGeom prst="rect">
+            <a:avLst/>
+          </a:prstGeom>
+          <a:noFill/>
+        </p:spPr>
+      </p:pic>
+    </p:spTree>
+  </p:cSld>
+  <p:clrMapOvr>
+    <a:masterClrMapping/>
+  </p:clrMapOvr>
+  <p:timing>
+    <p:tnLst>
+      <p:par>
+        <p:cTn id="1" dur="indefinite" restart="never" nodeType="tmRoot"/>
+      </p:par>
+    </p:tnLst>
+  </p:timing>
+</p:sld>
+</file>
+
+<file path=ppt/slides/slide5.xml><?xml version="1.0" encoding="utf-8"?>
+<p:sld xmlns:a="http://schemas.openxmlformats.org/drawingml/2006/main" xmlns:r="http://schemas.openxmlformats.org/officeDocument/2006/relationships" xmlns:p="http://schemas.openxmlformats.org/presentationml/2006/main">
+  <p:cSld>
+    <p:spTree>
+      <p:nvGrpSpPr>
+        <p:cNvPr id="1" name=""/>
+        <p:cNvGrpSpPr/>
+        <p:nvPr/>
+      </p:nvGrpSpPr>
+      <p:grpSpPr>
+        <a:xfrm>
+          <a:off x="0" y="0"/>
+          <a:ext cx="0" cy="0"/>
+          <a:chOff x="0" y="0"/>
+          <a:chExt cx="0" cy="0"/>
+        </a:xfrm>
+      </p:grpSpPr>
+      <p:sp>
+        <p:nvSpPr>
+          <p:cNvPr id="2" name="Title 1"/>
+          <p:cNvSpPr>
+            <a:spLocks noGrp="1"/>
+          </p:cNvSpPr>
+          <p:nvPr>
+            <p:ph type="title"/>
+          </p:nvPr>
+        </p:nvSpPr>
+        <p:spPr/>
+        <p:txBody>
+          <a:bodyPr>
+            <a:normAutofit fontScale="90000"/>
+          </a:bodyPr>
+          <a:lstStyle/>
+          <a:p>
+            <a:r>
+              <a:rPr lang="en-US" dirty="0" smtClean="0"/>
+              <a:t>Test Report – Satisfied Requirements Cont’d</a:t>
+            </a:r>
+            <a:endParaRPr lang="en-US" dirty="0"/>
+          </a:p>
+        </p:txBody>
+      </p:sp>
+      <p:sp>
+        <p:nvSpPr>
+          <p:cNvPr id="3" name="Content Placeholder 2"/>
+          <p:cNvSpPr>
+            <a:spLocks noGrp="1"/>
+          </p:cNvSpPr>
+          <p:nvPr>
+            <p:ph idx="1"/>
+          </p:nvPr>
+        </p:nvSpPr>
+        <p:spPr>
+          <a:xfrm>
+            <a:off x="1295400" y="1600200"/>
+            <a:ext cx="7391400" cy="685800"/>
+          </a:xfrm>
+        </p:spPr>
+        <p:txBody>
+          <a:bodyPr>
+            <a:normAutofit/>
+          </a:bodyPr>
+          <a:lstStyle/>
+          <a:p>
+            <a:pPr>
+              <a:buNone/>
+            </a:pPr>
+            <a:r>
+              <a:rPr lang="en-US" sz="2800" dirty="0" smtClean="0"/>
+              <a:t>Removes white center in drop</a:t>
+            </a:r>
+            <a:endParaRPr lang="en-US" sz="2800" dirty="0" smtClean="0"/>
+          </a:p>
+          <a:p>
+            <a:pPr>
+              <a:buNone/>
+            </a:pPr>
+            <a:endParaRPr lang="en-US" sz="2800" dirty="0" smtClean="0"/>
+          </a:p>
+        </p:txBody>
+      </p:sp>
+      <p:pic>
+        <p:nvPicPr>
+          <p:cNvPr id="3076" name="Picture 4" descr="http://pixabay.com/static/uploads/photo/2014/04/02/10/12/checkbox-303113_640.png"/>
+          <p:cNvPicPr>
+            <a:picLocks noChangeAspect="1" noChangeArrowheads="1"/>
+          </p:cNvPicPr>
+          <p:nvPr/>
+        </p:nvPicPr>
+        <p:blipFill>
+          <a:blip r:embed="rId2" cstate="print"/>
+          <a:srcRect/>
+          <a:stretch>
+            <a:fillRect/>
+          </a:stretch>
+        </p:blipFill>
+        <p:spPr bwMode="auto">
+          <a:xfrm>
+            <a:off x="762000" y="1676400"/>
+            <a:ext cx="457200" cy="461528"/>
+          </a:xfrm>
+          <a:prstGeom prst="rect">
+            <a:avLst/>
+          </a:prstGeom>
+          <a:noFill/>
+        </p:spPr>
+      </p:pic>
+      <p:pic>
+        <p:nvPicPr>
+          <p:cNvPr id="22532" name="Picture 4" descr="C:\Users\Anne\Desktop\Software Engineering\IP\drop 1\F00057.TIF"/>
+          <p:cNvPicPr>
+            <a:picLocks noChangeAspect="1" noChangeArrowheads="1"/>
+          </p:cNvPicPr>
+          <p:nvPr/>
+        </p:nvPicPr>
+        <p:blipFill>
+          <a:blip r:embed="rId3" cstate="print"/>
+          <a:srcRect/>
+          <a:stretch>
+            <a:fillRect/>
+          </a:stretch>
+        </p:blipFill>
+        <p:spPr bwMode="auto">
+          <a:xfrm>
+            <a:off x="0" y="3048000"/>
+            <a:ext cx="3048000" cy="2286000"/>
+          </a:xfrm>
+          <a:prstGeom prst="rect">
+            <a:avLst/>
+          </a:prstGeom>
+          <a:noFill/>
+        </p:spPr>
+      </p:pic>
+      <p:pic>
+        <p:nvPicPr>
+          <p:cNvPr id="22533" name="Picture 5" descr="C:\xampp5.6\htdocs\Github\ImageProcessing\test data_processed\F00057.TIF"/>
+          <p:cNvPicPr>
+            <a:picLocks noChangeAspect="1" noChangeArrowheads="1"/>
+          </p:cNvPicPr>
+          <p:nvPr/>
+        </p:nvPicPr>
+        <p:blipFill>
+          <a:blip r:embed="rId4" cstate="print"/>
+          <a:srcRect/>
+          <a:stretch>
+            <a:fillRect/>
+          </a:stretch>
+        </p:blipFill>
+        <p:spPr bwMode="auto">
+          <a:xfrm>
+            <a:off x="6096000" y="3048000"/>
+            <a:ext cx="3048000" cy="2286000"/>
+          </a:xfrm>
+          <a:prstGeom prst="rect">
+            <a:avLst/>
+          </a:prstGeom>
+          <a:noFill/>
+        </p:spPr>
+      </p:pic>
+      <p:pic>
+        <p:nvPicPr>
+          <p:cNvPr id="22531" name="Picture 3" descr="C:\Users\Anne\Desktop\Software Engineering\IP\drop 1\F00057bw.TIF"/>
+          <p:cNvPicPr>
+            <a:picLocks noChangeAspect="1" noChangeArrowheads="1"/>
+          </p:cNvPicPr>
+          <p:nvPr/>
+        </p:nvPicPr>
+        <p:blipFill>
+          <a:blip r:embed="rId5" cstate="print"/>
+          <a:srcRect/>
+          <a:stretch>
+            <a:fillRect/>
+          </a:stretch>
+        </p:blipFill>
+        <p:spPr bwMode="auto">
+          <a:xfrm>
+            <a:off x="3035834" y="3048000"/>
+            <a:ext cx="3047999" cy="2286000"/>
+          </a:xfrm>
+          <a:prstGeom prst="rect">
+            <a:avLst/>
+          </a:prstGeom>
+          <a:noFill/>
+        </p:spPr>
+      </p:pic>
+      <p:sp>
+        <p:nvSpPr>
+          <p:cNvPr id="17" name="Content Placeholder 2"/>
+          <p:cNvSpPr txBox="1">
+            <a:spLocks/>
+          </p:cNvSpPr>
+          <p:nvPr/>
+        </p:nvSpPr>
+        <p:spPr>
+          <a:xfrm>
+            <a:off x="1295400" y="2209800"/>
+            <a:ext cx="7391400" cy="685800"/>
+          </a:xfrm>
+          <a:prstGeom prst="rect">
+            <a:avLst/>
+          </a:prstGeom>
+        </p:spPr>
+        <p:txBody>
+          <a:bodyPr vert="horz" lIns="91440" tIns="45720" rIns="91440" bIns="45720" rtlCol="0">
+            <a:normAutofit/>
+          </a:bodyPr>
+          <a:lstStyle/>
+          <a:p>
+            <a:pPr marL="342900" marR="0" lvl="0" indent="-342900" algn="l" defTabSz="914400" rtl="0" eaLnBrk="1" fontAlgn="auto" latinLnBrk="0" hangingPunct="1">
+              <a:lnSpc>
+                <a:spcPct val="100000"/>
+              </a:lnSpc>
+              <a:spcBef>
+                <a:spcPct val="20000"/>
+              </a:spcBef>
+              <a:spcAft>
+                <a:spcPts val="0"/>
+              </a:spcAft>
+              <a:buClrTx/>
+              <a:buSzTx/>
+              <a:buFont typeface="Arial" pitchFamily="34" charset="0"/>
+              <a:buNone/>
+              <a:tabLst/>
+              <a:defRPr/>
+            </a:pPr>
+            <a:r>
+              <a:rPr kumimoji="0" lang="en-US" sz="2800" b="0" i="0" u="none" strike="noStrike" kern="1200" cap="none" spc="0" normalizeH="0" baseline="0" noProof="0" dirty="0" smtClean="0">
+                <a:ln>
+                  <a:noFill/>
+                </a:ln>
+                <a:solidFill>
+                  <a:schemeClr val="tx1"/>
+                </a:solidFill>
+                <a:effectLst/>
+                <a:uLnTx/>
+                <a:uFillTx/>
+                <a:latin typeface="+mn-lt"/>
+                <a:ea typeface="+mn-ea"/>
+                <a:cs typeface="+mn-cs"/>
+              </a:rPr>
+              <a:t>Provides accurate calculations</a:t>
+            </a:r>
+          </a:p>
+          <a:p>
+            <a:pPr marL="342900" marR="0" lvl="0" indent="-342900" algn="l" defTabSz="914400" rtl="0" eaLnBrk="1" fontAlgn="auto" latinLnBrk="0" hangingPunct="1">
+              <a:lnSpc>
+                <a:spcPct val="100000"/>
+              </a:lnSpc>
+              <a:spcBef>
+                <a:spcPct val="20000"/>
+              </a:spcBef>
+              <a:spcAft>
+                <a:spcPts val="0"/>
+              </a:spcAft>
+              <a:buClrTx/>
+              <a:buSzTx/>
+              <a:buFont typeface="Arial" pitchFamily="34" charset="0"/>
+              <a:buNone/>
+              <a:tabLst/>
+              <a:defRPr/>
+            </a:pPr>
+            <a:endParaRPr kumimoji="0" lang="en-US" sz="2800" b="0" i="0" u="none" strike="noStrike" kern="1200" cap="none" spc="0" normalizeH="0" baseline="0" noProof="0" dirty="0" smtClean="0">
+              <a:ln>
+                <a:noFill/>
+              </a:ln>
+              <a:solidFill>
+                <a:schemeClr val="tx1"/>
+              </a:solidFill>
+              <a:effectLst/>
+              <a:uLnTx/>
+              <a:uFillTx/>
+              <a:latin typeface="+mn-lt"/>
+              <a:ea typeface="+mn-ea"/>
+              <a:cs typeface="+mn-cs"/>
+            </a:endParaRPr>
+          </a:p>
+        </p:txBody>
+      </p:sp>
+      <p:pic>
+        <p:nvPicPr>
+          <p:cNvPr id="18" name="Picture 4" descr="http://pixabay.com/static/uploads/photo/2014/04/02/10/12/checkbox-303113_640.png"/>
+          <p:cNvPicPr>
+            <a:picLocks noChangeAspect="1" noChangeArrowheads="1"/>
+          </p:cNvPicPr>
+          <p:nvPr/>
+        </p:nvPicPr>
+        <p:blipFill>
+          <a:blip r:embed="rId2" cstate="print"/>
+          <a:srcRect/>
+          <a:stretch>
+            <a:fillRect/>
+          </a:stretch>
+        </p:blipFill>
+        <p:spPr bwMode="auto">
+          <a:xfrm>
+            <a:off x="762000" y="2286000"/>
+            <a:ext cx="457200" cy="461528"/>
+          </a:xfrm>
+          <a:prstGeom prst="rect">
+            <a:avLst/>
+          </a:prstGeom>
+          <a:noFill/>
+        </p:spPr>
+      </p:pic>
+    </p:spTree>
+  </p:cSld>
+  <p:clrMapOvr>
+    <a:masterClrMapping/>
+  </p:clrMapOvr>
+  <p:timing>
+    <p:tnLst>
+      <p:par>
+        <p:cTn id="1" dur="indefinite" restart="never" nodeType="tmRoot"/>
+      </p:par>
+    </p:tnLst>
+  </p:timing>
+</p:sld>
+</file>
+
+<file path=ppt/slides/slide6.xml><?xml version="1.0" encoding="utf-8"?>
+<p:sld xmlns:a="http://schemas.openxmlformats.org/drawingml/2006/main" xmlns:r="http://schemas.openxmlformats.org/officeDocument/2006/relationships" xmlns:p="http://schemas.openxmlformats.org/presentationml/2006/main">
+  <p:cSld>
+    <p:spTree>
+      <p:nvGrpSpPr>
+        <p:cNvPr id="1" name=""/>
+        <p:cNvGrpSpPr/>
+        <p:nvPr/>
+      </p:nvGrpSpPr>
+      <p:grpSpPr>
+        <a:xfrm>
+          <a:off x="0" y="0"/>
+          <a:ext cx="0" cy="0"/>
+          <a:chOff x="0" y="0"/>
+          <a:chExt cx="0" cy="0"/>
+        </a:xfrm>
+      </p:grpSpPr>
+      <p:sp>
+        <p:nvSpPr>
+          <p:cNvPr id="4" name="Title 3"/>
+          <p:cNvSpPr>
+            <a:spLocks noGrp="1"/>
+          </p:cNvSpPr>
+          <p:nvPr>
+            <p:ph type="title"/>
+          </p:nvPr>
+        </p:nvSpPr>
+        <p:spPr/>
+        <p:txBody>
           <a:bodyPr/>
           <a:lstStyle/>
           <a:p>
             <a:r>
               <a:rPr lang="en-US" dirty="0" smtClean="0"/>
-              <a:t>Hypothetical – Anne</a:t>
+              <a:t>Test Report – Known problems</a:t>
             </a:r>
             <a:endParaRPr lang="en-US" dirty="0"/>
           </a:p>
@@ -5236,23 +6230,313 @@
       </p:sp>
       <p:sp>
         <p:nvSpPr>
-          <p:cNvPr id="3" name="Content Placeholder 2"/>
-          <p:cNvSpPr>
-            <a:spLocks noGrp="1"/>
-          </p:cNvSpPr>
-          <p:nvPr>
-            <p:ph idx="1"/>
+          <p:cNvPr id="5" name="Content Placeholder 4"/>
+          <p:cNvSpPr>
+            <a:spLocks noGrp="1"/>
+          </p:cNvSpPr>
+          <p:nvPr>
+            <p:ph sz="half" idx="1"/>
           </p:nvPr>
         </p:nvSpPr>
         <p:spPr/>
         <p:txBody>
           <a:bodyPr>
-            <a:normAutofit fontScale="92500" lnSpcReduction="20000"/>
+            <a:normAutofit lnSpcReduction="10000"/>
           </a:bodyPr>
           <a:lstStyle/>
           <a:p>
             <a:r>
               <a:rPr lang="en-US" dirty="0" smtClean="0"/>
+              <a:t>Run – Stop – Run again sequence may interrupt thread processes – cause crash</a:t>
+            </a:r>
+          </a:p>
+          <a:p>
+            <a:r>
+              <a:rPr lang="en-US" dirty="0" smtClean="0"/>
+              <a:t>Similar issue with Exiting Tool during IO</a:t>
+            </a:r>
+          </a:p>
+          <a:p>
+            <a:r>
+              <a:rPr lang="en-US" dirty="0" smtClean="0"/>
+              <a:t>Base/Needle height may not be measured accurately, will affect </a:t>
+            </a:r>
+            <a:r>
+              <a:rPr lang="en-US" dirty="0" smtClean="0"/>
+              <a:t>results</a:t>
+            </a:r>
+            <a:endParaRPr lang="en-US" dirty="0" smtClean="0"/>
+          </a:p>
+        </p:txBody>
+      </p:sp>
+      <p:pic>
+        <p:nvPicPr>
+          <p:cNvPr id="7" name="Picture 6"/>
+          <p:cNvPicPr/>
+          <p:nvPr/>
+        </p:nvPicPr>
+        <p:blipFill>
+          <a:blip r:embed="rId2" cstate="print"/>
+          <a:srcRect/>
+          <a:stretch>
+            <a:fillRect/>
+          </a:stretch>
+        </p:blipFill>
+        <p:spPr bwMode="auto">
+          <a:xfrm>
+            <a:off x="4572000" y="2408767"/>
+            <a:ext cx="1219200" cy="791633"/>
+          </a:xfrm>
+          <a:prstGeom prst="rect">
+            <a:avLst/>
+          </a:prstGeom>
+          <a:noFill/>
+          <a:ln w="9525">
+            <a:noFill/>
+            <a:miter lim="800000"/>
+            <a:headEnd/>
+            <a:tailEnd/>
+          </a:ln>
+        </p:spPr>
+      </p:pic>
+      <p:pic>
+        <p:nvPicPr>
+          <p:cNvPr id="8" name="Picture 7"/>
+          <p:cNvPicPr/>
+          <p:nvPr/>
+        </p:nvPicPr>
+        <p:blipFill>
+          <a:blip r:embed="rId3" cstate="print"/>
+          <a:srcRect/>
+          <a:stretch>
+            <a:fillRect/>
+          </a:stretch>
+        </p:blipFill>
+        <p:spPr bwMode="auto">
+          <a:xfrm>
+            <a:off x="6096000" y="2408767"/>
+            <a:ext cx="1250527" cy="760307"/>
+          </a:xfrm>
+          <a:prstGeom prst="rect">
+            <a:avLst/>
+          </a:prstGeom>
+          <a:noFill/>
+          <a:ln w="9525">
+            <a:noFill/>
+            <a:miter lim="800000"/>
+            <a:headEnd/>
+            <a:tailEnd/>
+          </a:ln>
+        </p:spPr>
+      </p:pic>
+      <p:pic>
+        <p:nvPicPr>
+          <p:cNvPr id="9" name="Picture 8"/>
+          <p:cNvPicPr/>
+          <p:nvPr/>
+        </p:nvPicPr>
+        <p:blipFill>
+          <a:blip r:embed="rId2" cstate="print"/>
+          <a:srcRect/>
+          <a:stretch>
+            <a:fillRect/>
+          </a:stretch>
+        </p:blipFill>
+        <p:spPr bwMode="auto">
+          <a:xfrm>
+            <a:off x="7543800" y="2408767"/>
+            <a:ext cx="1219200" cy="791633"/>
+          </a:xfrm>
+          <a:prstGeom prst="rect">
+            <a:avLst/>
+          </a:prstGeom>
+          <a:noFill/>
+          <a:ln w="9525">
+            <a:noFill/>
+            <a:miter lim="800000"/>
+            <a:headEnd/>
+            <a:tailEnd/>
+          </a:ln>
+        </p:spPr>
+      </p:pic>
+      <p:cxnSp>
+        <p:nvCxnSpPr>
+          <p:cNvPr id="11" name="Straight Arrow Connector 10"/>
+          <p:cNvCxnSpPr>
+            <a:stCxn id="7" idx="3"/>
+            <a:endCxn id="8" idx="1"/>
+          </p:cNvCxnSpPr>
+          <p:nvPr/>
+        </p:nvCxnSpPr>
+        <p:spPr>
+          <a:xfrm flipV="1">
+            <a:off x="5791200" y="2788921"/>
+            <a:ext cx="304800" cy="15663"/>
+          </a:xfrm>
+          <a:prstGeom prst="straightConnector1">
+            <a:avLst/>
+          </a:prstGeom>
+          <a:ln>
+            <a:tailEnd type="arrow"/>
+          </a:ln>
+        </p:spPr>
+        <p:style>
+          <a:lnRef idx="1">
+            <a:schemeClr val="accent1"/>
+          </a:lnRef>
+          <a:fillRef idx="0">
+            <a:schemeClr val="accent1"/>
+          </a:fillRef>
+          <a:effectRef idx="0">
+            <a:schemeClr val="accent1"/>
+          </a:effectRef>
+          <a:fontRef idx="minor">
+            <a:schemeClr val="tx1"/>
+          </a:fontRef>
+        </p:style>
+      </p:cxnSp>
+      <p:cxnSp>
+        <p:nvCxnSpPr>
+          <p:cNvPr id="13" name="Straight Arrow Connector 12"/>
+          <p:cNvCxnSpPr>
+            <a:stCxn id="8" idx="3"/>
+            <a:endCxn id="9" idx="1"/>
+          </p:cNvCxnSpPr>
+          <p:nvPr/>
+        </p:nvCxnSpPr>
+        <p:spPr>
+          <a:xfrm>
+            <a:off x="7346527" y="2788921"/>
+            <a:ext cx="197273" cy="15663"/>
+          </a:xfrm>
+          <a:prstGeom prst="straightConnector1">
+            <a:avLst/>
+          </a:prstGeom>
+          <a:ln>
+            <a:tailEnd type="arrow"/>
+          </a:ln>
+        </p:spPr>
+        <p:style>
+          <a:lnRef idx="1">
+            <a:schemeClr val="accent1"/>
+          </a:lnRef>
+          <a:fillRef idx="0">
+            <a:schemeClr val="accent1"/>
+          </a:fillRef>
+          <a:effectRef idx="0">
+            <a:schemeClr val="accent1"/>
+          </a:effectRef>
+          <a:fontRef idx="minor">
+            <a:schemeClr val="tx1"/>
+          </a:fontRef>
+        </p:style>
+      </p:cxnSp>
+      <p:pic>
+        <p:nvPicPr>
+          <p:cNvPr id="2050" name="Picture 2"/>
+          <p:cNvPicPr>
+            <a:picLocks noChangeAspect="1" noChangeArrowheads="1"/>
+          </p:cNvPicPr>
+          <p:nvPr/>
+        </p:nvPicPr>
+        <p:blipFill>
+          <a:blip r:embed="rId4" cstate="print"/>
+          <a:srcRect r="4278" b="15789"/>
+          <a:stretch>
+            <a:fillRect/>
+          </a:stretch>
+        </p:blipFill>
+        <p:spPr bwMode="auto">
+          <a:xfrm>
+            <a:off x="4419600" y="4800600"/>
+            <a:ext cx="4724400" cy="281528"/>
+          </a:xfrm>
+          <a:prstGeom prst="rect">
+            <a:avLst/>
+          </a:prstGeom>
+          <a:noFill/>
+          <a:ln w="9525">
+            <a:noFill/>
+            <a:miter lim="800000"/>
+            <a:headEnd/>
+            <a:tailEnd/>
+          </a:ln>
+        </p:spPr>
+      </p:pic>
+    </p:spTree>
+  </p:cSld>
+  <p:clrMapOvr>
+    <a:masterClrMapping/>
+  </p:clrMapOvr>
+  <p:timing>
+    <p:tnLst>
+      <p:par>
+        <p:cTn id="1" dur="indefinite" restart="never" nodeType="tmRoot"/>
+      </p:par>
+    </p:tnLst>
+  </p:timing>
+</p:sld>
+</file>
+
+<file path=ppt/slides/slide7.xml><?xml version="1.0" encoding="utf-8"?>
+<p:sld xmlns:a="http://schemas.openxmlformats.org/drawingml/2006/main" xmlns:r="http://schemas.openxmlformats.org/officeDocument/2006/relationships" xmlns:p="http://schemas.openxmlformats.org/presentationml/2006/main">
+  <p:cSld>
+    <p:spTree>
+      <p:nvGrpSpPr>
+        <p:cNvPr id="1" name=""/>
+        <p:cNvGrpSpPr/>
+        <p:nvPr/>
+      </p:nvGrpSpPr>
+      <p:grpSpPr>
+        <a:xfrm>
+          <a:off x="0" y="0"/>
+          <a:ext cx="0" cy="0"/>
+          <a:chOff x="0" y="0"/>
+          <a:chExt cx="0" cy="0"/>
+        </a:xfrm>
+      </p:grpSpPr>
+      <p:sp>
+        <p:nvSpPr>
+          <p:cNvPr id="2" name="Title 1"/>
+          <p:cNvSpPr>
+            <a:spLocks noGrp="1"/>
+          </p:cNvSpPr>
+          <p:nvPr>
+            <p:ph type="title"/>
+          </p:nvPr>
+        </p:nvSpPr>
+        <p:spPr/>
+        <p:txBody>
+          <a:bodyPr/>
+          <a:lstStyle/>
+          <a:p>
+            <a:r>
+              <a:rPr lang="en-US" dirty="0" smtClean="0"/>
+              <a:t>Hypothetical – Anne</a:t>
+            </a:r>
+            <a:endParaRPr lang="en-US" dirty="0"/>
+          </a:p>
+        </p:txBody>
+      </p:sp>
+      <p:sp>
+        <p:nvSpPr>
+          <p:cNvPr id="3" name="Content Placeholder 2"/>
+          <p:cNvSpPr>
+            <a:spLocks noGrp="1"/>
+          </p:cNvSpPr>
+          <p:nvPr>
+            <p:ph idx="1"/>
+          </p:nvPr>
+        </p:nvSpPr>
+        <p:spPr/>
+        <p:txBody>
+          <a:bodyPr>
+            <a:normAutofit fontScale="85000" lnSpcReduction="20000"/>
+          </a:bodyPr>
+          <a:lstStyle/>
+          <a:p>
+            <a:r>
+              <a:rPr lang="en-US" dirty="0" smtClean="0"/>
               <a:t>What if we had more time?</a:t>
             </a:r>
           </a:p>
@@ -5260,11 +6544,19 @@
             <a:pPr lvl="1"/>
             <a:r>
               <a:rPr lang="en-US" dirty="0" smtClean="0"/>
-              <a:t>Improve processing time, design of interface (change color scheme of form), ensure customer </a:t>
-            </a:r>
-            <a:r>
-              <a:rPr lang="en-US" dirty="0" err="1" smtClean="0"/>
-              <a:t>satisfication</a:t>
+              <a:t>Improve processing time, design of interface (change color scheme of </a:t>
+            </a:r>
+            <a:r>
+              <a:rPr lang="en-US" dirty="0" smtClean="0"/>
+              <a:t>form, more feedback from tool), </a:t>
+            </a:r>
+            <a:r>
+              <a:rPr lang="en-US" dirty="0" smtClean="0"/>
+              <a:t>ensure customer </a:t>
+            </a:r>
+            <a:r>
+              <a:rPr lang="en-US" dirty="0" smtClean="0"/>
+              <a:t>satisfaction</a:t>
             </a:r>
             <a:endParaRPr lang="en-US" dirty="0" smtClean="0"/>
           </a:p>
@@ -5278,7 +6570,11 @@
             <a:pPr lvl="1"/>
             <a:r>
               <a:rPr lang="en-US" dirty="0" smtClean="0"/>
-              <a:t>Would start coding sooner</a:t>
+              <a:t>Start coding </a:t>
+            </a:r>
+            <a:r>
+              <a:rPr lang="en-US" dirty="0" smtClean="0"/>
+              <a:t>sooner</a:t>
             </a:r>
           </a:p>
           <a:p>
@@ -5294,16 +6590,11 @@
               <a:rPr lang="en-US" dirty="0" smtClean="0"/>
               <a:t>Interact more with customer</a:t>
             </a:r>
-            <a:endParaRPr lang="en-US" dirty="0" smtClean="0"/>
           </a:p>
           <a:p>
             <a:r>
               <a:rPr lang="en-US" dirty="0" smtClean="0"/>
-              <a:t>What </a:t>
-            </a:r>
-            <a:r>
-              <a:rPr lang="en-US" dirty="0" smtClean="0"/>
-              <a:t>I learned</a:t>
+              <a:t>What I learned</a:t>
             </a:r>
           </a:p>
           <a:p>

</xml_diff>

<commit_message>
Revert "more work on my slides, altered objective gs"
This reverts commit b5ca3c4e0af2030f6bb4a4b9c248ef8488a7725a.
</commit_message>
<xml_diff>
--- a/A Team Documents/Anne's Final Presentation Slides.pptx
+++ b/A Team Documents/Anne's Final Presentation Slides.pptx
@@ -5,19 +5,15 @@
     <p:sldMasterId id="2147483732" r:id="rId1"/>
   </p:sldMasterIdLst>
   <p:notesMasterIdLst>
-    <p:notesMasterId r:id="rId9"/>
+    <p:notesMasterId r:id="rId5"/>
   </p:notesMasterIdLst>
   <p:handoutMasterIdLst>
-    <p:handoutMasterId r:id="rId10"/>
+    <p:handoutMasterId r:id="rId6"/>
   </p:handoutMasterIdLst>
   <p:sldIdLst>
     <p:sldId id="313" r:id="rId2"/>
-    <p:sldId id="319" r:id="rId3"/>
-    <p:sldId id="314" r:id="rId4"/>
-    <p:sldId id="318" r:id="rId5"/>
-    <p:sldId id="320" r:id="rId6"/>
-    <p:sldId id="317" r:id="rId7"/>
-    <p:sldId id="316" r:id="rId8"/>
+    <p:sldId id="314" r:id="rId3"/>
+    <p:sldId id="316" r:id="rId4"/>
   </p:sldIdLst>
   <p:sldSz cx="9144000" cy="6858000" type="screen4x3"/>
   <p:notesSz cx="6858000" cy="9144000"/>
@@ -202,7 +198,7 @@
             <a:fld id="{59E2BC62-7E84-44FB-9A81-3B8AD9AE521B}" type="datetimeFigureOut">
               <a:rPr lang="en-US" smtClean="0"/>
               <a:pPr/>
-              <a:t>5/4/2015</a:t>
+              <a:t>5/3/2015</a:t>
             </a:fld>
             <a:endParaRPr lang="en-US"/>
           </a:p>
@@ -278,7 +274,7 @@
     </p:spTree>
     <p:extLst>
       <p:ext uri="{BB962C8B-B14F-4D97-AF65-F5344CB8AC3E}">
-        <p14:creationId xmlns="" xmlns:p14="http://schemas.microsoft.com/office/powerpoint/2010/main" val="2856711207"/>
+        <p14:creationId xmlns:p14="http://schemas.microsoft.com/office/powerpoint/2010/main" xmlns="" val="2856711207"/>
       </p:ext>
     </p:extLst>
   </p:cSld>
@@ -369,7 +365,7 @@
             <a:fld id="{AC4D07E4-89AF-44D2-9F2F-5F6D2623599A}" type="datetimeFigureOut">
               <a:rPr lang="en-US" smtClean="0"/>
               <a:pPr/>
-              <a:t>5/4/2015</a:t>
+              <a:t>5/3/2015</a:t>
             </a:fld>
             <a:endParaRPr lang="en-US"/>
           </a:p>
@@ -540,7 +536,7 @@
     </p:spTree>
     <p:extLst>
       <p:ext uri="{BB962C8B-B14F-4D97-AF65-F5344CB8AC3E}">
-        <p14:creationId xmlns="" xmlns:p14="http://schemas.microsoft.com/office/powerpoint/2010/main" val="3571335044"/>
+        <p14:creationId xmlns:p14="http://schemas.microsoft.com/office/powerpoint/2010/main" xmlns="" val="3571335044"/>
       </p:ext>
     </p:extLst>
   </p:cSld>
@@ -820,7 +816,7 @@
             <a:fld id="{EC85597E-0796-4D04-ADC8-27184BE37C27}" type="slidenum">
               <a:rPr lang="en-US" smtClean="0"/>
               <a:pPr/>
-              <a:t>3</a:t>
+              <a:t>2</a:t>
             </a:fld>
             <a:endParaRPr lang="en-US"/>
           </a:p>
@@ -1016,7 +1012,7 @@
             <a:fld id="{461E6A8B-52D2-4FB9-BB2D-A053F589DABE}" type="datetimeFigureOut">
               <a:rPr lang="en-US" smtClean="0"/>
               <a:pPr/>
-              <a:t>5/4/2015</a:t>
+              <a:t>5/3/2015</a:t>
             </a:fld>
             <a:endParaRPr lang="en-US" dirty="0"/>
           </a:p>
@@ -1183,7 +1179,7 @@
             <a:fld id="{461E6A8B-52D2-4FB9-BB2D-A053F589DABE}" type="datetimeFigureOut">
               <a:rPr lang="en-US" smtClean="0"/>
               <a:pPr/>
-              <a:t>5/4/2015</a:t>
+              <a:t>5/3/2015</a:t>
             </a:fld>
             <a:endParaRPr lang="en-US"/>
           </a:p>
@@ -1360,7 +1356,7 @@
             <a:fld id="{461E6A8B-52D2-4FB9-BB2D-A053F589DABE}" type="datetimeFigureOut">
               <a:rPr lang="en-US" smtClean="0"/>
               <a:pPr/>
-              <a:t>5/4/2015</a:t>
+              <a:t>5/3/2015</a:t>
             </a:fld>
             <a:endParaRPr lang="en-US"/>
           </a:p>
@@ -1527,7 +1523,7 @@
             <a:fld id="{461E6A8B-52D2-4FB9-BB2D-A053F589DABE}" type="datetimeFigureOut">
               <a:rPr lang="en-US" smtClean="0"/>
               <a:pPr/>
-              <a:t>5/4/2015</a:t>
+              <a:t>5/3/2015</a:t>
             </a:fld>
             <a:endParaRPr lang="en-US"/>
           </a:p>
@@ -1770,7 +1766,7 @@
             <a:fld id="{461E6A8B-52D2-4FB9-BB2D-A053F589DABE}" type="datetimeFigureOut">
               <a:rPr lang="en-US" smtClean="0"/>
               <a:pPr/>
-              <a:t>5/4/2015</a:t>
+              <a:t>5/3/2015</a:t>
             </a:fld>
             <a:endParaRPr lang="en-US"/>
           </a:p>
@@ -2055,7 +2051,7 @@
             <a:fld id="{461E6A8B-52D2-4FB9-BB2D-A053F589DABE}" type="datetimeFigureOut">
               <a:rPr lang="en-US" smtClean="0"/>
               <a:pPr/>
-              <a:t>5/4/2015</a:t>
+              <a:t>5/3/2015</a:t>
             </a:fld>
             <a:endParaRPr lang="en-US"/>
           </a:p>
@@ -2474,7 +2470,7 @@
             <a:fld id="{461E6A8B-52D2-4FB9-BB2D-A053F589DABE}" type="datetimeFigureOut">
               <a:rPr lang="en-US" smtClean="0"/>
               <a:pPr/>
-              <a:t>5/4/2015</a:t>
+              <a:t>5/3/2015</a:t>
             </a:fld>
             <a:endParaRPr lang="en-US"/>
           </a:p>
@@ -2589,7 +2585,7 @@
             <a:fld id="{461E6A8B-52D2-4FB9-BB2D-A053F589DABE}" type="datetimeFigureOut">
               <a:rPr lang="en-US" smtClean="0"/>
               <a:pPr/>
-              <a:t>5/4/2015</a:t>
+              <a:t>5/3/2015</a:t>
             </a:fld>
             <a:endParaRPr lang="en-US"/>
           </a:p>
@@ -2681,7 +2677,7 @@
             <a:fld id="{461E6A8B-52D2-4FB9-BB2D-A053F589DABE}" type="datetimeFigureOut">
               <a:rPr lang="en-US" smtClean="0"/>
               <a:pPr/>
-              <a:t>5/4/2015</a:t>
+              <a:t>5/3/2015</a:t>
             </a:fld>
             <a:endParaRPr lang="en-US"/>
           </a:p>
@@ -2955,7 +2951,7 @@
             <a:fld id="{461E6A8B-52D2-4FB9-BB2D-A053F589DABE}" type="datetimeFigureOut">
               <a:rPr lang="en-US" smtClean="0"/>
               <a:pPr/>
-              <a:t>5/4/2015</a:t>
+              <a:t>5/3/2015</a:t>
             </a:fld>
             <a:endParaRPr lang="en-US"/>
           </a:p>
@@ -3205,7 +3201,7 @@
             <a:fld id="{461E6A8B-52D2-4FB9-BB2D-A053F589DABE}" type="datetimeFigureOut">
               <a:rPr lang="en-US" smtClean="0"/>
               <a:pPr/>
-              <a:t>5/4/2015</a:t>
+              <a:t>5/3/2015</a:t>
             </a:fld>
             <a:endParaRPr lang="en-US"/>
           </a:p>
@@ -3433,7 +3429,7 @@
             <a:fld id="{461E6A8B-52D2-4FB9-BB2D-A053F589DABE}" type="datetimeFigureOut">
               <a:rPr lang="en-US" smtClean="0"/>
               <a:pPr/>
-              <a:t>5/4/2015</a:t>
+              <a:t>5/3/2015</a:t>
             </a:fld>
             <a:endParaRPr lang="en-US"/>
           </a:p>
@@ -5025,68 +5021,164 @@
           <a:p>
             <a:r>
               <a:rPr lang="en-US" dirty="0" smtClean="0"/>
-              <a:t>Proof in the Results</a:t>
+              <a:t>Test Report</a:t>
             </a:r>
             <a:endParaRPr lang="en-US" dirty="0"/>
           </a:p>
         </p:txBody>
       </p:sp>
-      <p:pic>
-        <p:nvPicPr>
-          <p:cNvPr id="5" name="TestDataVideo.mp4">
-            <a:hlinkClick r:id="" action="ppaction://media"/>
-          </p:cNvPr>
-          <p:cNvPicPr>
-            <a:picLocks noRot="1" noChangeAspect="1"/>
-          </p:cNvPicPr>
-          <p:nvPr>
-            <a:videoFile r:link="rId1"/>
-          </p:nvPr>
-        </p:nvPicPr>
-        <p:blipFill>
-          <a:blip r:embed="rId4" cstate="print"/>
-          <a:stretch>
-            <a:fillRect/>
-          </a:stretch>
-        </p:blipFill>
-        <p:spPr>
-          <a:xfrm>
-            <a:off x="0" y="1905000"/>
-            <a:ext cx="4495800" cy="3371850"/>
-          </a:xfrm>
-          <a:prstGeom prst="rect">
-            <a:avLst/>
-          </a:prstGeom>
-        </p:spPr>
-      </p:pic>
-      <p:pic>
-        <p:nvPicPr>
-          <p:cNvPr id="6" name="TestDataProcessedVideo.mp4">
-            <a:hlinkClick r:id="" action="ppaction://media"/>
-          </p:cNvPr>
-          <p:cNvPicPr>
-            <a:picLocks noRot="1" noChangeAspect="1"/>
-          </p:cNvPicPr>
-          <p:nvPr>
-            <a:videoFile r:link="rId2"/>
-          </p:nvPr>
-        </p:nvPicPr>
-        <p:blipFill>
-          <a:blip r:embed="rId4" cstate="print"/>
-          <a:stretch>
-            <a:fillRect/>
-          </a:stretch>
-        </p:blipFill>
-        <p:spPr>
-          <a:xfrm>
-            <a:off x="4648200" y="1905000"/>
-            <a:ext cx="4495800" cy="3371850"/>
-          </a:xfrm>
-          <a:prstGeom prst="rect">
-            <a:avLst/>
-          </a:prstGeom>
-        </p:spPr>
-      </p:pic>
+      <p:sp>
+        <p:nvSpPr>
+          <p:cNvPr id="5" name="Text Placeholder 4"/>
+          <p:cNvSpPr>
+            <a:spLocks noGrp="1"/>
+          </p:cNvSpPr>
+          <p:nvPr>
+            <p:ph type="body" idx="1"/>
+          </p:nvPr>
+        </p:nvSpPr>
+        <p:spPr/>
+        <p:txBody>
+          <a:bodyPr>
+            <a:normAutofit fontScale="92500"/>
+          </a:bodyPr>
+          <a:lstStyle/>
+          <a:p>
+            <a:r>
+              <a:rPr lang="en-US" dirty="0" smtClean="0"/>
+              <a:t>Deviations from Requirements</a:t>
+            </a:r>
+            <a:endParaRPr lang="en-US" dirty="0"/>
+          </a:p>
+        </p:txBody>
+      </p:sp>
+      <p:sp>
+        <p:nvSpPr>
+          <p:cNvPr id="6" name="Content Placeholder 5"/>
+          <p:cNvSpPr>
+            <a:spLocks noGrp="1"/>
+          </p:cNvSpPr>
+          <p:nvPr>
+            <p:ph sz="half" idx="2"/>
+          </p:nvPr>
+        </p:nvSpPr>
+        <p:spPr/>
+        <p:txBody>
+          <a:bodyPr>
+            <a:normAutofit fontScale="92500"/>
+          </a:bodyPr>
+          <a:lstStyle/>
+          <a:p>
+            <a:r>
+              <a:rPr lang="en-US" dirty="0" smtClean="0"/>
+              <a:t>Efficiency may not be improved </a:t>
+            </a:r>
+          </a:p>
+          <a:p>
+            <a:pPr lvl="1"/>
+            <a:r>
+              <a:rPr lang="en-US" dirty="0" smtClean="0"/>
+              <a:t>Processing time up to 2.5x longer </a:t>
+            </a:r>
+            <a:r>
+              <a:rPr lang="en-US" dirty="0" err="1" smtClean="0"/>
+              <a:t>vs</a:t>
+            </a:r>
+            <a:r>
+              <a:rPr lang="en-US" dirty="0" smtClean="0"/>
+              <a:t> Version 1.0</a:t>
+            </a:r>
+          </a:p>
+          <a:p>
+            <a:pPr lvl="1"/>
+            <a:r>
+              <a:rPr lang="en-US" dirty="0" smtClean="0"/>
+              <a:t>From ~1 min to ~2 min</a:t>
+            </a:r>
+          </a:p>
+          <a:p>
+            <a:pPr lvl="1"/>
+            <a:r>
+              <a:rPr lang="en-US" dirty="0" smtClean="0"/>
+              <a:t>But more robust, accurate</a:t>
+            </a:r>
+          </a:p>
+          <a:p>
+            <a:r>
+              <a:rPr lang="en-US" dirty="0" smtClean="0"/>
+              <a:t>Determined location of needle/ratchet for each image</a:t>
+            </a:r>
+          </a:p>
+          <a:p>
+            <a:pPr lvl="1"/>
+            <a:r>
+              <a:rPr lang="en-US" dirty="0" smtClean="0"/>
+              <a:t>No need for consideration of camera position – can safely assume is constant</a:t>
+            </a:r>
+          </a:p>
+          <a:p>
+            <a:endParaRPr lang="en-US" dirty="0"/>
+          </a:p>
+        </p:txBody>
+      </p:sp>
+      <p:sp>
+        <p:nvSpPr>
+          <p:cNvPr id="7" name="Text Placeholder 6"/>
+          <p:cNvSpPr>
+            <a:spLocks noGrp="1"/>
+          </p:cNvSpPr>
+          <p:nvPr>
+            <p:ph type="body" sz="quarter" idx="3"/>
+          </p:nvPr>
+        </p:nvSpPr>
+        <p:spPr/>
+        <p:txBody>
+          <a:bodyPr/>
+          <a:lstStyle/>
+          <a:p>
+            <a:r>
+              <a:rPr lang="en-US" dirty="0" smtClean="0"/>
+              <a:t>Known problems</a:t>
+            </a:r>
+            <a:endParaRPr lang="en-US" dirty="0"/>
+          </a:p>
+        </p:txBody>
+      </p:sp>
+      <p:sp>
+        <p:nvSpPr>
+          <p:cNvPr id="8" name="Content Placeholder 7"/>
+          <p:cNvSpPr>
+            <a:spLocks noGrp="1"/>
+          </p:cNvSpPr>
+          <p:nvPr>
+            <p:ph sz="quarter" idx="4"/>
+          </p:nvPr>
+        </p:nvSpPr>
+        <p:spPr/>
+        <p:txBody>
+          <a:bodyPr/>
+          <a:lstStyle/>
+          <a:p>
+            <a:r>
+              <a:rPr lang="en-US" dirty="0" smtClean="0"/>
+              <a:t>Run – Stop – Run again sequence may interrupt thread processes – cause crash</a:t>
+            </a:r>
+          </a:p>
+          <a:p>
+            <a:r>
+              <a:rPr lang="en-US" dirty="0" smtClean="0"/>
+              <a:t>Similar issue with Exiting Tool during IO</a:t>
+            </a:r>
+          </a:p>
+          <a:p>
+            <a:r>
+              <a:rPr lang="en-US" dirty="0" smtClean="0"/>
+              <a:t>Base/Needle height may not be measured accurately, will affect results</a:t>
+            </a:r>
+            <a:endParaRPr lang="en-US" dirty="0"/>
+          </a:p>
+        </p:txBody>
+      </p:sp>
     </p:spTree>
   </p:cSld>
   <p:clrMapOvr>
@@ -5095,258 +5187,7 @@
   <p:timing>
     <p:tnLst>
       <p:par>
-        <p:cTn id="1" dur="indefinite" restart="never" nodeType="tmRoot">
-          <p:childTnLst>
-            <p:seq concurrent="1" nextAc="seek">
-              <p:cTn id="2" dur="indefinite" nodeType="mainSeq">
-                <p:childTnLst>
-                  <p:par>
-                    <p:cTn id="3" fill="hold">
-                      <p:stCondLst>
-                        <p:cond delay="indefinite"/>
-                        <p:cond evt="onBegin" delay="0">
-                          <p:tn val="2"/>
-                        </p:cond>
-                      </p:stCondLst>
-                      <p:childTnLst>
-                        <p:par>
-                          <p:cTn id="4" fill="hold">
-                            <p:stCondLst>
-                              <p:cond delay="0"/>
-                            </p:stCondLst>
-                            <p:childTnLst>
-                              <p:par>
-                                <p:cTn id="5" presetID="1" presetClass="mediacall" presetSubtype="0" fill="hold" nodeType="afterEffect">
-                                  <p:stCondLst>
-                                    <p:cond delay="0"/>
-                                  </p:stCondLst>
-                                  <p:childTnLst>
-                                    <p:cmd type="call" cmd="playFrom(0.0)">
-                                      <p:cBhvr>
-                                        <p:cTn id="6" dur="1" fill="hold"/>
-                                        <p:tgtEl>
-                                          <p:spTgt spid="5"/>
-                                        </p:tgtEl>
-                                      </p:cBhvr>
-                                    </p:cmd>
-                                  </p:childTnLst>
-                                </p:cTn>
-                              </p:par>
-                            </p:childTnLst>
-                          </p:cTn>
-                        </p:par>
-                        <p:par>
-                          <p:cTn id="7" fill="hold">
-                            <p:stCondLst>
-                              <p:cond delay="0"/>
-                            </p:stCondLst>
-                            <p:childTnLst>
-                              <p:par>
-                                <p:cTn id="8" presetID="1" presetClass="mediacall" presetSubtype="0" fill="hold" nodeType="afterEffect">
-                                  <p:stCondLst>
-                                    <p:cond delay="0"/>
-                                  </p:stCondLst>
-                                  <p:childTnLst>
-                                    <p:cmd type="call" cmd="playFrom(0.0)">
-                                      <p:cBhvr>
-                                        <p:cTn id="9" dur="1" fill="hold"/>
-                                        <p:tgtEl>
-                                          <p:spTgt spid="6"/>
-                                        </p:tgtEl>
-                                      </p:cBhvr>
-                                    </p:cmd>
-                                  </p:childTnLst>
-                                </p:cTn>
-                              </p:par>
-                            </p:childTnLst>
-                          </p:cTn>
-                        </p:par>
-                      </p:childTnLst>
-                    </p:cTn>
-                  </p:par>
-                </p:childTnLst>
-              </p:cTn>
-              <p:prevCondLst>
-                <p:cond evt="onPrev" delay="0">
-                  <p:tgtEl>
-                    <p:sldTgt/>
-                  </p:tgtEl>
-                </p:cond>
-              </p:prevCondLst>
-              <p:nextCondLst>
-                <p:cond evt="onNext" delay="0">
-                  <p:tgtEl>
-                    <p:sldTgt/>
-                  </p:tgtEl>
-                </p:cond>
-              </p:nextCondLst>
-            </p:seq>
-            <p:video>
-              <p:cMediaNode>
-                <p:cTn id="10" fill="hold" display="0">
-                  <p:stCondLst>
-                    <p:cond delay="indefinite"/>
-                  </p:stCondLst>
-                  <p:endCondLst>
-                    <p:cond evt="onNext" delay="0">
-                      <p:tgtEl>
-                        <p:sldTgt/>
-                      </p:tgtEl>
-                    </p:cond>
-                    <p:cond evt="onPrev" delay="0">
-                      <p:tgtEl>
-                        <p:sldTgt/>
-                      </p:tgtEl>
-                    </p:cond>
-                  </p:endCondLst>
-                </p:cTn>
-                <p:tgtEl>
-                  <p:spTgt spid="5"/>
-                </p:tgtEl>
-              </p:cMediaNode>
-            </p:video>
-            <p:seq concurrent="1" nextAc="seek">
-              <p:cTn id="11" restart="whenNotActive" fill="hold" evtFilter="cancelBubble" nodeType="interactiveSeq">
-                <p:stCondLst>
-                  <p:cond evt="onClick" delay="0">
-                    <p:tgtEl>
-                      <p:spTgt spid="5"/>
-                    </p:tgtEl>
-                  </p:cond>
-                </p:stCondLst>
-                <p:endSync evt="end" delay="0">
-                  <p:rtn val="all"/>
-                </p:endSync>
-                <p:childTnLst>
-                  <p:par>
-                    <p:cTn id="12" fill="hold">
-                      <p:stCondLst>
-                        <p:cond delay="0"/>
-                      </p:stCondLst>
-                      <p:childTnLst>
-                        <p:par>
-                          <p:cTn id="13" fill="hold">
-                            <p:stCondLst>
-                              <p:cond delay="0"/>
-                            </p:stCondLst>
-                            <p:childTnLst>
-                              <p:par>
-                                <p:cTn id="14" presetID="2" presetClass="mediacall" presetSubtype="0" fill="hold" nodeType="clickEffect">
-                                  <p:stCondLst>
-                                    <p:cond delay="0"/>
-                                  </p:stCondLst>
-                                  <p:childTnLst>
-                                    <p:cmd type="call" cmd="togglePause">
-                                      <p:cBhvr>
-                                        <p:cTn id="15" dur="1" fill="hold"/>
-                                        <p:tgtEl>
-                                          <p:spTgt spid="5"/>
-                                        </p:tgtEl>
-                                      </p:cBhvr>
-                                    </p:cmd>
-                                  </p:childTnLst>
-                                </p:cTn>
-                              </p:par>
-                            </p:childTnLst>
-                          </p:cTn>
-                        </p:par>
-                      </p:childTnLst>
-                    </p:cTn>
-                  </p:par>
-                </p:childTnLst>
-              </p:cTn>
-              <p:nextCondLst>
-                <p:cond evt="onClick" delay="0">
-                  <p:tgtEl>
-                    <p:spTgt spid="5"/>
-                  </p:tgtEl>
-                </p:cond>
-              </p:nextCondLst>
-            </p:seq>
-            <p:video>
-              <p:cMediaNode>
-                <p:cTn id="16" fill="hold" display="0">
-                  <p:stCondLst>
-                    <p:cond delay="indefinite"/>
-                  </p:stCondLst>
-                  <p:endCondLst>
-                    <p:cond evt="onNext" delay="0">
-                      <p:tgtEl>
-                        <p:sldTgt/>
-                      </p:tgtEl>
-                    </p:cond>
-                    <p:cond evt="onPrev" delay="0">
-                      <p:tgtEl>
-                        <p:sldTgt/>
-                      </p:tgtEl>
-                    </p:cond>
-                  </p:endCondLst>
-                </p:cTn>
-                <p:tgtEl>
-                  <p:spTgt spid="6"/>
-                </p:tgtEl>
-              </p:cMediaNode>
-            </p:video>
-            <p:seq concurrent="1" nextAc="seek">
-              <p:cTn id="17" restart="whenNotActive" fill="hold" evtFilter="cancelBubble" nodeType="interactiveSeq">
-                <p:stCondLst>
-                  <p:cond evt="onClick" delay="0">
-                    <p:tgtEl>
-                      <p:spTgt spid="6"/>
-                    </p:tgtEl>
-                  </p:cond>
-                </p:stCondLst>
-                <p:endSync evt="end" delay="0">
-                  <p:rtn val="all"/>
-                </p:endSync>
-                <p:childTnLst>
-                  <p:par>
-                    <p:cTn id="18" fill="hold">
-                      <p:stCondLst>
-                        <p:cond delay="0"/>
-                      </p:stCondLst>
-                      <p:childTnLst>
-                        <p:par>
-                          <p:cTn id="19" fill="hold">
-                            <p:stCondLst>
-                              <p:cond delay="0"/>
-                            </p:stCondLst>
-                            <p:childTnLst>
-                              <p:par>
-                                <p:cTn id="20" presetID="2" presetClass="mediacall" presetSubtype="0" fill="hold" nodeType="clickEffect">
-                                  <p:stCondLst>
-                                    <p:cond delay="0"/>
-                                  </p:stCondLst>
-                                  <p:childTnLst>
-                                    <p:cmd type="call" cmd="togglePause">
-                                      <p:cBhvr>
-                                        <p:cTn id="21" dur="1" fill="hold"/>
-                                        <p:tgtEl>
-                                          <p:spTgt spid="6"/>
-                                        </p:tgtEl>
-                                      </p:cBhvr>
-                                    </p:cmd>
-                                  </p:childTnLst>
-                                </p:cTn>
-                              </p:par>
-                            </p:childTnLst>
-                          </p:cTn>
-                        </p:par>
-                      </p:childTnLst>
-                    </p:cTn>
-                  </p:par>
-                </p:childTnLst>
-              </p:cTn>
-              <p:nextCondLst>
-                <p:cond evt="onClick" delay="0">
-                  <p:tgtEl>
-                    <p:spTgt spid="6"/>
-                  </p:tgtEl>
-                </p:cond>
-              </p:nextCondLst>
-            </p:seq>
-          </p:childTnLst>
-        </p:cTn>
+        <p:cTn id="1" dur="indefinite" restart="never" nodeType="tmRoot"/>
       </p:par>
     </p:tnLst>
   </p:timing>
@@ -5382,1181 +5223,48 @@
         </p:nvSpPr>
         <p:spPr/>
         <p:txBody>
+          <a:bodyPr/>
+          <a:lstStyle/>
+          <a:p>
+            <a:r>
+              <a:rPr lang="en-US" dirty="0" smtClean="0"/>
+              <a:t>Hypothetical – Anne</a:t>
+            </a:r>
+            <a:endParaRPr lang="en-US" dirty="0"/>
+          </a:p>
+        </p:txBody>
+      </p:sp>
+      <p:sp>
+        <p:nvSpPr>
+          <p:cNvPr id="3" name="Content Placeholder 2"/>
+          <p:cNvSpPr>
+            <a:spLocks noGrp="1"/>
+          </p:cNvSpPr>
+          <p:nvPr>
+            <p:ph idx="1"/>
+          </p:nvPr>
+        </p:nvSpPr>
+        <p:spPr/>
+        <p:txBody>
           <a:bodyPr>
-            <a:normAutofit fontScale="90000"/>
+            <a:normAutofit fontScale="92500" lnSpcReduction="20000"/>
           </a:bodyPr>
           <a:lstStyle/>
           <a:p>
             <a:r>
               <a:rPr lang="en-US" dirty="0" smtClean="0"/>
-              <a:t>Test Report – Unsatisfied Requirements</a:t>
-            </a:r>
-            <a:endParaRPr lang="en-US" dirty="0"/>
-          </a:p>
-        </p:txBody>
-      </p:sp>
-      <p:sp>
-        <p:nvSpPr>
-          <p:cNvPr id="6" name="Content Placeholder 5"/>
-          <p:cNvSpPr>
-            <a:spLocks noGrp="1"/>
-          </p:cNvSpPr>
-          <p:nvPr>
-            <p:ph sz="half" idx="1"/>
-          </p:nvPr>
-        </p:nvSpPr>
-        <p:spPr>
-          <a:xfrm>
-            <a:off x="457200" y="1905001"/>
-            <a:ext cx="4724400" cy="4114800"/>
-          </a:xfrm>
-        </p:spPr>
-        <p:txBody>
-          <a:bodyPr>
-            <a:normAutofit/>
-          </a:bodyPr>
-          <a:lstStyle/>
-          <a:p>
+              <a:t>What if we had more time?</a:t>
+            </a:r>
+          </a:p>
+          <a:p>
+            <a:pPr lvl="1"/>
             <a:r>
               <a:rPr lang="en-US" dirty="0" smtClean="0"/>
-              <a:t>Efficiency may not be improved </a:t>
-            </a:r>
-          </a:p>
-          <a:p>
-            <a:pPr lvl="1"/>
-            <a:r>
-              <a:rPr lang="en-US" dirty="0" smtClean="0"/>
-              <a:t>Processing time up to 2.5x longer </a:t>
+              <a:t>Improve processing time, design of interface (change color scheme of form), ensure customer </a:t>
             </a:r>
             <a:r>
               <a:rPr lang="en-US" dirty="0" err="1" smtClean="0"/>
-              <a:t>vs</a:t>
-            </a:r>
-            <a:r>
-              <a:rPr lang="en-US" dirty="0" smtClean="0"/>
-              <a:t> Version 1.0</a:t>
-            </a:r>
-          </a:p>
-          <a:p>
-            <a:pPr lvl="1"/>
-            <a:r>
-              <a:rPr lang="en-US" dirty="0" smtClean="0"/>
-              <a:t>From ~1 min to ~2 min</a:t>
-            </a:r>
-          </a:p>
-          <a:p>
-            <a:pPr lvl="1"/>
-            <a:r>
-              <a:rPr lang="en-US" dirty="0" smtClean="0"/>
-              <a:t>But more robust, accurate</a:t>
-            </a:r>
-          </a:p>
-          <a:p>
-            <a:r>
-              <a:rPr lang="en-US" dirty="0" smtClean="0"/>
-              <a:t>Excel table lacks the “frame number”</a:t>
-            </a:r>
-            <a:endParaRPr lang="en-US" dirty="0"/>
-          </a:p>
-        </p:txBody>
-      </p:sp>
-      <p:pic>
-        <p:nvPicPr>
-          <p:cNvPr id="1032" name="Picture 8"/>
-          <p:cNvPicPr>
-            <a:picLocks noChangeAspect="1" noChangeArrowheads="1"/>
-          </p:cNvPicPr>
-          <p:nvPr/>
-        </p:nvPicPr>
-        <p:blipFill>
-          <a:blip r:embed="rId3" cstate="print"/>
-          <a:srcRect/>
-          <a:stretch>
-            <a:fillRect/>
-          </a:stretch>
-        </p:blipFill>
-        <p:spPr bwMode="auto">
-          <a:xfrm>
-            <a:off x="5638800" y="2133600"/>
-            <a:ext cx="1200150" cy="2847415"/>
-          </a:xfrm>
-          <a:prstGeom prst="rect">
-            <a:avLst/>
-          </a:prstGeom>
-          <a:noFill/>
-          <a:ln w="9525">
-            <a:noFill/>
-            <a:miter lim="800000"/>
-            <a:headEnd/>
-            <a:tailEnd/>
-          </a:ln>
-        </p:spPr>
-      </p:pic>
-      <p:pic>
-        <p:nvPicPr>
-          <p:cNvPr id="1033" name="Picture 9"/>
-          <p:cNvPicPr>
-            <a:picLocks noChangeAspect="1" noChangeArrowheads="1"/>
-          </p:cNvPicPr>
-          <p:nvPr/>
-        </p:nvPicPr>
-        <p:blipFill>
-          <a:blip r:embed="rId4" cstate="print"/>
-          <a:srcRect/>
-          <a:stretch>
-            <a:fillRect/>
-          </a:stretch>
-        </p:blipFill>
-        <p:spPr bwMode="auto">
-          <a:xfrm>
-            <a:off x="7565984" y="2057401"/>
-            <a:ext cx="749341" cy="2895600"/>
-          </a:xfrm>
-          <a:prstGeom prst="rect">
-            <a:avLst/>
-          </a:prstGeom>
-          <a:noFill/>
-          <a:ln w="9525">
-            <a:noFill/>
-            <a:miter lim="800000"/>
-            <a:headEnd/>
-            <a:tailEnd/>
-          </a:ln>
-        </p:spPr>
-      </p:pic>
-    </p:spTree>
-  </p:cSld>
-  <p:clrMapOvr>
-    <a:masterClrMapping/>
-  </p:clrMapOvr>
-  <p:timing>
-    <p:tnLst>
-      <p:par>
-        <p:cTn id="1" dur="indefinite" restart="never" nodeType="tmRoot"/>
-      </p:par>
-    </p:tnLst>
-  </p:timing>
-</p:sld>
-</file>
-
-<file path=ppt/slides/slide4.xml><?xml version="1.0" encoding="utf-8"?>
-<p:sld xmlns:a="http://schemas.openxmlformats.org/drawingml/2006/main" xmlns:r="http://schemas.openxmlformats.org/officeDocument/2006/relationships" xmlns:p="http://schemas.openxmlformats.org/presentationml/2006/main">
-  <p:cSld>
-    <p:spTree>
-      <p:nvGrpSpPr>
-        <p:cNvPr id="1" name=""/>
-        <p:cNvGrpSpPr/>
-        <p:nvPr/>
-      </p:nvGrpSpPr>
-      <p:grpSpPr>
-        <a:xfrm>
-          <a:off x="0" y="0"/>
-          <a:ext cx="0" cy="0"/>
-          <a:chOff x="0" y="0"/>
-          <a:chExt cx="0" cy="0"/>
-        </a:xfrm>
-      </p:grpSpPr>
-      <p:sp>
-        <p:nvSpPr>
-          <p:cNvPr id="2" name="Title 1"/>
-          <p:cNvSpPr>
-            <a:spLocks noGrp="1"/>
-          </p:cNvSpPr>
-          <p:nvPr>
-            <p:ph type="title"/>
-          </p:nvPr>
-        </p:nvSpPr>
-        <p:spPr/>
-        <p:txBody>
-          <a:bodyPr>
-            <a:normAutofit fontScale="90000"/>
-          </a:bodyPr>
-          <a:lstStyle/>
-          <a:p>
-            <a:r>
-              <a:rPr lang="en-US" dirty="0" smtClean="0"/>
-              <a:t>Test Report – Satisfied Requirements</a:t>
-            </a:r>
-            <a:endParaRPr lang="en-US" dirty="0"/>
-          </a:p>
-        </p:txBody>
-      </p:sp>
-      <p:sp>
-        <p:nvSpPr>
-          <p:cNvPr id="3" name="Content Placeholder 2"/>
-          <p:cNvSpPr>
-            <a:spLocks noGrp="1"/>
-          </p:cNvSpPr>
-          <p:nvPr>
-            <p:ph idx="1"/>
-          </p:nvPr>
-        </p:nvSpPr>
-        <p:spPr>
-          <a:xfrm>
-            <a:off x="1295400" y="1447800"/>
-            <a:ext cx="7391400" cy="4724400"/>
-          </a:xfrm>
-        </p:spPr>
-        <p:txBody>
-          <a:bodyPr>
-            <a:normAutofit/>
-          </a:bodyPr>
-          <a:lstStyle/>
-          <a:p>
-            <a:pPr>
-              <a:buNone/>
-            </a:pPr>
-            <a:r>
-              <a:rPr lang="en-US" sz="2800" dirty="0" smtClean="0"/>
-              <a:t>Tracks the location of drop by following </a:t>
-            </a:r>
-            <a:r>
-              <a:rPr lang="en-US" sz="2800" dirty="0" err="1" smtClean="0"/>
-              <a:t>centroid</a:t>
-            </a:r>
-            <a:endParaRPr lang="en-US" sz="2800" dirty="0" smtClean="0"/>
-          </a:p>
-          <a:p>
-            <a:pPr>
-              <a:buNone/>
-            </a:pPr>
-            <a:r>
-              <a:rPr lang="en-US" sz="2800" dirty="0" smtClean="0"/>
-              <a:t>Determines location of needle/base automatically – able to fine tune</a:t>
-            </a:r>
-          </a:p>
-          <a:p>
-            <a:pPr>
-              <a:buNone/>
-            </a:pPr>
-            <a:r>
-              <a:rPr lang="en-US" sz="2800" dirty="0" smtClean="0"/>
-              <a:t>Does not require base image</a:t>
-            </a:r>
-          </a:p>
-          <a:p>
-            <a:pPr>
-              <a:buNone/>
-            </a:pPr>
-            <a:r>
-              <a:rPr lang="en-US" sz="2800" dirty="0" smtClean="0"/>
-              <a:t>Obtains volume and all required kinematics</a:t>
-            </a:r>
-          </a:p>
-          <a:p>
-            <a:pPr>
-              <a:buNone/>
-            </a:pPr>
-            <a:r>
-              <a:rPr lang="en-US" sz="2800" dirty="0" smtClean="0"/>
-              <a:t>Outputs to Excel</a:t>
-            </a:r>
-          </a:p>
-          <a:p>
-            <a:pPr>
-              <a:buNone/>
-            </a:pPr>
-            <a:r>
-              <a:rPr lang="en-US" sz="2800" dirty="0" smtClean="0"/>
-              <a:t>Generates plots as a function of time</a:t>
-            </a:r>
-          </a:p>
-          <a:p>
-            <a:pPr>
-              <a:buNone/>
-            </a:pPr>
-            <a:r>
-              <a:rPr lang="en-US" sz="2800" dirty="0" smtClean="0"/>
-              <a:t>Is Repeatable –successful for 3+  experimental sequences</a:t>
-            </a:r>
-          </a:p>
-        </p:txBody>
-      </p:sp>
-      <p:pic>
-        <p:nvPicPr>
-          <p:cNvPr id="3076" name="Picture 4" descr="http://pixabay.com/static/uploads/photo/2014/04/02/10/12/checkbox-303113_640.png"/>
-          <p:cNvPicPr>
-            <a:picLocks noChangeAspect="1" noChangeArrowheads="1"/>
-          </p:cNvPicPr>
-          <p:nvPr/>
-        </p:nvPicPr>
-        <p:blipFill>
-          <a:blip r:embed="rId2" cstate="print"/>
-          <a:srcRect/>
-          <a:stretch>
-            <a:fillRect/>
-          </a:stretch>
-        </p:blipFill>
-        <p:spPr bwMode="auto">
-          <a:xfrm>
-            <a:off x="685800" y="1525442"/>
-            <a:ext cx="457200" cy="461528"/>
-          </a:xfrm>
-          <a:prstGeom prst="rect">
-            <a:avLst/>
-          </a:prstGeom>
-          <a:noFill/>
-        </p:spPr>
-      </p:pic>
-      <p:pic>
-        <p:nvPicPr>
-          <p:cNvPr id="8" name="Picture 4" descr="http://pixabay.com/static/uploads/photo/2014/04/02/10/12/checkbox-303113_640.png"/>
-          <p:cNvPicPr>
-            <a:picLocks noChangeAspect="1" noChangeArrowheads="1"/>
-          </p:cNvPicPr>
-          <p:nvPr/>
-        </p:nvPicPr>
-        <p:blipFill>
-          <a:blip r:embed="rId2" cstate="print"/>
-          <a:srcRect/>
-          <a:stretch>
-            <a:fillRect/>
-          </a:stretch>
-        </p:blipFill>
-        <p:spPr bwMode="auto">
-          <a:xfrm>
-            <a:off x="685800" y="2057400"/>
-            <a:ext cx="457200" cy="461528"/>
-          </a:xfrm>
-          <a:prstGeom prst="rect">
-            <a:avLst/>
-          </a:prstGeom>
-          <a:noFill/>
-        </p:spPr>
-      </p:pic>
-      <p:pic>
-        <p:nvPicPr>
-          <p:cNvPr id="9" name="Picture 4" descr="http://pixabay.com/static/uploads/photo/2014/04/02/10/12/checkbox-303113_640.png"/>
-          <p:cNvPicPr>
-            <a:picLocks noChangeAspect="1" noChangeArrowheads="1"/>
-          </p:cNvPicPr>
-          <p:nvPr/>
-        </p:nvPicPr>
-        <p:blipFill>
-          <a:blip r:embed="rId2" cstate="print"/>
-          <a:srcRect/>
-          <a:stretch>
-            <a:fillRect/>
-          </a:stretch>
-        </p:blipFill>
-        <p:spPr bwMode="auto">
-          <a:xfrm>
-            <a:off x="685800" y="2973242"/>
-            <a:ext cx="457200" cy="461528"/>
-          </a:xfrm>
-          <a:prstGeom prst="rect">
-            <a:avLst/>
-          </a:prstGeom>
-          <a:noFill/>
-        </p:spPr>
-      </p:pic>
-      <p:pic>
-        <p:nvPicPr>
-          <p:cNvPr id="10" name="Picture 4" descr="http://pixabay.com/static/uploads/photo/2014/04/02/10/12/checkbox-303113_640.png"/>
-          <p:cNvPicPr>
-            <a:picLocks noChangeAspect="1" noChangeArrowheads="1"/>
-          </p:cNvPicPr>
-          <p:nvPr/>
-        </p:nvPicPr>
-        <p:blipFill>
-          <a:blip r:embed="rId2" cstate="print"/>
-          <a:srcRect/>
-          <a:stretch>
-            <a:fillRect/>
-          </a:stretch>
-        </p:blipFill>
-        <p:spPr bwMode="auto">
-          <a:xfrm>
-            <a:off x="685800" y="3429000"/>
-            <a:ext cx="457200" cy="461528"/>
-          </a:xfrm>
-          <a:prstGeom prst="rect">
-            <a:avLst/>
-          </a:prstGeom>
-          <a:noFill/>
-        </p:spPr>
-      </p:pic>
-      <p:pic>
-        <p:nvPicPr>
-          <p:cNvPr id="11" name="Picture 4" descr="http://pixabay.com/static/uploads/photo/2014/04/02/10/12/checkbox-303113_640.png"/>
-          <p:cNvPicPr>
-            <a:picLocks noChangeAspect="1" noChangeArrowheads="1"/>
-          </p:cNvPicPr>
-          <p:nvPr/>
-        </p:nvPicPr>
-        <p:blipFill>
-          <a:blip r:embed="rId2" cstate="print"/>
-          <a:srcRect/>
-          <a:stretch>
-            <a:fillRect/>
-          </a:stretch>
-        </p:blipFill>
-        <p:spPr bwMode="auto">
-          <a:xfrm>
-            <a:off x="685800" y="3962400"/>
-            <a:ext cx="457200" cy="461528"/>
-          </a:xfrm>
-          <a:prstGeom prst="rect">
-            <a:avLst/>
-          </a:prstGeom>
-          <a:noFill/>
-        </p:spPr>
-      </p:pic>
-      <p:pic>
-        <p:nvPicPr>
-          <p:cNvPr id="12" name="Picture 4" descr="http://pixabay.com/static/uploads/photo/2014/04/02/10/12/checkbox-303113_640.png"/>
-          <p:cNvPicPr>
-            <a:picLocks noChangeAspect="1" noChangeArrowheads="1"/>
-          </p:cNvPicPr>
-          <p:nvPr/>
-        </p:nvPicPr>
-        <p:blipFill>
-          <a:blip r:embed="rId2" cstate="print"/>
-          <a:srcRect/>
-          <a:stretch>
-            <a:fillRect/>
-          </a:stretch>
-        </p:blipFill>
-        <p:spPr bwMode="auto">
-          <a:xfrm>
-            <a:off x="685800" y="4494358"/>
-            <a:ext cx="457200" cy="461528"/>
-          </a:xfrm>
-          <a:prstGeom prst="rect">
-            <a:avLst/>
-          </a:prstGeom>
-          <a:noFill/>
-        </p:spPr>
-      </p:pic>
-      <p:pic>
-        <p:nvPicPr>
-          <p:cNvPr id="13" name="Picture 4" descr="http://pixabay.com/static/uploads/photo/2014/04/02/10/12/checkbox-303113_640.png"/>
-          <p:cNvPicPr>
-            <a:picLocks noChangeAspect="1" noChangeArrowheads="1"/>
-          </p:cNvPicPr>
-          <p:nvPr/>
-        </p:nvPicPr>
-        <p:blipFill>
-          <a:blip r:embed="rId2" cstate="print"/>
-          <a:srcRect/>
-          <a:stretch>
-            <a:fillRect/>
-          </a:stretch>
-        </p:blipFill>
-        <p:spPr bwMode="auto">
-          <a:xfrm>
-            <a:off x="685800" y="5029200"/>
-            <a:ext cx="457200" cy="461528"/>
-          </a:xfrm>
-          <a:prstGeom prst="rect">
-            <a:avLst/>
-          </a:prstGeom>
-          <a:noFill/>
-        </p:spPr>
-      </p:pic>
-    </p:spTree>
-  </p:cSld>
-  <p:clrMapOvr>
-    <a:masterClrMapping/>
-  </p:clrMapOvr>
-  <p:timing>
-    <p:tnLst>
-      <p:par>
-        <p:cTn id="1" dur="indefinite" restart="never" nodeType="tmRoot"/>
-      </p:par>
-    </p:tnLst>
-  </p:timing>
-</p:sld>
-</file>
-
-<file path=ppt/slides/slide5.xml><?xml version="1.0" encoding="utf-8"?>
-<p:sld xmlns:a="http://schemas.openxmlformats.org/drawingml/2006/main" xmlns:r="http://schemas.openxmlformats.org/officeDocument/2006/relationships" xmlns:p="http://schemas.openxmlformats.org/presentationml/2006/main">
-  <p:cSld>
-    <p:spTree>
-      <p:nvGrpSpPr>
-        <p:cNvPr id="1" name=""/>
-        <p:cNvGrpSpPr/>
-        <p:nvPr/>
-      </p:nvGrpSpPr>
-      <p:grpSpPr>
-        <a:xfrm>
-          <a:off x="0" y="0"/>
-          <a:ext cx="0" cy="0"/>
-          <a:chOff x="0" y="0"/>
-          <a:chExt cx="0" cy="0"/>
-        </a:xfrm>
-      </p:grpSpPr>
-      <p:sp>
-        <p:nvSpPr>
-          <p:cNvPr id="2" name="Title 1"/>
-          <p:cNvSpPr>
-            <a:spLocks noGrp="1"/>
-          </p:cNvSpPr>
-          <p:nvPr>
-            <p:ph type="title"/>
-          </p:nvPr>
-        </p:nvSpPr>
-        <p:spPr/>
-        <p:txBody>
-          <a:bodyPr>
-            <a:normAutofit fontScale="90000"/>
-          </a:bodyPr>
-          <a:lstStyle/>
-          <a:p>
-            <a:r>
-              <a:rPr lang="en-US" dirty="0" smtClean="0"/>
-              <a:t>Test Report – Satisfied Requirements Cont’d</a:t>
-            </a:r>
-            <a:endParaRPr lang="en-US" dirty="0"/>
-          </a:p>
-        </p:txBody>
-      </p:sp>
-      <p:sp>
-        <p:nvSpPr>
-          <p:cNvPr id="3" name="Content Placeholder 2"/>
-          <p:cNvSpPr>
-            <a:spLocks noGrp="1"/>
-          </p:cNvSpPr>
-          <p:nvPr>
-            <p:ph idx="1"/>
-          </p:nvPr>
-        </p:nvSpPr>
-        <p:spPr>
-          <a:xfrm>
-            <a:off x="1295400" y="1600200"/>
-            <a:ext cx="7391400" cy="685800"/>
-          </a:xfrm>
-        </p:spPr>
-        <p:txBody>
-          <a:bodyPr>
-            <a:normAutofit/>
-          </a:bodyPr>
-          <a:lstStyle/>
-          <a:p>
-            <a:pPr>
-              <a:buNone/>
-            </a:pPr>
-            <a:r>
-              <a:rPr lang="en-US" sz="2800" dirty="0" smtClean="0"/>
-              <a:t>Removes white center in drop</a:t>
-            </a:r>
-            <a:endParaRPr lang="en-US" sz="2800" dirty="0" smtClean="0"/>
-          </a:p>
-          <a:p>
-            <a:pPr>
-              <a:buNone/>
-            </a:pPr>
-            <a:endParaRPr lang="en-US" sz="2800" dirty="0" smtClean="0"/>
-          </a:p>
-        </p:txBody>
-      </p:sp>
-      <p:pic>
-        <p:nvPicPr>
-          <p:cNvPr id="3076" name="Picture 4" descr="http://pixabay.com/static/uploads/photo/2014/04/02/10/12/checkbox-303113_640.png"/>
-          <p:cNvPicPr>
-            <a:picLocks noChangeAspect="1" noChangeArrowheads="1"/>
-          </p:cNvPicPr>
-          <p:nvPr/>
-        </p:nvPicPr>
-        <p:blipFill>
-          <a:blip r:embed="rId2" cstate="print"/>
-          <a:srcRect/>
-          <a:stretch>
-            <a:fillRect/>
-          </a:stretch>
-        </p:blipFill>
-        <p:spPr bwMode="auto">
-          <a:xfrm>
-            <a:off x="762000" y="1676400"/>
-            <a:ext cx="457200" cy="461528"/>
-          </a:xfrm>
-          <a:prstGeom prst="rect">
-            <a:avLst/>
-          </a:prstGeom>
-          <a:noFill/>
-        </p:spPr>
-      </p:pic>
-      <p:pic>
-        <p:nvPicPr>
-          <p:cNvPr id="22532" name="Picture 4" descr="C:\Users\Anne\Desktop\Software Engineering\IP\drop 1\F00057.TIF"/>
-          <p:cNvPicPr>
-            <a:picLocks noChangeAspect="1" noChangeArrowheads="1"/>
-          </p:cNvPicPr>
-          <p:nvPr/>
-        </p:nvPicPr>
-        <p:blipFill>
-          <a:blip r:embed="rId3" cstate="print"/>
-          <a:srcRect/>
-          <a:stretch>
-            <a:fillRect/>
-          </a:stretch>
-        </p:blipFill>
-        <p:spPr bwMode="auto">
-          <a:xfrm>
-            <a:off x="0" y="3048000"/>
-            <a:ext cx="3048000" cy="2286000"/>
-          </a:xfrm>
-          <a:prstGeom prst="rect">
-            <a:avLst/>
-          </a:prstGeom>
-          <a:noFill/>
-        </p:spPr>
-      </p:pic>
-      <p:pic>
-        <p:nvPicPr>
-          <p:cNvPr id="22533" name="Picture 5" descr="C:\xampp5.6\htdocs\Github\ImageProcessing\test data_processed\F00057.TIF"/>
-          <p:cNvPicPr>
-            <a:picLocks noChangeAspect="1" noChangeArrowheads="1"/>
-          </p:cNvPicPr>
-          <p:nvPr/>
-        </p:nvPicPr>
-        <p:blipFill>
-          <a:blip r:embed="rId4" cstate="print"/>
-          <a:srcRect/>
-          <a:stretch>
-            <a:fillRect/>
-          </a:stretch>
-        </p:blipFill>
-        <p:spPr bwMode="auto">
-          <a:xfrm>
-            <a:off x="6096000" y="3048000"/>
-            <a:ext cx="3048000" cy="2286000"/>
-          </a:xfrm>
-          <a:prstGeom prst="rect">
-            <a:avLst/>
-          </a:prstGeom>
-          <a:noFill/>
-        </p:spPr>
-      </p:pic>
-      <p:pic>
-        <p:nvPicPr>
-          <p:cNvPr id="22531" name="Picture 3" descr="C:\Users\Anne\Desktop\Software Engineering\IP\drop 1\F00057bw.TIF"/>
-          <p:cNvPicPr>
-            <a:picLocks noChangeAspect="1" noChangeArrowheads="1"/>
-          </p:cNvPicPr>
-          <p:nvPr/>
-        </p:nvPicPr>
-        <p:blipFill>
-          <a:blip r:embed="rId5" cstate="print"/>
-          <a:srcRect/>
-          <a:stretch>
-            <a:fillRect/>
-          </a:stretch>
-        </p:blipFill>
-        <p:spPr bwMode="auto">
-          <a:xfrm>
-            <a:off x="3035834" y="3048000"/>
-            <a:ext cx="3047999" cy="2286000"/>
-          </a:xfrm>
-          <a:prstGeom prst="rect">
-            <a:avLst/>
-          </a:prstGeom>
-          <a:noFill/>
-        </p:spPr>
-      </p:pic>
-      <p:sp>
-        <p:nvSpPr>
-          <p:cNvPr id="17" name="Content Placeholder 2"/>
-          <p:cNvSpPr txBox="1">
-            <a:spLocks/>
-          </p:cNvSpPr>
-          <p:nvPr/>
-        </p:nvSpPr>
-        <p:spPr>
-          <a:xfrm>
-            <a:off x="1295400" y="2209800"/>
-            <a:ext cx="7391400" cy="685800"/>
-          </a:xfrm>
-          <a:prstGeom prst="rect">
-            <a:avLst/>
-          </a:prstGeom>
-        </p:spPr>
-        <p:txBody>
-          <a:bodyPr vert="horz" lIns="91440" tIns="45720" rIns="91440" bIns="45720" rtlCol="0">
-            <a:normAutofit/>
-          </a:bodyPr>
-          <a:lstStyle/>
-          <a:p>
-            <a:pPr marL="342900" marR="0" lvl="0" indent="-342900" algn="l" defTabSz="914400" rtl="0" eaLnBrk="1" fontAlgn="auto" latinLnBrk="0" hangingPunct="1">
-              <a:lnSpc>
-                <a:spcPct val="100000"/>
-              </a:lnSpc>
-              <a:spcBef>
-                <a:spcPct val="20000"/>
-              </a:spcBef>
-              <a:spcAft>
-                <a:spcPts val="0"/>
-              </a:spcAft>
-              <a:buClrTx/>
-              <a:buSzTx/>
-              <a:buFont typeface="Arial" pitchFamily="34" charset="0"/>
-              <a:buNone/>
-              <a:tabLst/>
-              <a:defRPr/>
-            </a:pPr>
-            <a:r>
-              <a:rPr kumimoji="0" lang="en-US" sz="2800" b="0" i="0" u="none" strike="noStrike" kern="1200" cap="none" spc="0" normalizeH="0" baseline="0" noProof="0" dirty="0" smtClean="0">
-                <a:ln>
-                  <a:noFill/>
-                </a:ln>
-                <a:solidFill>
-                  <a:schemeClr val="tx1"/>
-                </a:solidFill>
-                <a:effectLst/>
-                <a:uLnTx/>
-                <a:uFillTx/>
-                <a:latin typeface="+mn-lt"/>
-                <a:ea typeface="+mn-ea"/>
-                <a:cs typeface="+mn-cs"/>
-              </a:rPr>
-              <a:t>Provides accurate calculations</a:t>
-            </a:r>
-          </a:p>
-          <a:p>
-            <a:pPr marL="342900" marR="0" lvl="0" indent="-342900" algn="l" defTabSz="914400" rtl="0" eaLnBrk="1" fontAlgn="auto" latinLnBrk="0" hangingPunct="1">
-              <a:lnSpc>
-                <a:spcPct val="100000"/>
-              </a:lnSpc>
-              <a:spcBef>
-                <a:spcPct val="20000"/>
-              </a:spcBef>
-              <a:spcAft>
-                <a:spcPts val="0"/>
-              </a:spcAft>
-              <a:buClrTx/>
-              <a:buSzTx/>
-              <a:buFont typeface="Arial" pitchFamily="34" charset="0"/>
-              <a:buNone/>
-              <a:tabLst/>
-              <a:defRPr/>
-            </a:pPr>
-            <a:endParaRPr kumimoji="0" lang="en-US" sz="2800" b="0" i="0" u="none" strike="noStrike" kern="1200" cap="none" spc="0" normalizeH="0" baseline="0" noProof="0" dirty="0" smtClean="0">
-              <a:ln>
-                <a:noFill/>
-              </a:ln>
-              <a:solidFill>
-                <a:schemeClr val="tx1"/>
-              </a:solidFill>
-              <a:effectLst/>
-              <a:uLnTx/>
-              <a:uFillTx/>
-              <a:latin typeface="+mn-lt"/>
-              <a:ea typeface="+mn-ea"/>
-              <a:cs typeface="+mn-cs"/>
-            </a:endParaRPr>
-          </a:p>
-        </p:txBody>
-      </p:sp>
-      <p:pic>
-        <p:nvPicPr>
-          <p:cNvPr id="18" name="Picture 4" descr="http://pixabay.com/static/uploads/photo/2014/04/02/10/12/checkbox-303113_640.png"/>
-          <p:cNvPicPr>
-            <a:picLocks noChangeAspect="1" noChangeArrowheads="1"/>
-          </p:cNvPicPr>
-          <p:nvPr/>
-        </p:nvPicPr>
-        <p:blipFill>
-          <a:blip r:embed="rId2" cstate="print"/>
-          <a:srcRect/>
-          <a:stretch>
-            <a:fillRect/>
-          </a:stretch>
-        </p:blipFill>
-        <p:spPr bwMode="auto">
-          <a:xfrm>
-            <a:off x="762000" y="2286000"/>
-            <a:ext cx="457200" cy="461528"/>
-          </a:xfrm>
-          <a:prstGeom prst="rect">
-            <a:avLst/>
-          </a:prstGeom>
-          <a:noFill/>
-        </p:spPr>
-      </p:pic>
-    </p:spTree>
-  </p:cSld>
-  <p:clrMapOvr>
-    <a:masterClrMapping/>
-  </p:clrMapOvr>
-  <p:timing>
-    <p:tnLst>
-      <p:par>
-        <p:cTn id="1" dur="indefinite" restart="never" nodeType="tmRoot"/>
-      </p:par>
-    </p:tnLst>
-  </p:timing>
-</p:sld>
-</file>
-
-<file path=ppt/slides/slide6.xml><?xml version="1.0" encoding="utf-8"?>
-<p:sld xmlns:a="http://schemas.openxmlformats.org/drawingml/2006/main" xmlns:r="http://schemas.openxmlformats.org/officeDocument/2006/relationships" xmlns:p="http://schemas.openxmlformats.org/presentationml/2006/main">
-  <p:cSld>
-    <p:spTree>
-      <p:nvGrpSpPr>
-        <p:cNvPr id="1" name=""/>
-        <p:cNvGrpSpPr/>
-        <p:nvPr/>
-      </p:nvGrpSpPr>
-      <p:grpSpPr>
-        <a:xfrm>
-          <a:off x="0" y="0"/>
-          <a:ext cx="0" cy="0"/>
-          <a:chOff x="0" y="0"/>
-          <a:chExt cx="0" cy="0"/>
-        </a:xfrm>
-      </p:grpSpPr>
-      <p:sp>
-        <p:nvSpPr>
-          <p:cNvPr id="4" name="Title 3"/>
-          <p:cNvSpPr>
-            <a:spLocks noGrp="1"/>
-          </p:cNvSpPr>
-          <p:nvPr>
-            <p:ph type="title"/>
-          </p:nvPr>
-        </p:nvSpPr>
-        <p:spPr/>
-        <p:txBody>
-          <a:bodyPr/>
-          <a:lstStyle/>
-          <a:p>
-            <a:r>
-              <a:rPr lang="en-US" dirty="0" smtClean="0"/>
-              <a:t>Test Report – Known problems</a:t>
-            </a:r>
-            <a:endParaRPr lang="en-US" dirty="0"/>
-          </a:p>
-        </p:txBody>
-      </p:sp>
-      <p:sp>
-        <p:nvSpPr>
-          <p:cNvPr id="5" name="Content Placeholder 4"/>
-          <p:cNvSpPr>
-            <a:spLocks noGrp="1"/>
-          </p:cNvSpPr>
-          <p:nvPr>
-            <p:ph sz="half" idx="1"/>
-          </p:nvPr>
-        </p:nvSpPr>
-        <p:spPr/>
-        <p:txBody>
-          <a:bodyPr>
-            <a:normAutofit lnSpcReduction="10000"/>
-          </a:bodyPr>
-          <a:lstStyle/>
-          <a:p>
-            <a:r>
-              <a:rPr lang="en-US" dirty="0" smtClean="0"/>
-              <a:t>Run – Stop – Run again sequence may interrupt thread processes – cause crash</a:t>
-            </a:r>
-          </a:p>
-          <a:p>
-            <a:r>
-              <a:rPr lang="en-US" dirty="0" smtClean="0"/>
-              <a:t>Similar issue with Exiting Tool during IO</a:t>
-            </a:r>
-          </a:p>
-          <a:p>
-            <a:r>
-              <a:rPr lang="en-US" dirty="0" smtClean="0"/>
-              <a:t>Base/Needle height may not be measured accurately, will affect </a:t>
-            </a:r>
-            <a:r>
-              <a:rPr lang="en-US" dirty="0" smtClean="0"/>
-              <a:t>results</a:t>
-            </a:r>
-            <a:endParaRPr lang="en-US" dirty="0" smtClean="0"/>
-          </a:p>
-        </p:txBody>
-      </p:sp>
-      <p:pic>
-        <p:nvPicPr>
-          <p:cNvPr id="7" name="Picture 6"/>
-          <p:cNvPicPr/>
-          <p:nvPr/>
-        </p:nvPicPr>
-        <p:blipFill>
-          <a:blip r:embed="rId2" cstate="print"/>
-          <a:srcRect/>
-          <a:stretch>
-            <a:fillRect/>
-          </a:stretch>
-        </p:blipFill>
-        <p:spPr bwMode="auto">
-          <a:xfrm>
-            <a:off x="4572000" y="2408767"/>
-            <a:ext cx="1219200" cy="791633"/>
-          </a:xfrm>
-          <a:prstGeom prst="rect">
-            <a:avLst/>
-          </a:prstGeom>
-          <a:noFill/>
-          <a:ln w="9525">
-            <a:noFill/>
-            <a:miter lim="800000"/>
-            <a:headEnd/>
-            <a:tailEnd/>
-          </a:ln>
-        </p:spPr>
-      </p:pic>
-      <p:pic>
-        <p:nvPicPr>
-          <p:cNvPr id="8" name="Picture 7"/>
-          <p:cNvPicPr/>
-          <p:nvPr/>
-        </p:nvPicPr>
-        <p:blipFill>
-          <a:blip r:embed="rId3" cstate="print"/>
-          <a:srcRect/>
-          <a:stretch>
-            <a:fillRect/>
-          </a:stretch>
-        </p:blipFill>
-        <p:spPr bwMode="auto">
-          <a:xfrm>
-            <a:off x="6096000" y="2408767"/>
-            <a:ext cx="1250527" cy="760307"/>
-          </a:xfrm>
-          <a:prstGeom prst="rect">
-            <a:avLst/>
-          </a:prstGeom>
-          <a:noFill/>
-          <a:ln w="9525">
-            <a:noFill/>
-            <a:miter lim="800000"/>
-            <a:headEnd/>
-            <a:tailEnd/>
-          </a:ln>
-        </p:spPr>
-      </p:pic>
-      <p:pic>
-        <p:nvPicPr>
-          <p:cNvPr id="9" name="Picture 8"/>
-          <p:cNvPicPr/>
-          <p:nvPr/>
-        </p:nvPicPr>
-        <p:blipFill>
-          <a:blip r:embed="rId2" cstate="print"/>
-          <a:srcRect/>
-          <a:stretch>
-            <a:fillRect/>
-          </a:stretch>
-        </p:blipFill>
-        <p:spPr bwMode="auto">
-          <a:xfrm>
-            <a:off x="7543800" y="2408767"/>
-            <a:ext cx="1219200" cy="791633"/>
-          </a:xfrm>
-          <a:prstGeom prst="rect">
-            <a:avLst/>
-          </a:prstGeom>
-          <a:noFill/>
-          <a:ln w="9525">
-            <a:noFill/>
-            <a:miter lim="800000"/>
-            <a:headEnd/>
-            <a:tailEnd/>
-          </a:ln>
-        </p:spPr>
-      </p:pic>
-      <p:cxnSp>
-        <p:nvCxnSpPr>
-          <p:cNvPr id="11" name="Straight Arrow Connector 10"/>
-          <p:cNvCxnSpPr>
-            <a:stCxn id="7" idx="3"/>
-            <a:endCxn id="8" idx="1"/>
-          </p:cNvCxnSpPr>
-          <p:nvPr/>
-        </p:nvCxnSpPr>
-        <p:spPr>
-          <a:xfrm flipV="1">
-            <a:off x="5791200" y="2788921"/>
-            <a:ext cx="304800" cy="15663"/>
-          </a:xfrm>
-          <a:prstGeom prst="straightConnector1">
-            <a:avLst/>
-          </a:prstGeom>
-          <a:ln>
-            <a:tailEnd type="arrow"/>
-          </a:ln>
-        </p:spPr>
-        <p:style>
-          <a:lnRef idx="1">
-            <a:schemeClr val="accent1"/>
-          </a:lnRef>
-          <a:fillRef idx="0">
-            <a:schemeClr val="accent1"/>
-          </a:fillRef>
-          <a:effectRef idx="0">
-            <a:schemeClr val="accent1"/>
-          </a:effectRef>
-          <a:fontRef idx="minor">
-            <a:schemeClr val="tx1"/>
-          </a:fontRef>
-        </p:style>
-      </p:cxnSp>
-      <p:cxnSp>
-        <p:nvCxnSpPr>
-          <p:cNvPr id="13" name="Straight Arrow Connector 12"/>
-          <p:cNvCxnSpPr>
-            <a:stCxn id="8" idx="3"/>
-            <a:endCxn id="9" idx="1"/>
-          </p:cNvCxnSpPr>
-          <p:nvPr/>
-        </p:nvCxnSpPr>
-        <p:spPr>
-          <a:xfrm>
-            <a:off x="7346527" y="2788921"/>
-            <a:ext cx="197273" cy="15663"/>
-          </a:xfrm>
-          <a:prstGeom prst="straightConnector1">
-            <a:avLst/>
-          </a:prstGeom>
-          <a:ln>
-            <a:tailEnd type="arrow"/>
-          </a:ln>
-        </p:spPr>
-        <p:style>
-          <a:lnRef idx="1">
-            <a:schemeClr val="accent1"/>
-          </a:lnRef>
-          <a:fillRef idx="0">
-            <a:schemeClr val="accent1"/>
-          </a:fillRef>
-          <a:effectRef idx="0">
-            <a:schemeClr val="accent1"/>
-          </a:effectRef>
-          <a:fontRef idx="minor">
-            <a:schemeClr val="tx1"/>
-          </a:fontRef>
-        </p:style>
-      </p:cxnSp>
-      <p:pic>
-        <p:nvPicPr>
-          <p:cNvPr id="2050" name="Picture 2"/>
-          <p:cNvPicPr>
-            <a:picLocks noChangeAspect="1" noChangeArrowheads="1"/>
-          </p:cNvPicPr>
-          <p:nvPr/>
-        </p:nvPicPr>
-        <p:blipFill>
-          <a:blip r:embed="rId4" cstate="print"/>
-          <a:srcRect r="4278" b="15789"/>
-          <a:stretch>
-            <a:fillRect/>
-          </a:stretch>
-        </p:blipFill>
-        <p:spPr bwMode="auto">
-          <a:xfrm>
-            <a:off x="4419600" y="4800600"/>
-            <a:ext cx="4724400" cy="281528"/>
-          </a:xfrm>
-          <a:prstGeom prst="rect">
-            <a:avLst/>
-          </a:prstGeom>
-          <a:noFill/>
-          <a:ln w="9525">
-            <a:noFill/>
-            <a:miter lim="800000"/>
-            <a:headEnd/>
-            <a:tailEnd/>
-          </a:ln>
-        </p:spPr>
-      </p:pic>
-    </p:spTree>
-  </p:cSld>
-  <p:clrMapOvr>
-    <a:masterClrMapping/>
-  </p:clrMapOvr>
-  <p:timing>
-    <p:tnLst>
-      <p:par>
-        <p:cTn id="1" dur="indefinite" restart="never" nodeType="tmRoot"/>
-      </p:par>
-    </p:tnLst>
-  </p:timing>
-</p:sld>
-</file>
-
-<file path=ppt/slides/slide7.xml><?xml version="1.0" encoding="utf-8"?>
-<p:sld xmlns:a="http://schemas.openxmlformats.org/drawingml/2006/main" xmlns:r="http://schemas.openxmlformats.org/officeDocument/2006/relationships" xmlns:p="http://schemas.openxmlformats.org/presentationml/2006/main">
-  <p:cSld>
-    <p:spTree>
-      <p:nvGrpSpPr>
-        <p:cNvPr id="1" name=""/>
-        <p:cNvGrpSpPr/>
-        <p:nvPr/>
-      </p:nvGrpSpPr>
-      <p:grpSpPr>
-        <a:xfrm>
-          <a:off x="0" y="0"/>
-          <a:ext cx="0" cy="0"/>
-          <a:chOff x="0" y="0"/>
-          <a:chExt cx="0" cy="0"/>
-        </a:xfrm>
-      </p:grpSpPr>
-      <p:sp>
-        <p:nvSpPr>
-          <p:cNvPr id="2" name="Title 1"/>
-          <p:cNvSpPr>
-            <a:spLocks noGrp="1"/>
-          </p:cNvSpPr>
-          <p:nvPr>
-            <p:ph type="title"/>
-          </p:nvPr>
-        </p:nvSpPr>
-        <p:spPr/>
-        <p:txBody>
-          <a:bodyPr/>
-          <a:lstStyle/>
-          <a:p>
-            <a:r>
-              <a:rPr lang="en-US" dirty="0" smtClean="0"/>
-              <a:t>Hypothetical – Anne</a:t>
-            </a:r>
-            <a:endParaRPr lang="en-US" dirty="0"/>
-          </a:p>
-        </p:txBody>
-      </p:sp>
-      <p:sp>
-        <p:nvSpPr>
-          <p:cNvPr id="3" name="Content Placeholder 2"/>
-          <p:cNvSpPr>
-            <a:spLocks noGrp="1"/>
-          </p:cNvSpPr>
-          <p:nvPr>
-            <p:ph idx="1"/>
-          </p:nvPr>
-        </p:nvSpPr>
-        <p:spPr/>
-        <p:txBody>
-          <a:bodyPr>
-            <a:normAutofit fontScale="85000" lnSpcReduction="20000"/>
-          </a:bodyPr>
-          <a:lstStyle/>
-          <a:p>
-            <a:r>
-              <a:rPr lang="en-US" dirty="0" smtClean="0"/>
-              <a:t>What if we had more time?</a:t>
-            </a:r>
-          </a:p>
-          <a:p>
-            <a:pPr lvl="1"/>
-            <a:r>
-              <a:rPr lang="en-US" dirty="0" smtClean="0"/>
-              <a:t>Improve processing time, design of interface (change color scheme of </a:t>
-            </a:r>
-            <a:r>
-              <a:rPr lang="en-US" dirty="0" smtClean="0"/>
-              <a:t>form, more feedback from tool), </a:t>
-            </a:r>
-            <a:r>
-              <a:rPr lang="en-US" dirty="0" smtClean="0"/>
-              <a:t>ensure customer </a:t>
-            </a:r>
-            <a:r>
-              <a:rPr lang="en-US" dirty="0" smtClean="0"/>
-              <a:t>satisfaction</a:t>
+              <a:t>satisfication</a:t>
             </a:r>
             <a:endParaRPr lang="en-US" dirty="0" smtClean="0"/>
           </a:p>
@@ -6570,11 +5278,7 @@
             <a:pPr lvl="1"/>
             <a:r>
               <a:rPr lang="en-US" dirty="0" smtClean="0"/>
-              <a:t>Start coding </a:t>
-            </a:r>
-            <a:r>
-              <a:rPr lang="en-US" dirty="0" smtClean="0"/>
-              <a:t>sooner</a:t>
+              <a:t>Would start coding sooner</a:t>
             </a:r>
           </a:p>
           <a:p>
@@ -6590,11 +5294,16 @@
               <a:rPr lang="en-US" dirty="0" smtClean="0"/>
               <a:t>Interact more with customer</a:t>
             </a:r>
+            <a:endParaRPr lang="en-US" dirty="0" smtClean="0"/>
           </a:p>
           <a:p>
             <a:r>
               <a:rPr lang="en-US" dirty="0" smtClean="0"/>
-              <a:t>What I learned</a:t>
+              <a:t>What </a:t>
+            </a:r>
+            <a:r>
+              <a:rPr lang="en-US" dirty="0" smtClean="0"/>
+              <a:t>I learned</a:t>
             </a:r>
           </a:p>
           <a:p>

</xml_diff>

<commit_message>
more work on Annes slides, altered objective gs
</commit_message>
<xml_diff>
--- a/A Team Documents/Anne's Final Presentation Slides.pptx
+++ b/A Team Documents/Anne's Final Presentation Slides.pptx
@@ -5,15 +5,19 @@
     <p:sldMasterId id="2147483732" r:id="rId1"/>
   </p:sldMasterIdLst>
   <p:notesMasterIdLst>
-    <p:notesMasterId r:id="rId5"/>
+    <p:notesMasterId r:id="rId9"/>
   </p:notesMasterIdLst>
   <p:handoutMasterIdLst>
-    <p:handoutMasterId r:id="rId6"/>
+    <p:handoutMasterId r:id="rId10"/>
   </p:handoutMasterIdLst>
   <p:sldIdLst>
     <p:sldId id="313" r:id="rId2"/>
-    <p:sldId id="314" r:id="rId3"/>
-    <p:sldId id="316" r:id="rId4"/>
+    <p:sldId id="319" r:id="rId3"/>
+    <p:sldId id="314" r:id="rId4"/>
+    <p:sldId id="318" r:id="rId5"/>
+    <p:sldId id="320" r:id="rId6"/>
+    <p:sldId id="317" r:id="rId7"/>
+    <p:sldId id="316" r:id="rId8"/>
   </p:sldIdLst>
   <p:sldSz cx="9144000" cy="6858000" type="screen4x3"/>
   <p:notesSz cx="6858000" cy="9144000"/>
@@ -198,7 +202,7 @@
             <a:fld id="{59E2BC62-7E84-44FB-9A81-3B8AD9AE521B}" type="datetimeFigureOut">
               <a:rPr lang="en-US" smtClean="0"/>
               <a:pPr/>
-              <a:t>5/3/2015</a:t>
+              <a:t>5/5/2015</a:t>
             </a:fld>
             <a:endParaRPr lang="en-US"/>
           </a:p>
@@ -365,7 +369,7 @@
             <a:fld id="{AC4D07E4-89AF-44D2-9F2F-5F6D2623599A}" type="datetimeFigureOut">
               <a:rPr lang="en-US" smtClean="0"/>
               <a:pPr/>
-              <a:t>5/3/2015</a:t>
+              <a:t>5/5/2015</a:t>
             </a:fld>
             <a:endParaRPr lang="en-US"/>
           </a:p>
@@ -816,7 +820,7 @@
             <a:fld id="{EC85597E-0796-4D04-ADC8-27184BE37C27}" type="slidenum">
               <a:rPr lang="en-US" smtClean="0"/>
               <a:pPr/>
-              <a:t>2</a:t>
+              <a:t>3</a:t>
             </a:fld>
             <a:endParaRPr lang="en-US"/>
           </a:p>
@@ -1012,7 +1016,7 @@
             <a:fld id="{461E6A8B-52D2-4FB9-BB2D-A053F589DABE}" type="datetimeFigureOut">
               <a:rPr lang="en-US" smtClean="0"/>
               <a:pPr/>
-              <a:t>5/3/2015</a:t>
+              <a:t>5/5/2015</a:t>
             </a:fld>
             <a:endParaRPr lang="en-US" dirty="0"/>
           </a:p>
@@ -1179,7 +1183,7 @@
             <a:fld id="{461E6A8B-52D2-4FB9-BB2D-A053F589DABE}" type="datetimeFigureOut">
               <a:rPr lang="en-US" smtClean="0"/>
               <a:pPr/>
-              <a:t>5/3/2015</a:t>
+              <a:t>5/5/2015</a:t>
             </a:fld>
             <a:endParaRPr lang="en-US"/>
           </a:p>
@@ -1356,7 +1360,7 @@
             <a:fld id="{461E6A8B-52D2-4FB9-BB2D-A053F589DABE}" type="datetimeFigureOut">
               <a:rPr lang="en-US" smtClean="0"/>
               <a:pPr/>
-              <a:t>5/3/2015</a:t>
+              <a:t>5/5/2015</a:t>
             </a:fld>
             <a:endParaRPr lang="en-US"/>
           </a:p>
@@ -1523,7 +1527,7 @@
             <a:fld id="{461E6A8B-52D2-4FB9-BB2D-A053F589DABE}" type="datetimeFigureOut">
               <a:rPr lang="en-US" smtClean="0"/>
               <a:pPr/>
-              <a:t>5/3/2015</a:t>
+              <a:t>5/5/2015</a:t>
             </a:fld>
             <a:endParaRPr lang="en-US"/>
           </a:p>
@@ -1766,7 +1770,7 @@
             <a:fld id="{461E6A8B-52D2-4FB9-BB2D-A053F589DABE}" type="datetimeFigureOut">
               <a:rPr lang="en-US" smtClean="0"/>
               <a:pPr/>
-              <a:t>5/3/2015</a:t>
+              <a:t>5/5/2015</a:t>
             </a:fld>
             <a:endParaRPr lang="en-US"/>
           </a:p>
@@ -2051,7 +2055,7 @@
             <a:fld id="{461E6A8B-52D2-4FB9-BB2D-A053F589DABE}" type="datetimeFigureOut">
               <a:rPr lang="en-US" smtClean="0"/>
               <a:pPr/>
-              <a:t>5/3/2015</a:t>
+              <a:t>5/5/2015</a:t>
             </a:fld>
             <a:endParaRPr lang="en-US"/>
           </a:p>
@@ -2470,7 +2474,7 @@
             <a:fld id="{461E6A8B-52D2-4FB9-BB2D-A053F589DABE}" type="datetimeFigureOut">
               <a:rPr lang="en-US" smtClean="0"/>
               <a:pPr/>
-              <a:t>5/3/2015</a:t>
+              <a:t>5/5/2015</a:t>
             </a:fld>
             <a:endParaRPr lang="en-US"/>
           </a:p>
@@ -2585,7 +2589,7 @@
             <a:fld id="{461E6A8B-52D2-4FB9-BB2D-A053F589DABE}" type="datetimeFigureOut">
               <a:rPr lang="en-US" smtClean="0"/>
               <a:pPr/>
-              <a:t>5/3/2015</a:t>
+              <a:t>5/5/2015</a:t>
             </a:fld>
             <a:endParaRPr lang="en-US"/>
           </a:p>
@@ -2677,7 +2681,7 @@
             <a:fld id="{461E6A8B-52D2-4FB9-BB2D-A053F589DABE}" type="datetimeFigureOut">
               <a:rPr lang="en-US" smtClean="0"/>
               <a:pPr/>
-              <a:t>5/3/2015</a:t>
+              <a:t>5/5/2015</a:t>
             </a:fld>
             <a:endParaRPr lang="en-US"/>
           </a:p>
@@ -2951,7 +2955,7 @@
             <a:fld id="{461E6A8B-52D2-4FB9-BB2D-A053F589DABE}" type="datetimeFigureOut">
               <a:rPr lang="en-US" smtClean="0"/>
               <a:pPr/>
-              <a:t>5/3/2015</a:t>
+              <a:t>5/5/2015</a:t>
             </a:fld>
             <a:endParaRPr lang="en-US"/>
           </a:p>
@@ -3201,7 +3205,7 @@
             <a:fld id="{461E6A8B-52D2-4FB9-BB2D-A053F589DABE}" type="datetimeFigureOut">
               <a:rPr lang="en-US" smtClean="0"/>
               <a:pPr/>
-              <a:t>5/3/2015</a:t>
+              <a:t>5/5/2015</a:t>
             </a:fld>
             <a:endParaRPr lang="en-US"/>
           </a:p>
@@ -3429,7 +3433,7 @@
             <a:fld id="{461E6A8B-52D2-4FB9-BB2D-A053F589DABE}" type="datetimeFigureOut">
               <a:rPr lang="en-US" smtClean="0"/>
               <a:pPr/>
-              <a:t>5/3/2015</a:t>
+              <a:t>5/5/2015</a:t>
             </a:fld>
             <a:endParaRPr lang="en-US"/>
           </a:p>
@@ -5021,164 +5025,68 @@
           <a:p>
             <a:r>
               <a:rPr lang="en-US" dirty="0" smtClean="0"/>
-              <a:t>Test Report</a:t>
+              <a:t>Proof in the Results</a:t>
             </a:r>
             <a:endParaRPr lang="en-US" dirty="0"/>
           </a:p>
         </p:txBody>
       </p:sp>
-      <p:sp>
-        <p:nvSpPr>
-          <p:cNvPr id="5" name="Text Placeholder 4"/>
-          <p:cNvSpPr>
-            <a:spLocks noGrp="1"/>
-          </p:cNvSpPr>
-          <p:nvPr>
-            <p:ph type="body" idx="1"/>
-          </p:nvPr>
-        </p:nvSpPr>
-        <p:spPr/>
-        <p:txBody>
-          <a:bodyPr>
-            <a:normAutofit fontScale="92500"/>
-          </a:bodyPr>
-          <a:lstStyle/>
-          <a:p>
-            <a:r>
-              <a:rPr lang="en-US" dirty="0" smtClean="0"/>
-              <a:t>Deviations from Requirements</a:t>
-            </a:r>
-            <a:endParaRPr lang="en-US" dirty="0"/>
-          </a:p>
-        </p:txBody>
-      </p:sp>
-      <p:sp>
-        <p:nvSpPr>
-          <p:cNvPr id="6" name="Content Placeholder 5"/>
-          <p:cNvSpPr>
-            <a:spLocks noGrp="1"/>
-          </p:cNvSpPr>
-          <p:nvPr>
-            <p:ph sz="half" idx="2"/>
-          </p:nvPr>
-        </p:nvSpPr>
-        <p:spPr/>
-        <p:txBody>
-          <a:bodyPr>
-            <a:normAutofit fontScale="92500"/>
-          </a:bodyPr>
-          <a:lstStyle/>
-          <a:p>
-            <a:r>
-              <a:rPr lang="en-US" dirty="0" smtClean="0"/>
-              <a:t>Efficiency may not be improved </a:t>
-            </a:r>
-          </a:p>
-          <a:p>
-            <a:pPr lvl="1"/>
-            <a:r>
-              <a:rPr lang="en-US" dirty="0" smtClean="0"/>
-              <a:t>Processing time up to 2.5x longer </a:t>
-            </a:r>
-            <a:r>
-              <a:rPr lang="en-US" dirty="0" err="1" smtClean="0"/>
-              <a:t>vs</a:t>
-            </a:r>
-            <a:r>
-              <a:rPr lang="en-US" dirty="0" smtClean="0"/>
-              <a:t> Version 1.0</a:t>
-            </a:r>
-          </a:p>
-          <a:p>
-            <a:pPr lvl="1"/>
-            <a:r>
-              <a:rPr lang="en-US" dirty="0" smtClean="0"/>
-              <a:t>From ~1 min to ~2 min</a:t>
-            </a:r>
-          </a:p>
-          <a:p>
-            <a:pPr lvl="1"/>
-            <a:r>
-              <a:rPr lang="en-US" dirty="0" smtClean="0"/>
-              <a:t>But more robust, accurate</a:t>
-            </a:r>
-          </a:p>
-          <a:p>
-            <a:r>
-              <a:rPr lang="en-US" dirty="0" smtClean="0"/>
-              <a:t>Determined location of needle/ratchet for each image</a:t>
-            </a:r>
-          </a:p>
-          <a:p>
-            <a:pPr lvl="1"/>
-            <a:r>
-              <a:rPr lang="en-US" dirty="0" smtClean="0"/>
-              <a:t>No need for consideration of camera position – can safely assume is constant</a:t>
-            </a:r>
-          </a:p>
-          <a:p>
-            <a:endParaRPr lang="en-US" dirty="0"/>
-          </a:p>
-        </p:txBody>
-      </p:sp>
-      <p:sp>
-        <p:nvSpPr>
-          <p:cNvPr id="7" name="Text Placeholder 6"/>
-          <p:cNvSpPr>
-            <a:spLocks noGrp="1"/>
-          </p:cNvSpPr>
-          <p:nvPr>
-            <p:ph type="body" sz="quarter" idx="3"/>
-          </p:nvPr>
-        </p:nvSpPr>
-        <p:spPr/>
-        <p:txBody>
-          <a:bodyPr/>
-          <a:lstStyle/>
-          <a:p>
-            <a:r>
-              <a:rPr lang="en-US" dirty="0" smtClean="0"/>
-              <a:t>Known problems</a:t>
-            </a:r>
-            <a:endParaRPr lang="en-US" dirty="0"/>
-          </a:p>
-        </p:txBody>
-      </p:sp>
-      <p:sp>
-        <p:nvSpPr>
-          <p:cNvPr id="8" name="Content Placeholder 7"/>
-          <p:cNvSpPr>
-            <a:spLocks noGrp="1"/>
-          </p:cNvSpPr>
-          <p:nvPr>
-            <p:ph sz="quarter" idx="4"/>
-          </p:nvPr>
-        </p:nvSpPr>
-        <p:spPr/>
-        <p:txBody>
-          <a:bodyPr/>
-          <a:lstStyle/>
-          <a:p>
-            <a:r>
-              <a:rPr lang="en-US" dirty="0" smtClean="0"/>
-              <a:t>Run – Stop – Run again sequence may interrupt thread processes – cause crash</a:t>
-            </a:r>
-          </a:p>
-          <a:p>
-            <a:r>
-              <a:rPr lang="en-US" dirty="0" smtClean="0"/>
-              <a:t>Similar issue with Exiting Tool during IO</a:t>
-            </a:r>
-          </a:p>
-          <a:p>
-            <a:r>
-              <a:rPr lang="en-US" dirty="0" smtClean="0"/>
-              <a:t>Base/Needle height may not be measured accurately, will affect results</a:t>
-            </a:r>
-            <a:endParaRPr lang="en-US" dirty="0"/>
-          </a:p>
-        </p:txBody>
-      </p:sp>
+      <p:pic>
+        <p:nvPicPr>
+          <p:cNvPr id="5" name="TestDataVideo.mp4">
+            <a:hlinkClick r:id="" action="ppaction://media"/>
+          </p:cNvPr>
+          <p:cNvPicPr>
+            <a:picLocks noRot="1" noChangeAspect="1"/>
+          </p:cNvPicPr>
+          <p:nvPr>
+            <a:videoFile r:link="rId1"/>
+          </p:nvPr>
+        </p:nvPicPr>
+        <p:blipFill>
+          <a:blip r:embed="rId4" cstate="print"/>
+          <a:stretch>
+            <a:fillRect/>
+          </a:stretch>
+        </p:blipFill>
+        <p:spPr>
+          <a:xfrm>
+            <a:off x="0" y="1905000"/>
+            <a:ext cx="4495800" cy="3371850"/>
+          </a:xfrm>
+          <a:prstGeom prst="rect">
+            <a:avLst/>
+          </a:prstGeom>
+        </p:spPr>
+      </p:pic>
+      <p:pic>
+        <p:nvPicPr>
+          <p:cNvPr id="6" name="TestDataProcessedVideo.mp4">
+            <a:hlinkClick r:id="" action="ppaction://media"/>
+          </p:cNvPr>
+          <p:cNvPicPr>
+            <a:picLocks noRot="1" noChangeAspect="1"/>
+          </p:cNvPicPr>
+          <p:nvPr>
+            <a:videoFile r:link="rId2"/>
+          </p:nvPr>
+        </p:nvPicPr>
+        <p:blipFill>
+          <a:blip r:embed="rId4" cstate="print"/>
+          <a:stretch>
+            <a:fillRect/>
+          </a:stretch>
+        </p:blipFill>
+        <p:spPr>
+          <a:xfrm>
+            <a:off x="4648200" y="1905000"/>
+            <a:ext cx="4495800" cy="3371850"/>
+          </a:xfrm>
+          <a:prstGeom prst="rect">
+            <a:avLst/>
+          </a:prstGeom>
+        </p:spPr>
+      </p:pic>
     </p:spTree>
   </p:cSld>
   <p:clrMapOvr>
@@ -5187,7 +5095,258 @@
   <p:timing>
     <p:tnLst>
       <p:par>
-        <p:cTn id="1" dur="indefinite" restart="never" nodeType="tmRoot"/>
+        <p:cTn id="1" dur="indefinite" restart="never" nodeType="tmRoot">
+          <p:childTnLst>
+            <p:seq concurrent="1" nextAc="seek">
+              <p:cTn id="2" dur="indefinite" nodeType="mainSeq">
+                <p:childTnLst>
+                  <p:par>
+                    <p:cTn id="3" fill="hold">
+                      <p:stCondLst>
+                        <p:cond delay="indefinite"/>
+                        <p:cond evt="onBegin" delay="0">
+                          <p:tn val="2"/>
+                        </p:cond>
+                      </p:stCondLst>
+                      <p:childTnLst>
+                        <p:par>
+                          <p:cTn id="4" fill="hold">
+                            <p:stCondLst>
+                              <p:cond delay="0"/>
+                            </p:stCondLst>
+                            <p:childTnLst>
+                              <p:par>
+                                <p:cTn id="5" presetID="1" presetClass="mediacall" presetSubtype="0" fill="hold" nodeType="afterEffect">
+                                  <p:stCondLst>
+                                    <p:cond delay="0"/>
+                                  </p:stCondLst>
+                                  <p:childTnLst>
+                                    <p:cmd type="call" cmd="playFrom(0.0)">
+                                      <p:cBhvr>
+                                        <p:cTn id="6" dur="1" fill="hold"/>
+                                        <p:tgtEl>
+                                          <p:spTgt spid="5"/>
+                                        </p:tgtEl>
+                                      </p:cBhvr>
+                                    </p:cmd>
+                                  </p:childTnLst>
+                                </p:cTn>
+                              </p:par>
+                            </p:childTnLst>
+                          </p:cTn>
+                        </p:par>
+                        <p:par>
+                          <p:cTn id="7" fill="hold">
+                            <p:stCondLst>
+                              <p:cond delay="0"/>
+                            </p:stCondLst>
+                            <p:childTnLst>
+                              <p:par>
+                                <p:cTn id="8" presetID="1" presetClass="mediacall" presetSubtype="0" fill="hold" nodeType="afterEffect">
+                                  <p:stCondLst>
+                                    <p:cond delay="0"/>
+                                  </p:stCondLst>
+                                  <p:childTnLst>
+                                    <p:cmd type="call" cmd="playFrom(0.0)">
+                                      <p:cBhvr>
+                                        <p:cTn id="9" dur="1" fill="hold"/>
+                                        <p:tgtEl>
+                                          <p:spTgt spid="6"/>
+                                        </p:tgtEl>
+                                      </p:cBhvr>
+                                    </p:cmd>
+                                  </p:childTnLst>
+                                </p:cTn>
+                              </p:par>
+                            </p:childTnLst>
+                          </p:cTn>
+                        </p:par>
+                      </p:childTnLst>
+                    </p:cTn>
+                  </p:par>
+                </p:childTnLst>
+              </p:cTn>
+              <p:prevCondLst>
+                <p:cond evt="onPrev" delay="0">
+                  <p:tgtEl>
+                    <p:sldTgt/>
+                  </p:tgtEl>
+                </p:cond>
+              </p:prevCondLst>
+              <p:nextCondLst>
+                <p:cond evt="onNext" delay="0">
+                  <p:tgtEl>
+                    <p:sldTgt/>
+                  </p:tgtEl>
+                </p:cond>
+              </p:nextCondLst>
+            </p:seq>
+            <p:video>
+              <p:cMediaNode>
+                <p:cTn id="10" fill="hold" display="0">
+                  <p:stCondLst>
+                    <p:cond delay="indefinite"/>
+                  </p:stCondLst>
+                  <p:endCondLst>
+                    <p:cond evt="onNext" delay="0">
+                      <p:tgtEl>
+                        <p:sldTgt/>
+                      </p:tgtEl>
+                    </p:cond>
+                    <p:cond evt="onPrev" delay="0">
+                      <p:tgtEl>
+                        <p:sldTgt/>
+                      </p:tgtEl>
+                    </p:cond>
+                  </p:endCondLst>
+                </p:cTn>
+                <p:tgtEl>
+                  <p:spTgt spid="5"/>
+                </p:tgtEl>
+              </p:cMediaNode>
+            </p:video>
+            <p:seq concurrent="1" nextAc="seek">
+              <p:cTn id="11" restart="whenNotActive" fill="hold" evtFilter="cancelBubble" nodeType="interactiveSeq">
+                <p:stCondLst>
+                  <p:cond evt="onClick" delay="0">
+                    <p:tgtEl>
+                      <p:spTgt spid="5"/>
+                    </p:tgtEl>
+                  </p:cond>
+                </p:stCondLst>
+                <p:endSync evt="end" delay="0">
+                  <p:rtn val="all"/>
+                </p:endSync>
+                <p:childTnLst>
+                  <p:par>
+                    <p:cTn id="12" fill="hold">
+                      <p:stCondLst>
+                        <p:cond delay="0"/>
+                      </p:stCondLst>
+                      <p:childTnLst>
+                        <p:par>
+                          <p:cTn id="13" fill="hold">
+                            <p:stCondLst>
+                              <p:cond delay="0"/>
+                            </p:stCondLst>
+                            <p:childTnLst>
+                              <p:par>
+                                <p:cTn id="14" presetID="2" presetClass="mediacall" presetSubtype="0" fill="hold" nodeType="clickEffect">
+                                  <p:stCondLst>
+                                    <p:cond delay="0"/>
+                                  </p:stCondLst>
+                                  <p:childTnLst>
+                                    <p:cmd type="call" cmd="togglePause">
+                                      <p:cBhvr>
+                                        <p:cTn id="15" dur="1" fill="hold"/>
+                                        <p:tgtEl>
+                                          <p:spTgt spid="5"/>
+                                        </p:tgtEl>
+                                      </p:cBhvr>
+                                    </p:cmd>
+                                  </p:childTnLst>
+                                </p:cTn>
+                              </p:par>
+                            </p:childTnLst>
+                          </p:cTn>
+                        </p:par>
+                      </p:childTnLst>
+                    </p:cTn>
+                  </p:par>
+                </p:childTnLst>
+              </p:cTn>
+              <p:nextCondLst>
+                <p:cond evt="onClick" delay="0">
+                  <p:tgtEl>
+                    <p:spTgt spid="5"/>
+                  </p:tgtEl>
+                </p:cond>
+              </p:nextCondLst>
+            </p:seq>
+            <p:video>
+              <p:cMediaNode>
+                <p:cTn id="16" fill="hold" display="0">
+                  <p:stCondLst>
+                    <p:cond delay="indefinite"/>
+                  </p:stCondLst>
+                  <p:endCondLst>
+                    <p:cond evt="onNext" delay="0">
+                      <p:tgtEl>
+                        <p:sldTgt/>
+                      </p:tgtEl>
+                    </p:cond>
+                    <p:cond evt="onPrev" delay="0">
+                      <p:tgtEl>
+                        <p:sldTgt/>
+                      </p:tgtEl>
+                    </p:cond>
+                  </p:endCondLst>
+                </p:cTn>
+                <p:tgtEl>
+                  <p:spTgt spid="6"/>
+                </p:tgtEl>
+              </p:cMediaNode>
+            </p:video>
+            <p:seq concurrent="1" nextAc="seek">
+              <p:cTn id="17" restart="whenNotActive" fill="hold" evtFilter="cancelBubble" nodeType="interactiveSeq">
+                <p:stCondLst>
+                  <p:cond evt="onClick" delay="0">
+                    <p:tgtEl>
+                      <p:spTgt spid="6"/>
+                    </p:tgtEl>
+                  </p:cond>
+                </p:stCondLst>
+                <p:endSync evt="end" delay="0">
+                  <p:rtn val="all"/>
+                </p:endSync>
+                <p:childTnLst>
+                  <p:par>
+                    <p:cTn id="18" fill="hold">
+                      <p:stCondLst>
+                        <p:cond delay="0"/>
+                      </p:stCondLst>
+                      <p:childTnLst>
+                        <p:par>
+                          <p:cTn id="19" fill="hold">
+                            <p:stCondLst>
+                              <p:cond delay="0"/>
+                            </p:stCondLst>
+                            <p:childTnLst>
+                              <p:par>
+                                <p:cTn id="20" presetID="2" presetClass="mediacall" presetSubtype="0" fill="hold" nodeType="clickEffect">
+                                  <p:stCondLst>
+                                    <p:cond delay="0"/>
+                                  </p:stCondLst>
+                                  <p:childTnLst>
+                                    <p:cmd type="call" cmd="togglePause">
+                                      <p:cBhvr>
+                                        <p:cTn id="21" dur="1" fill="hold"/>
+                                        <p:tgtEl>
+                                          <p:spTgt spid="6"/>
+                                        </p:tgtEl>
+                                      </p:cBhvr>
+                                    </p:cmd>
+                                  </p:childTnLst>
+                                </p:cTn>
+                              </p:par>
+                            </p:childTnLst>
+                          </p:cTn>
+                        </p:par>
+                      </p:childTnLst>
+                    </p:cTn>
+                  </p:par>
+                </p:childTnLst>
+              </p:cTn>
+              <p:nextCondLst>
+                <p:cond evt="onClick" delay="0">
+                  <p:tgtEl>
+                    <p:spTgt spid="6"/>
+                  </p:tgtEl>
+                </p:cond>
+              </p:nextCondLst>
+            </p:seq>
+          </p:childTnLst>
+        </p:cTn>
       </p:par>
     </p:tnLst>
   </p:timing>
@@ -5223,12 +5382,846 @@
         </p:nvSpPr>
         <p:spPr/>
         <p:txBody>
+          <a:bodyPr>
+            <a:normAutofit fontScale="90000"/>
+          </a:bodyPr>
+          <a:lstStyle/>
+          <a:p>
+            <a:r>
+              <a:rPr lang="en-US" dirty="0" smtClean="0"/>
+              <a:t>Test Report – Unsatisfied Requirements</a:t>
+            </a:r>
+            <a:endParaRPr lang="en-US" dirty="0"/>
+          </a:p>
+        </p:txBody>
+      </p:sp>
+      <p:sp>
+        <p:nvSpPr>
+          <p:cNvPr id="6" name="Content Placeholder 5"/>
+          <p:cNvSpPr>
+            <a:spLocks noGrp="1"/>
+          </p:cNvSpPr>
+          <p:nvPr>
+            <p:ph sz="half" idx="1"/>
+          </p:nvPr>
+        </p:nvSpPr>
+        <p:spPr>
+          <a:xfrm>
+            <a:off x="457200" y="1905001"/>
+            <a:ext cx="4724400" cy="4114800"/>
+          </a:xfrm>
+        </p:spPr>
+        <p:txBody>
+          <a:bodyPr>
+            <a:normAutofit/>
+          </a:bodyPr>
+          <a:lstStyle/>
+          <a:p>
+            <a:r>
+              <a:rPr lang="en-US" dirty="0" smtClean="0"/>
+              <a:t>Efficiency may not be improved </a:t>
+            </a:r>
+          </a:p>
+          <a:p>
+            <a:pPr lvl="1"/>
+            <a:r>
+              <a:rPr lang="en-US" dirty="0" smtClean="0"/>
+              <a:t>Processing time up to 2.5x longer </a:t>
+            </a:r>
+            <a:r>
+              <a:rPr lang="en-US" dirty="0" err="1" smtClean="0"/>
+              <a:t>vs</a:t>
+            </a:r>
+            <a:r>
+              <a:rPr lang="en-US" dirty="0" smtClean="0"/>
+              <a:t> Version 1.0</a:t>
+            </a:r>
+          </a:p>
+          <a:p>
+            <a:pPr lvl="1"/>
+            <a:r>
+              <a:rPr lang="en-US" dirty="0" smtClean="0"/>
+              <a:t>From ~1 min to ~2 min</a:t>
+            </a:r>
+          </a:p>
+          <a:p>
+            <a:pPr lvl="1"/>
+            <a:r>
+              <a:rPr lang="en-US" dirty="0" smtClean="0"/>
+              <a:t>But more robust, accurate</a:t>
+            </a:r>
+          </a:p>
+          <a:p>
+            <a:r>
+              <a:rPr lang="en-US" dirty="0" smtClean="0"/>
+              <a:t>Excel table lacks the “frame number”</a:t>
+            </a:r>
+            <a:endParaRPr lang="en-US" dirty="0"/>
+          </a:p>
+        </p:txBody>
+      </p:sp>
+      <p:pic>
+        <p:nvPicPr>
+          <p:cNvPr id="1032" name="Picture 8"/>
+          <p:cNvPicPr>
+            <a:picLocks noChangeAspect="1" noChangeArrowheads="1"/>
+          </p:cNvPicPr>
+          <p:nvPr/>
+        </p:nvPicPr>
+        <p:blipFill>
+          <a:blip r:embed="rId3" cstate="print"/>
+          <a:srcRect/>
+          <a:stretch>
+            <a:fillRect/>
+          </a:stretch>
+        </p:blipFill>
+        <p:spPr bwMode="auto">
+          <a:xfrm>
+            <a:off x="5638800" y="2133600"/>
+            <a:ext cx="1200150" cy="2847415"/>
+          </a:xfrm>
+          <a:prstGeom prst="rect">
+            <a:avLst/>
+          </a:prstGeom>
+          <a:noFill/>
+          <a:ln w="9525">
+            <a:noFill/>
+            <a:miter lim="800000"/>
+            <a:headEnd/>
+            <a:tailEnd/>
+          </a:ln>
+        </p:spPr>
+      </p:pic>
+      <p:pic>
+        <p:nvPicPr>
+          <p:cNvPr id="1033" name="Picture 9"/>
+          <p:cNvPicPr>
+            <a:picLocks noChangeAspect="1" noChangeArrowheads="1"/>
+          </p:cNvPicPr>
+          <p:nvPr/>
+        </p:nvPicPr>
+        <p:blipFill>
+          <a:blip r:embed="rId4" cstate="print"/>
+          <a:srcRect/>
+          <a:stretch>
+            <a:fillRect/>
+          </a:stretch>
+        </p:blipFill>
+        <p:spPr bwMode="auto">
+          <a:xfrm>
+            <a:off x="7565984" y="2057401"/>
+            <a:ext cx="749341" cy="2895600"/>
+          </a:xfrm>
+          <a:prstGeom prst="rect">
+            <a:avLst/>
+          </a:prstGeom>
+          <a:noFill/>
+          <a:ln w="9525">
+            <a:noFill/>
+            <a:miter lim="800000"/>
+            <a:headEnd/>
+            <a:tailEnd/>
+          </a:ln>
+        </p:spPr>
+      </p:pic>
+    </p:spTree>
+  </p:cSld>
+  <p:clrMapOvr>
+    <a:masterClrMapping/>
+  </p:clrMapOvr>
+  <p:timing>
+    <p:tnLst>
+      <p:par>
+        <p:cTn id="1" dur="indefinite" restart="never" nodeType="tmRoot"/>
+      </p:par>
+    </p:tnLst>
+  </p:timing>
+</p:sld>
+</file>
+
+<file path=ppt/slides/slide4.xml><?xml version="1.0" encoding="utf-8"?>
+<p:sld xmlns:a="http://schemas.openxmlformats.org/drawingml/2006/main" xmlns:r="http://schemas.openxmlformats.org/officeDocument/2006/relationships" xmlns:p="http://schemas.openxmlformats.org/presentationml/2006/main">
+  <p:cSld>
+    <p:spTree>
+      <p:nvGrpSpPr>
+        <p:cNvPr id="1" name=""/>
+        <p:cNvGrpSpPr/>
+        <p:nvPr/>
+      </p:nvGrpSpPr>
+      <p:grpSpPr>
+        <a:xfrm>
+          <a:off x="0" y="0"/>
+          <a:ext cx="0" cy="0"/>
+          <a:chOff x="0" y="0"/>
+          <a:chExt cx="0" cy="0"/>
+        </a:xfrm>
+      </p:grpSpPr>
+      <p:sp>
+        <p:nvSpPr>
+          <p:cNvPr id="2" name="Title 1"/>
+          <p:cNvSpPr>
+            <a:spLocks noGrp="1"/>
+          </p:cNvSpPr>
+          <p:nvPr>
+            <p:ph type="title"/>
+          </p:nvPr>
+        </p:nvSpPr>
+        <p:spPr/>
+        <p:txBody>
+          <a:bodyPr>
+            <a:normAutofit fontScale="90000"/>
+          </a:bodyPr>
+          <a:lstStyle/>
+          <a:p>
+            <a:r>
+              <a:rPr lang="en-US" dirty="0" smtClean="0"/>
+              <a:t>Test Report – Satisfied Requirements</a:t>
+            </a:r>
+            <a:endParaRPr lang="en-US" dirty="0"/>
+          </a:p>
+        </p:txBody>
+      </p:sp>
+      <p:sp>
+        <p:nvSpPr>
+          <p:cNvPr id="3" name="Content Placeholder 2"/>
+          <p:cNvSpPr>
+            <a:spLocks noGrp="1"/>
+          </p:cNvSpPr>
+          <p:nvPr>
+            <p:ph idx="1"/>
+          </p:nvPr>
+        </p:nvSpPr>
+        <p:spPr>
+          <a:xfrm>
+            <a:off x="1295400" y="1447800"/>
+            <a:ext cx="7391400" cy="4724400"/>
+          </a:xfrm>
+        </p:spPr>
+        <p:txBody>
+          <a:bodyPr>
+            <a:normAutofit/>
+          </a:bodyPr>
+          <a:lstStyle/>
+          <a:p>
+            <a:pPr>
+              <a:buNone/>
+            </a:pPr>
+            <a:r>
+              <a:rPr lang="en-US" sz="2800" dirty="0" smtClean="0"/>
+              <a:t>Tracks the location of drop by following </a:t>
+            </a:r>
+            <a:r>
+              <a:rPr lang="en-US" sz="2800" dirty="0" err="1" smtClean="0"/>
+              <a:t>centroid</a:t>
+            </a:r>
+            <a:endParaRPr lang="en-US" sz="2800" dirty="0" smtClean="0"/>
+          </a:p>
+          <a:p>
+            <a:pPr>
+              <a:buNone/>
+            </a:pPr>
+            <a:r>
+              <a:rPr lang="en-US" sz="2800" dirty="0" smtClean="0"/>
+              <a:t>Determines location of needle/base automatically – able to fine tune</a:t>
+            </a:r>
+          </a:p>
+          <a:p>
+            <a:pPr>
+              <a:buNone/>
+            </a:pPr>
+            <a:r>
+              <a:rPr lang="en-US" sz="2800" dirty="0" smtClean="0"/>
+              <a:t>Does not require base image</a:t>
+            </a:r>
+          </a:p>
+          <a:p>
+            <a:pPr>
+              <a:buNone/>
+            </a:pPr>
+            <a:r>
+              <a:rPr lang="en-US" sz="2800" dirty="0" smtClean="0"/>
+              <a:t>Obtains volume and all required kinematics</a:t>
+            </a:r>
+          </a:p>
+          <a:p>
+            <a:pPr>
+              <a:buNone/>
+            </a:pPr>
+            <a:r>
+              <a:rPr lang="en-US" sz="2800" dirty="0" smtClean="0"/>
+              <a:t>Outputs to Excel</a:t>
+            </a:r>
+          </a:p>
+          <a:p>
+            <a:pPr>
+              <a:buNone/>
+            </a:pPr>
+            <a:r>
+              <a:rPr lang="en-US" sz="2800" dirty="0" smtClean="0"/>
+              <a:t>Generates plots as a function of time</a:t>
+            </a:r>
+          </a:p>
+          <a:p>
+            <a:pPr>
+              <a:buNone/>
+            </a:pPr>
+            <a:r>
+              <a:rPr lang="en-US" sz="2800" dirty="0" smtClean="0"/>
+              <a:t>Is Repeatable –successful for 3+  experimental sequences</a:t>
+            </a:r>
+          </a:p>
+        </p:txBody>
+      </p:sp>
+      <p:pic>
+        <p:nvPicPr>
+          <p:cNvPr id="3076" name="Picture 4" descr="http://pixabay.com/static/uploads/photo/2014/04/02/10/12/checkbox-303113_640.png"/>
+          <p:cNvPicPr>
+            <a:picLocks noChangeAspect="1" noChangeArrowheads="1"/>
+          </p:cNvPicPr>
+          <p:nvPr/>
+        </p:nvPicPr>
+        <p:blipFill>
+          <a:blip r:embed="rId2" cstate="print"/>
+          <a:srcRect/>
+          <a:stretch>
+            <a:fillRect/>
+          </a:stretch>
+        </p:blipFill>
+        <p:spPr bwMode="auto">
+          <a:xfrm>
+            <a:off x="685800" y="1525442"/>
+            <a:ext cx="457200" cy="461528"/>
+          </a:xfrm>
+          <a:prstGeom prst="rect">
+            <a:avLst/>
+          </a:prstGeom>
+          <a:noFill/>
+        </p:spPr>
+      </p:pic>
+      <p:pic>
+        <p:nvPicPr>
+          <p:cNvPr id="8" name="Picture 4" descr="http://pixabay.com/static/uploads/photo/2014/04/02/10/12/checkbox-303113_640.png"/>
+          <p:cNvPicPr>
+            <a:picLocks noChangeAspect="1" noChangeArrowheads="1"/>
+          </p:cNvPicPr>
+          <p:nvPr/>
+        </p:nvPicPr>
+        <p:blipFill>
+          <a:blip r:embed="rId2" cstate="print"/>
+          <a:srcRect/>
+          <a:stretch>
+            <a:fillRect/>
+          </a:stretch>
+        </p:blipFill>
+        <p:spPr bwMode="auto">
+          <a:xfrm>
+            <a:off x="685800" y="2057400"/>
+            <a:ext cx="457200" cy="461528"/>
+          </a:xfrm>
+          <a:prstGeom prst="rect">
+            <a:avLst/>
+          </a:prstGeom>
+          <a:noFill/>
+        </p:spPr>
+      </p:pic>
+      <p:pic>
+        <p:nvPicPr>
+          <p:cNvPr id="9" name="Picture 4" descr="http://pixabay.com/static/uploads/photo/2014/04/02/10/12/checkbox-303113_640.png"/>
+          <p:cNvPicPr>
+            <a:picLocks noChangeAspect="1" noChangeArrowheads="1"/>
+          </p:cNvPicPr>
+          <p:nvPr/>
+        </p:nvPicPr>
+        <p:blipFill>
+          <a:blip r:embed="rId2" cstate="print"/>
+          <a:srcRect/>
+          <a:stretch>
+            <a:fillRect/>
+          </a:stretch>
+        </p:blipFill>
+        <p:spPr bwMode="auto">
+          <a:xfrm>
+            <a:off x="685800" y="2973242"/>
+            <a:ext cx="457200" cy="461528"/>
+          </a:xfrm>
+          <a:prstGeom prst="rect">
+            <a:avLst/>
+          </a:prstGeom>
+          <a:noFill/>
+        </p:spPr>
+      </p:pic>
+      <p:pic>
+        <p:nvPicPr>
+          <p:cNvPr id="10" name="Picture 4" descr="http://pixabay.com/static/uploads/photo/2014/04/02/10/12/checkbox-303113_640.png"/>
+          <p:cNvPicPr>
+            <a:picLocks noChangeAspect="1" noChangeArrowheads="1"/>
+          </p:cNvPicPr>
+          <p:nvPr/>
+        </p:nvPicPr>
+        <p:blipFill>
+          <a:blip r:embed="rId2" cstate="print"/>
+          <a:srcRect/>
+          <a:stretch>
+            <a:fillRect/>
+          </a:stretch>
+        </p:blipFill>
+        <p:spPr bwMode="auto">
+          <a:xfrm>
+            <a:off x="685800" y="3429000"/>
+            <a:ext cx="457200" cy="461528"/>
+          </a:xfrm>
+          <a:prstGeom prst="rect">
+            <a:avLst/>
+          </a:prstGeom>
+          <a:noFill/>
+        </p:spPr>
+      </p:pic>
+      <p:pic>
+        <p:nvPicPr>
+          <p:cNvPr id="11" name="Picture 4" descr="http://pixabay.com/static/uploads/photo/2014/04/02/10/12/checkbox-303113_640.png"/>
+          <p:cNvPicPr>
+            <a:picLocks noChangeAspect="1" noChangeArrowheads="1"/>
+          </p:cNvPicPr>
+          <p:nvPr/>
+        </p:nvPicPr>
+        <p:blipFill>
+          <a:blip r:embed="rId2" cstate="print"/>
+          <a:srcRect/>
+          <a:stretch>
+            <a:fillRect/>
+          </a:stretch>
+        </p:blipFill>
+        <p:spPr bwMode="auto">
+          <a:xfrm>
+            <a:off x="685800" y="3962400"/>
+            <a:ext cx="457200" cy="461528"/>
+          </a:xfrm>
+          <a:prstGeom prst="rect">
+            <a:avLst/>
+          </a:prstGeom>
+          <a:noFill/>
+        </p:spPr>
+      </p:pic>
+      <p:pic>
+        <p:nvPicPr>
+          <p:cNvPr id="12" name="Picture 4" descr="http://pixabay.com/static/uploads/photo/2014/04/02/10/12/checkbox-303113_640.png"/>
+          <p:cNvPicPr>
+            <a:picLocks noChangeAspect="1" noChangeArrowheads="1"/>
+          </p:cNvPicPr>
+          <p:nvPr/>
+        </p:nvPicPr>
+        <p:blipFill>
+          <a:blip r:embed="rId2" cstate="print"/>
+          <a:srcRect/>
+          <a:stretch>
+            <a:fillRect/>
+          </a:stretch>
+        </p:blipFill>
+        <p:spPr bwMode="auto">
+          <a:xfrm>
+            <a:off x="685800" y="4494358"/>
+            <a:ext cx="457200" cy="461528"/>
+          </a:xfrm>
+          <a:prstGeom prst="rect">
+            <a:avLst/>
+          </a:prstGeom>
+          <a:noFill/>
+        </p:spPr>
+      </p:pic>
+      <p:pic>
+        <p:nvPicPr>
+          <p:cNvPr id="13" name="Picture 4" descr="http://pixabay.com/static/uploads/photo/2014/04/02/10/12/checkbox-303113_640.png"/>
+          <p:cNvPicPr>
+            <a:picLocks noChangeAspect="1" noChangeArrowheads="1"/>
+          </p:cNvPicPr>
+          <p:nvPr/>
+        </p:nvPicPr>
+        <p:blipFill>
+          <a:blip r:embed="rId2" cstate="print"/>
+          <a:srcRect/>
+          <a:stretch>
+            <a:fillRect/>
+          </a:stretch>
+        </p:blipFill>
+        <p:spPr bwMode="auto">
+          <a:xfrm>
+            <a:off x="685800" y="5029200"/>
+            <a:ext cx="457200" cy="461528"/>
+          </a:xfrm>
+          <a:prstGeom prst="rect">
+            <a:avLst/>
+          </a:prstGeom>
+          <a:noFill/>
+        </p:spPr>
+      </p:pic>
+    </p:spTree>
+  </p:cSld>
+  <p:clrMapOvr>
+    <a:masterClrMapping/>
+  </p:clrMapOvr>
+  <p:timing>
+    <p:tnLst>
+      <p:par>
+        <p:cTn id="1" dur="indefinite" restart="never" nodeType="tmRoot"/>
+      </p:par>
+    </p:tnLst>
+  </p:timing>
+</p:sld>
+</file>
+
+<file path=ppt/slides/slide5.xml><?xml version="1.0" encoding="utf-8"?>
+<p:sld xmlns:a="http://schemas.openxmlformats.org/drawingml/2006/main" xmlns:r="http://schemas.openxmlformats.org/officeDocument/2006/relationships" xmlns:p="http://schemas.openxmlformats.org/presentationml/2006/main">
+  <p:cSld>
+    <p:spTree>
+      <p:nvGrpSpPr>
+        <p:cNvPr id="1" name=""/>
+        <p:cNvGrpSpPr/>
+        <p:nvPr/>
+      </p:nvGrpSpPr>
+      <p:grpSpPr>
+        <a:xfrm>
+          <a:off x="0" y="0"/>
+          <a:ext cx="0" cy="0"/>
+          <a:chOff x="0" y="0"/>
+          <a:chExt cx="0" cy="0"/>
+        </a:xfrm>
+      </p:grpSpPr>
+      <p:sp>
+        <p:nvSpPr>
+          <p:cNvPr id="2" name="Title 1"/>
+          <p:cNvSpPr>
+            <a:spLocks noGrp="1"/>
+          </p:cNvSpPr>
+          <p:nvPr>
+            <p:ph type="title"/>
+          </p:nvPr>
+        </p:nvSpPr>
+        <p:spPr/>
+        <p:txBody>
+          <a:bodyPr>
+            <a:normAutofit fontScale="90000"/>
+          </a:bodyPr>
+          <a:lstStyle/>
+          <a:p>
+            <a:r>
+              <a:rPr lang="en-US" dirty="0" smtClean="0"/>
+              <a:t>Test Report – Satisfied Requirements Cont’d</a:t>
+            </a:r>
+            <a:endParaRPr lang="en-US" dirty="0"/>
+          </a:p>
+        </p:txBody>
+      </p:sp>
+      <p:sp>
+        <p:nvSpPr>
+          <p:cNvPr id="3" name="Content Placeholder 2"/>
+          <p:cNvSpPr>
+            <a:spLocks noGrp="1"/>
+          </p:cNvSpPr>
+          <p:nvPr>
+            <p:ph idx="1"/>
+          </p:nvPr>
+        </p:nvSpPr>
+        <p:spPr>
+          <a:xfrm>
+            <a:off x="1295400" y="1600200"/>
+            <a:ext cx="7391400" cy="685800"/>
+          </a:xfrm>
+        </p:spPr>
+        <p:txBody>
+          <a:bodyPr>
+            <a:normAutofit/>
+          </a:bodyPr>
+          <a:lstStyle/>
+          <a:p>
+            <a:pPr>
+              <a:buNone/>
+            </a:pPr>
+            <a:r>
+              <a:rPr lang="en-US" sz="2800" dirty="0" smtClean="0"/>
+              <a:t>Removes white center in drop</a:t>
+            </a:r>
+          </a:p>
+          <a:p>
+            <a:pPr>
+              <a:buNone/>
+            </a:pPr>
+            <a:endParaRPr lang="en-US" sz="2800" dirty="0" smtClean="0"/>
+          </a:p>
+        </p:txBody>
+      </p:sp>
+      <p:pic>
+        <p:nvPicPr>
+          <p:cNvPr id="3076" name="Picture 4" descr="http://pixabay.com/static/uploads/photo/2014/04/02/10/12/checkbox-303113_640.png"/>
+          <p:cNvPicPr>
+            <a:picLocks noChangeAspect="1" noChangeArrowheads="1"/>
+          </p:cNvPicPr>
+          <p:nvPr/>
+        </p:nvPicPr>
+        <p:blipFill>
+          <a:blip r:embed="rId2" cstate="print"/>
+          <a:srcRect/>
+          <a:stretch>
+            <a:fillRect/>
+          </a:stretch>
+        </p:blipFill>
+        <p:spPr bwMode="auto">
+          <a:xfrm>
+            <a:off x="762000" y="1676400"/>
+            <a:ext cx="457200" cy="461528"/>
+          </a:xfrm>
+          <a:prstGeom prst="rect">
+            <a:avLst/>
+          </a:prstGeom>
+          <a:noFill/>
+        </p:spPr>
+      </p:pic>
+      <p:pic>
+        <p:nvPicPr>
+          <p:cNvPr id="22532" name="Picture 4" descr="C:\Users\Anne\Desktop\Software Engineering\IP\drop 1\F00057.TIF"/>
+          <p:cNvPicPr>
+            <a:picLocks noChangeAspect="1" noChangeArrowheads="1"/>
+          </p:cNvPicPr>
+          <p:nvPr/>
+        </p:nvPicPr>
+        <p:blipFill>
+          <a:blip r:embed="rId3" cstate="print"/>
+          <a:srcRect/>
+          <a:stretch>
+            <a:fillRect/>
+          </a:stretch>
+        </p:blipFill>
+        <p:spPr bwMode="auto">
+          <a:xfrm>
+            <a:off x="0" y="3048000"/>
+            <a:ext cx="3048000" cy="2286000"/>
+          </a:xfrm>
+          <a:prstGeom prst="rect">
+            <a:avLst/>
+          </a:prstGeom>
+          <a:noFill/>
+        </p:spPr>
+      </p:pic>
+      <p:pic>
+        <p:nvPicPr>
+          <p:cNvPr id="22533" name="Picture 5" descr="C:\xampp5.6\htdocs\Github\ImageProcessing\test data_processed\F00057.TIF"/>
+          <p:cNvPicPr>
+            <a:picLocks noChangeAspect="1" noChangeArrowheads="1"/>
+          </p:cNvPicPr>
+          <p:nvPr/>
+        </p:nvPicPr>
+        <p:blipFill>
+          <a:blip r:embed="rId4" cstate="print"/>
+          <a:srcRect/>
+          <a:stretch>
+            <a:fillRect/>
+          </a:stretch>
+        </p:blipFill>
+        <p:spPr bwMode="auto">
+          <a:xfrm>
+            <a:off x="6096000" y="3048000"/>
+            <a:ext cx="3048000" cy="2286000"/>
+          </a:xfrm>
+          <a:prstGeom prst="rect">
+            <a:avLst/>
+          </a:prstGeom>
+          <a:noFill/>
+        </p:spPr>
+      </p:pic>
+      <p:pic>
+        <p:nvPicPr>
+          <p:cNvPr id="22531" name="Picture 3" descr="C:\Users\Anne\Desktop\Software Engineering\IP\drop 1\F00057bw.TIF"/>
+          <p:cNvPicPr>
+            <a:picLocks noChangeAspect="1" noChangeArrowheads="1"/>
+          </p:cNvPicPr>
+          <p:nvPr/>
+        </p:nvPicPr>
+        <p:blipFill>
+          <a:blip r:embed="rId5" cstate="print"/>
+          <a:srcRect/>
+          <a:stretch>
+            <a:fillRect/>
+          </a:stretch>
+        </p:blipFill>
+        <p:spPr bwMode="auto">
+          <a:xfrm>
+            <a:off x="3035834" y="3048000"/>
+            <a:ext cx="3047999" cy="2286000"/>
+          </a:xfrm>
+          <a:prstGeom prst="rect">
+            <a:avLst/>
+          </a:prstGeom>
+          <a:noFill/>
+        </p:spPr>
+      </p:pic>
+      <p:sp>
+        <p:nvSpPr>
+          <p:cNvPr id="17" name="Content Placeholder 2"/>
+          <p:cNvSpPr txBox="1">
+            <a:spLocks/>
+          </p:cNvSpPr>
+          <p:nvPr/>
+        </p:nvSpPr>
+        <p:spPr>
+          <a:xfrm>
+            <a:off x="1295400" y="2209800"/>
+            <a:ext cx="7391400" cy="685800"/>
+          </a:xfrm>
+          <a:prstGeom prst="rect">
+            <a:avLst/>
+          </a:prstGeom>
+        </p:spPr>
+        <p:txBody>
+          <a:bodyPr vert="horz" lIns="91440" tIns="45720" rIns="91440" bIns="45720" rtlCol="0">
+            <a:normAutofit/>
+          </a:bodyPr>
+          <a:lstStyle/>
+          <a:p>
+            <a:pPr marL="342900" marR="0" lvl="0" indent="-342900" algn="l" defTabSz="914400" rtl="0" eaLnBrk="1" fontAlgn="auto" latinLnBrk="0" hangingPunct="1">
+              <a:lnSpc>
+                <a:spcPct val="100000"/>
+              </a:lnSpc>
+              <a:spcBef>
+                <a:spcPct val="20000"/>
+              </a:spcBef>
+              <a:spcAft>
+                <a:spcPts val="0"/>
+              </a:spcAft>
+              <a:buClrTx/>
+              <a:buSzTx/>
+              <a:buFont typeface="Arial" pitchFamily="34" charset="0"/>
+              <a:buNone/>
+              <a:tabLst/>
+              <a:defRPr/>
+            </a:pPr>
+            <a:r>
+              <a:rPr kumimoji="0" lang="en-US" sz="2800" b="0" i="0" u="none" strike="noStrike" kern="1200" cap="none" spc="0" normalizeH="0" baseline="0" noProof="0" dirty="0" smtClean="0">
+                <a:ln>
+                  <a:noFill/>
+                </a:ln>
+                <a:solidFill>
+                  <a:schemeClr val="tx1"/>
+                </a:solidFill>
+                <a:effectLst/>
+                <a:uLnTx/>
+                <a:uFillTx/>
+                <a:latin typeface="+mn-lt"/>
+                <a:ea typeface="+mn-ea"/>
+                <a:cs typeface="+mn-cs"/>
+              </a:rPr>
+              <a:t>Provides accurate calculations</a:t>
+            </a:r>
+          </a:p>
+          <a:p>
+            <a:pPr marL="342900" marR="0" lvl="0" indent="-342900" algn="l" defTabSz="914400" rtl="0" eaLnBrk="1" fontAlgn="auto" latinLnBrk="0" hangingPunct="1">
+              <a:lnSpc>
+                <a:spcPct val="100000"/>
+              </a:lnSpc>
+              <a:spcBef>
+                <a:spcPct val="20000"/>
+              </a:spcBef>
+              <a:spcAft>
+                <a:spcPts val="0"/>
+              </a:spcAft>
+              <a:buClrTx/>
+              <a:buSzTx/>
+              <a:buFont typeface="Arial" pitchFamily="34" charset="0"/>
+              <a:buNone/>
+              <a:tabLst/>
+              <a:defRPr/>
+            </a:pPr>
+            <a:endParaRPr kumimoji="0" lang="en-US" sz="2800" b="0" i="0" u="none" strike="noStrike" kern="1200" cap="none" spc="0" normalizeH="0" baseline="0" noProof="0" dirty="0" smtClean="0">
+              <a:ln>
+                <a:noFill/>
+              </a:ln>
+              <a:solidFill>
+                <a:schemeClr val="tx1"/>
+              </a:solidFill>
+              <a:effectLst/>
+              <a:uLnTx/>
+              <a:uFillTx/>
+              <a:latin typeface="+mn-lt"/>
+              <a:ea typeface="+mn-ea"/>
+              <a:cs typeface="+mn-cs"/>
+            </a:endParaRPr>
+          </a:p>
+        </p:txBody>
+      </p:sp>
+      <p:pic>
+        <p:nvPicPr>
+          <p:cNvPr id="18" name="Picture 4" descr="http://pixabay.com/static/uploads/photo/2014/04/02/10/12/checkbox-303113_640.png"/>
+          <p:cNvPicPr>
+            <a:picLocks noChangeAspect="1" noChangeArrowheads="1"/>
+          </p:cNvPicPr>
+          <p:nvPr/>
+        </p:nvPicPr>
+        <p:blipFill>
+          <a:blip r:embed="rId2" cstate="print"/>
+          <a:srcRect/>
+          <a:stretch>
+            <a:fillRect/>
+          </a:stretch>
+        </p:blipFill>
+        <p:spPr bwMode="auto">
+          <a:xfrm>
+            <a:off x="762000" y="2286000"/>
+            <a:ext cx="457200" cy="461528"/>
+          </a:xfrm>
+          <a:prstGeom prst="rect">
+            <a:avLst/>
+          </a:prstGeom>
+          <a:noFill/>
+        </p:spPr>
+      </p:pic>
+    </p:spTree>
+  </p:cSld>
+  <p:clrMapOvr>
+    <a:masterClrMapping/>
+  </p:clrMapOvr>
+  <p:timing>
+    <p:tnLst>
+      <p:par>
+        <p:cTn id="1" dur="indefinite" restart="never" nodeType="tmRoot"/>
+      </p:par>
+    </p:tnLst>
+  </p:timing>
+</p:sld>
+</file>
+
+<file path=ppt/slides/slide6.xml><?xml version="1.0" encoding="utf-8"?>
+<p:sld xmlns:a="http://schemas.openxmlformats.org/drawingml/2006/main" xmlns:r="http://schemas.openxmlformats.org/officeDocument/2006/relationships" xmlns:p="http://schemas.openxmlformats.org/presentationml/2006/main">
+  <p:cSld>
+    <p:spTree>
+      <p:nvGrpSpPr>
+        <p:cNvPr id="1" name=""/>
+        <p:cNvGrpSpPr/>
+        <p:nvPr/>
+      </p:nvGrpSpPr>
+      <p:grpSpPr>
+        <a:xfrm>
+          <a:off x="0" y="0"/>
+          <a:ext cx="0" cy="0"/>
+          <a:chOff x="0" y="0"/>
+          <a:chExt cx="0" cy="0"/>
+        </a:xfrm>
+      </p:grpSpPr>
+      <p:sp>
+        <p:nvSpPr>
+          <p:cNvPr id="4" name="Title 3"/>
+          <p:cNvSpPr>
+            <a:spLocks noGrp="1"/>
+          </p:cNvSpPr>
+          <p:nvPr>
+            <p:ph type="title"/>
+          </p:nvPr>
+        </p:nvSpPr>
+        <p:spPr/>
+        <p:txBody>
           <a:bodyPr/>
           <a:lstStyle/>
           <a:p>
             <a:r>
               <a:rPr lang="en-US" dirty="0" smtClean="0"/>
-              <a:t>Hypothetical – Anne</a:t>
+              <a:t>Test Report – Known problems</a:t>
             </a:r>
             <a:endParaRPr lang="en-US" dirty="0"/>
           </a:p>
@@ -5236,23 +6229,308 @@
       </p:sp>
       <p:sp>
         <p:nvSpPr>
-          <p:cNvPr id="3" name="Content Placeholder 2"/>
-          <p:cNvSpPr>
-            <a:spLocks noGrp="1"/>
-          </p:cNvSpPr>
-          <p:nvPr>
-            <p:ph idx="1"/>
+          <p:cNvPr id="5" name="Content Placeholder 4"/>
+          <p:cNvSpPr>
+            <a:spLocks noGrp="1"/>
+          </p:cNvSpPr>
+          <p:nvPr>
+            <p:ph sz="half" idx="1"/>
           </p:nvPr>
         </p:nvSpPr>
         <p:spPr/>
         <p:txBody>
           <a:bodyPr>
-            <a:normAutofit fontScale="92500" lnSpcReduction="20000"/>
+            <a:normAutofit lnSpcReduction="10000"/>
           </a:bodyPr>
           <a:lstStyle/>
           <a:p>
             <a:r>
               <a:rPr lang="en-US" dirty="0" smtClean="0"/>
+              <a:t>Run – Stop – Run again sequence may interrupt thread processes – cause crash</a:t>
+            </a:r>
+          </a:p>
+          <a:p>
+            <a:r>
+              <a:rPr lang="en-US" dirty="0" smtClean="0"/>
+              <a:t>Similar issue with Exiting Tool during IO</a:t>
+            </a:r>
+          </a:p>
+          <a:p>
+            <a:r>
+              <a:rPr lang="en-US" dirty="0" smtClean="0"/>
+              <a:t>Base/Needle height may not be measured accurately, will affect results</a:t>
+            </a:r>
+          </a:p>
+        </p:txBody>
+      </p:sp>
+      <p:pic>
+        <p:nvPicPr>
+          <p:cNvPr id="7" name="Picture 6"/>
+          <p:cNvPicPr/>
+          <p:nvPr/>
+        </p:nvPicPr>
+        <p:blipFill>
+          <a:blip r:embed="rId2" cstate="print"/>
+          <a:srcRect/>
+          <a:stretch>
+            <a:fillRect/>
+          </a:stretch>
+        </p:blipFill>
+        <p:spPr bwMode="auto">
+          <a:xfrm>
+            <a:off x="4572000" y="2408767"/>
+            <a:ext cx="1219200" cy="791633"/>
+          </a:xfrm>
+          <a:prstGeom prst="rect">
+            <a:avLst/>
+          </a:prstGeom>
+          <a:noFill/>
+          <a:ln w="9525">
+            <a:noFill/>
+            <a:miter lim="800000"/>
+            <a:headEnd/>
+            <a:tailEnd/>
+          </a:ln>
+        </p:spPr>
+      </p:pic>
+      <p:pic>
+        <p:nvPicPr>
+          <p:cNvPr id="8" name="Picture 7"/>
+          <p:cNvPicPr/>
+          <p:nvPr/>
+        </p:nvPicPr>
+        <p:blipFill>
+          <a:blip r:embed="rId3" cstate="print"/>
+          <a:srcRect/>
+          <a:stretch>
+            <a:fillRect/>
+          </a:stretch>
+        </p:blipFill>
+        <p:spPr bwMode="auto">
+          <a:xfrm>
+            <a:off x="6096000" y="2408767"/>
+            <a:ext cx="1250527" cy="760307"/>
+          </a:xfrm>
+          <a:prstGeom prst="rect">
+            <a:avLst/>
+          </a:prstGeom>
+          <a:noFill/>
+          <a:ln w="9525">
+            <a:noFill/>
+            <a:miter lim="800000"/>
+            <a:headEnd/>
+            <a:tailEnd/>
+          </a:ln>
+        </p:spPr>
+      </p:pic>
+      <p:pic>
+        <p:nvPicPr>
+          <p:cNvPr id="9" name="Picture 8"/>
+          <p:cNvPicPr/>
+          <p:nvPr/>
+        </p:nvPicPr>
+        <p:blipFill>
+          <a:blip r:embed="rId2" cstate="print"/>
+          <a:srcRect/>
+          <a:stretch>
+            <a:fillRect/>
+          </a:stretch>
+        </p:blipFill>
+        <p:spPr bwMode="auto">
+          <a:xfrm>
+            <a:off x="7543800" y="2408767"/>
+            <a:ext cx="1219200" cy="791633"/>
+          </a:xfrm>
+          <a:prstGeom prst="rect">
+            <a:avLst/>
+          </a:prstGeom>
+          <a:noFill/>
+          <a:ln w="9525">
+            <a:noFill/>
+            <a:miter lim="800000"/>
+            <a:headEnd/>
+            <a:tailEnd/>
+          </a:ln>
+        </p:spPr>
+      </p:pic>
+      <p:cxnSp>
+        <p:nvCxnSpPr>
+          <p:cNvPr id="11" name="Straight Arrow Connector 10"/>
+          <p:cNvCxnSpPr>
+            <a:stCxn id="7" idx="3"/>
+            <a:endCxn id="8" idx="1"/>
+          </p:cNvCxnSpPr>
+          <p:nvPr/>
+        </p:nvCxnSpPr>
+        <p:spPr>
+          <a:xfrm flipV="1">
+            <a:off x="5791200" y="2788921"/>
+            <a:ext cx="304800" cy="15663"/>
+          </a:xfrm>
+          <a:prstGeom prst="straightConnector1">
+            <a:avLst/>
+          </a:prstGeom>
+          <a:ln>
+            <a:tailEnd type="arrow"/>
+          </a:ln>
+        </p:spPr>
+        <p:style>
+          <a:lnRef idx="1">
+            <a:schemeClr val="accent1"/>
+          </a:lnRef>
+          <a:fillRef idx="0">
+            <a:schemeClr val="accent1"/>
+          </a:fillRef>
+          <a:effectRef idx="0">
+            <a:schemeClr val="accent1"/>
+          </a:effectRef>
+          <a:fontRef idx="minor">
+            <a:schemeClr val="tx1"/>
+          </a:fontRef>
+        </p:style>
+      </p:cxnSp>
+      <p:cxnSp>
+        <p:nvCxnSpPr>
+          <p:cNvPr id="13" name="Straight Arrow Connector 12"/>
+          <p:cNvCxnSpPr>
+            <a:stCxn id="8" idx="3"/>
+            <a:endCxn id="9" idx="1"/>
+          </p:cNvCxnSpPr>
+          <p:nvPr/>
+        </p:nvCxnSpPr>
+        <p:spPr>
+          <a:xfrm>
+            <a:off x="7346527" y="2788921"/>
+            <a:ext cx="197273" cy="15663"/>
+          </a:xfrm>
+          <a:prstGeom prst="straightConnector1">
+            <a:avLst/>
+          </a:prstGeom>
+          <a:ln>
+            <a:tailEnd type="arrow"/>
+          </a:ln>
+        </p:spPr>
+        <p:style>
+          <a:lnRef idx="1">
+            <a:schemeClr val="accent1"/>
+          </a:lnRef>
+          <a:fillRef idx="0">
+            <a:schemeClr val="accent1"/>
+          </a:fillRef>
+          <a:effectRef idx="0">
+            <a:schemeClr val="accent1"/>
+          </a:effectRef>
+          <a:fontRef idx="minor">
+            <a:schemeClr val="tx1"/>
+          </a:fontRef>
+        </p:style>
+      </p:cxnSp>
+      <p:pic>
+        <p:nvPicPr>
+          <p:cNvPr id="2050" name="Picture 2"/>
+          <p:cNvPicPr>
+            <a:picLocks noChangeAspect="1" noChangeArrowheads="1"/>
+          </p:cNvPicPr>
+          <p:nvPr/>
+        </p:nvPicPr>
+        <p:blipFill>
+          <a:blip r:embed="rId4" cstate="print"/>
+          <a:srcRect r="4278" b="15789"/>
+          <a:stretch>
+            <a:fillRect/>
+          </a:stretch>
+        </p:blipFill>
+        <p:spPr bwMode="auto">
+          <a:xfrm>
+            <a:off x="4419600" y="4800600"/>
+            <a:ext cx="4724400" cy="281528"/>
+          </a:xfrm>
+          <a:prstGeom prst="rect">
+            <a:avLst/>
+          </a:prstGeom>
+          <a:noFill/>
+          <a:ln w="9525">
+            <a:noFill/>
+            <a:miter lim="800000"/>
+            <a:headEnd/>
+            <a:tailEnd/>
+          </a:ln>
+        </p:spPr>
+      </p:pic>
+    </p:spTree>
+  </p:cSld>
+  <p:clrMapOvr>
+    <a:masterClrMapping/>
+  </p:clrMapOvr>
+  <p:timing>
+    <p:tnLst>
+      <p:par>
+        <p:cTn id="1" dur="indefinite" restart="never" nodeType="tmRoot"/>
+      </p:par>
+    </p:tnLst>
+  </p:timing>
+</p:sld>
+</file>
+
+<file path=ppt/slides/slide7.xml><?xml version="1.0" encoding="utf-8"?>
+<p:sld xmlns:a="http://schemas.openxmlformats.org/drawingml/2006/main" xmlns:r="http://schemas.openxmlformats.org/officeDocument/2006/relationships" xmlns:p="http://schemas.openxmlformats.org/presentationml/2006/main">
+  <p:cSld>
+    <p:spTree>
+      <p:nvGrpSpPr>
+        <p:cNvPr id="1" name=""/>
+        <p:cNvGrpSpPr/>
+        <p:nvPr/>
+      </p:nvGrpSpPr>
+      <p:grpSpPr>
+        <a:xfrm>
+          <a:off x="0" y="0"/>
+          <a:ext cx="0" cy="0"/>
+          <a:chOff x="0" y="0"/>
+          <a:chExt cx="0" cy="0"/>
+        </a:xfrm>
+      </p:grpSpPr>
+      <p:sp>
+        <p:nvSpPr>
+          <p:cNvPr id="2" name="Title 1"/>
+          <p:cNvSpPr>
+            <a:spLocks noGrp="1"/>
+          </p:cNvSpPr>
+          <p:nvPr>
+            <p:ph type="title"/>
+          </p:nvPr>
+        </p:nvSpPr>
+        <p:spPr/>
+        <p:txBody>
+          <a:bodyPr/>
+          <a:lstStyle/>
+          <a:p>
+            <a:r>
+              <a:rPr lang="en-US" dirty="0" smtClean="0"/>
+              <a:t>Hypothetical – Anne</a:t>
+            </a:r>
+            <a:endParaRPr lang="en-US" dirty="0"/>
+          </a:p>
+        </p:txBody>
+      </p:sp>
+      <p:sp>
+        <p:nvSpPr>
+          <p:cNvPr id="3" name="Content Placeholder 2"/>
+          <p:cNvSpPr>
+            <a:spLocks noGrp="1"/>
+          </p:cNvSpPr>
+          <p:nvPr>
+            <p:ph idx="1"/>
+          </p:nvPr>
+        </p:nvSpPr>
+        <p:spPr/>
+        <p:txBody>
+          <a:bodyPr>
+            <a:normAutofit fontScale="85000" lnSpcReduction="20000"/>
+          </a:bodyPr>
+          <a:lstStyle/>
+          <a:p>
+            <a:r>
+              <a:rPr lang="en-US" dirty="0" smtClean="0"/>
               <a:t>What if we had more time?</a:t>
             </a:r>
           </a:p>
@@ -5260,13 +6538,8 @@
             <a:pPr lvl="1"/>
             <a:r>
               <a:rPr lang="en-US" dirty="0" smtClean="0"/>
-              <a:t>Improve processing time, design of interface (change color scheme of form), ensure customer </a:t>
-            </a:r>
-            <a:r>
-              <a:rPr lang="en-US" dirty="0" err="1" smtClean="0"/>
-              <a:t>satisfication</a:t>
-            </a:r>
-            <a:endParaRPr lang="en-US" dirty="0" smtClean="0"/>
+              <a:t>Improve processing time, design of interface (change color scheme of form, more feedback from tool), ensure customer satisfaction</a:t>
+            </a:r>
           </a:p>
           <a:p>
             <a:r>
@@ -5278,7 +6551,7 @@
             <a:pPr lvl="1"/>
             <a:r>
               <a:rPr lang="en-US" dirty="0" smtClean="0"/>
-              <a:t>Would start coding sooner</a:t>
+              <a:t>Start coding sooner</a:t>
             </a:r>
           </a:p>
           <a:p>
@@ -5294,16 +6567,11 @@
               <a:rPr lang="en-US" dirty="0" smtClean="0"/>
               <a:t>Interact more with customer</a:t>
             </a:r>
-            <a:endParaRPr lang="en-US" dirty="0" smtClean="0"/>
           </a:p>
           <a:p>
             <a:r>
               <a:rPr lang="en-US" dirty="0" smtClean="0"/>
-              <a:t>What </a:t>
-            </a:r>
-            <a:r>
-              <a:rPr lang="en-US" dirty="0" smtClean="0"/>
-              <a:t>I learned</a:t>
+              <a:t>What I learned</a:t>
             </a:r>
           </a:p>
           <a:p>

</xml_diff>